<commit_message>
slides and start magpie tutorial update
</commit_message>
<xml_diff>
--- a/assets/slides/GAMS code, modules & realizations.pptx
+++ b/assets/slides/GAMS code, modules & realizations.pptx
@@ -5,10 +5,10 @@
     <p:sldMasterId id="2147483648" r:id="rId1"/>
   </p:sldMasterIdLst>
   <p:notesMasterIdLst>
-    <p:notesMasterId r:id="rId13"/>
+    <p:notesMasterId r:id="rId14"/>
   </p:notesMasterIdLst>
   <p:handoutMasterIdLst>
-    <p:handoutMasterId r:id="rId14"/>
+    <p:handoutMasterId r:id="rId15"/>
   </p:handoutMasterIdLst>
   <p:sldIdLst>
     <p:sldId id="268" r:id="rId2"/>
@@ -21,7 +21,8 @@
     <p:sldId id="279" r:id="rId9"/>
     <p:sldId id="280" r:id="rId10"/>
     <p:sldId id="278" r:id="rId11"/>
-    <p:sldId id="264" r:id="rId12"/>
+    <p:sldId id="281" r:id="rId12"/>
+    <p:sldId id="264" r:id="rId13"/>
   </p:sldIdLst>
   <p:sldSz cx="12192000" cy="6858000"/>
   <p:notesSz cx="6858000" cy="9144000"/>
@@ -120,6 +121,14 @@
       </a:defRPr>
     </a:lvl9pPr>
   </p:defaultTextStyle>
+  <p:extLst>
+    <p:ext uri="{EFAFB233-063F-42B5-8137-9DF3F51BA10A}">
+      <p15:sldGuideLst xmlns:p15="http://schemas.microsoft.com/office/powerpoint/2012/main"/>
+    </p:ext>
+    <p:ext uri="{2D200454-40CA-4A62-9FC3-DE9A4176ACB9}">
+      <p15:notesGuideLst xmlns:p15="http://schemas.microsoft.com/office/powerpoint/2012/main"/>
+    </p:ext>
+  </p:extLst>
 </p:presentation>
 </file>
 
@@ -6143,6 +6152,713 @@
       </p:grpSpPr>
       <p:sp>
         <p:nvSpPr>
+          <p:cNvPr id="3" name="Title 2">
+            <a:extLst>
+              <a:ext uri="{FF2B5EF4-FFF2-40B4-BE49-F238E27FC236}">
+                <a16:creationId xmlns:a16="http://schemas.microsoft.com/office/drawing/2014/main" id="{F8A07FAD-A3A4-4B9F-9E99-0D81C84AAE87}"/>
+              </a:ext>
+            </a:extLst>
+          </p:cNvPr>
+          <p:cNvSpPr>
+            <a:spLocks noGrp="1"/>
+          </p:cNvSpPr>
+          <p:nvPr>
+            <p:ph type="title"/>
+          </p:nvPr>
+        </p:nvSpPr>
+        <p:spPr/>
+        <p:txBody>
+          <a:bodyPr>
+            <a:normAutofit/>
+          </a:bodyPr>
+          <a:lstStyle/>
+          <a:p>
+            <a:r>
+              <a:rPr lang="en-US" sz="3200" dirty="0"/>
+              <a:t>Brief exercise</a:t>
+            </a:r>
+            <a:endParaRPr lang="en-DE" sz="3200" dirty="0"/>
+          </a:p>
+        </p:txBody>
+      </p:sp>
+      <p:sp>
+        <p:nvSpPr>
+          <p:cNvPr id="4" name="Date Placeholder 3">
+            <a:extLst>
+              <a:ext uri="{FF2B5EF4-FFF2-40B4-BE49-F238E27FC236}">
+                <a16:creationId xmlns:a16="http://schemas.microsoft.com/office/drawing/2014/main" id="{B1457F58-C5CA-4326-A73B-34EF6DB5C2B3}"/>
+              </a:ext>
+            </a:extLst>
+          </p:cNvPr>
+          <p:cNvSpPr>
+            <a:spLocks noGrp="1"/>
+          </p:cNvSpPr>
+          <p:nvPr>
+            <p:ph type="dt" sz="half" idx="10"/>
+          </p:nvPr>
+        </p:nvSpPr>
+        <p:spPr/>
+        <p:txBody>
+          <a:bodyPr/>
+          <a:lstStyle/>
+          <a:p>
+            <a:r>
+              <a:rPr lang="en-DE"/>
+              <a:t>10.04.2024</a:t>
+            </a:r>
+          </a:p>
+        </p:txBody>
+      </p:sp>
+      <p:sp>
+        <p:nvSpPr>
+          <p:cNvPr id="5" name="Footer Placeholder 4">
+            <a:extLst>
+              <a:ext uri="{FF2B5EF4-FFF2-40B4-BE49-F238E27FC236}">
+                <a16:creationId xmlns:a16="http://schemas.microsoft.com/office/drawing/2014/main" id="{08E27823-4349-40E0-A2FC-763FD8AFDA00}"/>
+              </a:ext>
+            </a:extLst>
+          </p:cNvPr>
+          <p:cNvSpPr>
+            <a:spLocks noGrp="1"/>
+          </p:cNvSpPr>
+          <p:nvPr>
+            <p:ph type="ftr" sz="quarter" idx="11"/>
+          </p:nvPr>
+        </p:nvSpPr>
+        <p:spPr/>
+        <p:txBody>
+          <a:bodyPr/>
+          <a:lstStyle/>
+          <a:p>
+            <a:r>
+              <a:rPr lang="en-US" dirty="0"/>
+              <a:t>MAgPIE24 Workshop &amp; Stories </a:t>
+            </a:r>
+            <a:endParaRPr lang="en-DE" dirty="0"/>
+          </a:p>
+        </p:txBody>
+      </p:sp>
+      <p:sp>
+        <p:nvSpPr>
+          <p:cNvPr id="6" name="Slide Number Placeholder 5">
+            <a:extLst>
+              <a:ext uri="{FF2B5EF4-FFF2-40B4-BE49-F238E27FC236}">
+                <a16:creationId xmlns:a16="http://schemas.microsoft.com/office/drawing/2014/main" id="{F58EB891-045F-42BA-97B1-2EB49A950F12}"/>
+              </a:ext>
+            </a:extLst>
+          </p:cNvPr>
+          <p:cNvSpPr>
+            <a:spLocks noGrp="1"/>
+          </p:cNvSpPr>
+          <p:nvPr>
+            <p:ph type="sldNum" sz="quarter" idx="12"/>
+          </p:nvPr>
+        </p:nvSpPr>
+        <p:spPr/>
+        <p:txBody>
+          <a:bodyPr/>
+          <a:lstStyle/>
+          <a:p>
+            <a:fld id="{92195745-EC9D-4E4A-A6A9-D21AC3595199}" type="slidenum">
+              <a:rPr lang="en-DE" smtClean="0"/>
+              <a:t>11</a:t>
+            </a:fld>
+            <a:endParaRPr lang="en-DE" dirty="0"/>
+          </a:p>
+        </p:txBody>
+      </p:sp>
+      <p:sp>
+        <p:nvSpPr>
+          <p:cNvPr id="7" name="Rectangle 6">
+            <a:extLst>
+              <a:ext uri="{FF2B5EF4-FFF2-40B4-BE49-F238E27FC236}">
+                <a16:creationId xmlns:a16="http://schemas.microsoft.com/office/drawing/2014/main" id="{F47E0102-8564-4285-96A0-A566285E77F4}"/>
+              </a:ext>
+            </a:extLst>
+          </p:cNvPr>
+          <p:cNvSpPr/>
+          <p:nvPr/>
+        </p:nvSpPr>
+        <p:spPr>
+          <a:xfrm>
+            <a:off x="360000" y="1200669"/>
+            <a:ext cx="10348105" cy="4401205"/>
+          </a:xfrm>
+          <a:prstGeom prst="rect">
+            <a:avLst/>
+          </a:prstGeom>
+        </p:spPr>
+        <p:txBody>
+          <a:bodyPr wrap="square">
+            <a:spAutoFit/>
+          </a:bodyPr>
+          <a:lstStyle/>
+          <a:p>
+            <a:pPr marL="45720" indent="0">
+              <a:buNone/>
+            </a:pPr>
+            <a:r>
+              <a:rPr lang="de-DE" sz="2800" b="1" dirty="0"/>
+              <a:t>(</a:t>
+            </a:r>
+            <a:r>
+              <a:rPr lang="de-DE" sz="2800" b="1" dirty="0" err="1"/>
+              <a:t>For</a:t>
+            </a:r>
+            <a:r>
+              <a:rPr lang="de-DE" sz="2800" b="1" dirty="0"/>
+              <a:t> online </a:t>
+            </a:r>
+            <a:r>
+              <a:rPr lang="de-DE" sz="2800" b="1" dirty="0" err="1"/>
+              <a:t>participants</a:t>
+            </a:r>
+            <a:r>
+              <a:rPr lang="de-DE" sz="2800" b="1" dirty="0"/>
+              <a:t>: Green tick </a:t>
+            </a:r>
+            <a:r>
+              <a:rPr lang="de-DE" sz="2800" b="1" dirty="0" err="1"/>
+              <a:t>when</a:t>
+            </a:r>
+            <a:r>
+              <a:rPr lang="de-DE" sz="2800" b="1" dirty="0"/>
+              <a:t> </a:t>
+            </a:r>
+            <a:r>
+              <a:rPr lang="de-DE" sz="2800" b="1" dirty="0" err="1"/>
+              <a:t>you</a:t>
+            </a:r>
+            <a:r>
+              <a:rPr lang="de-DE" sz="2800" b="1" dirty="0"/>
+              <a:t> </a:t>
+            </a:r>
+            <a:r>
+              <a:rPr lang="de-DE" sz="2800" b="1" dirty="0" err="1"/>
+              <a:t>are</a:t>
+            </a:r>
+            <a:r>
+              <a:rPr lang="de-DE" sz="2800" b="1" dirty="0"/>
+              <a:t> </a:t>
+            </a:r>
+            <a:r>
+              <a:rPr lang="de-DE" sz="2800" b="1" dirty="0" err="1"/>
+              <a:t>ready</a:t>
+            </a:r>
+            <a:r>
+              <a:rPr lang="de-DE" sz="2800" b="1" dirty="0"/>
+              <a:t> )</a:t>
+            </a:r>
+          </a:p>
+          <a:p>
+            <a:pPr marL="45720" indent="0">
+              <a:buNone/>
+            </a:pPr>
+            <a:r>
+              <a:rPr lang="de-DE" sz="2800" b="1" dirty="0"/>
+              <a:t> </a:t>
+            </a:r>
+          </a:p>
+          <a:p>
+            <a:pPr marL="502920" indent="-457200">
+              <a:buAutoNum type="arabicPeriod"/>
+            </a:pPr>
+            <a:r>
+              <a:rPr lang="de-DE" sz="2800" dirty="0" err="1"/>
+              <a:t>Within</a:t>
+            </a:r>
+            <a:r>
+              <a:rPr lang="de-DE" sz="2800" dirty="0"/>
+              <a:t> </a:t>
+            </a:r>
+            <a:r>
+              <a:rPr lang="de-DE" sz="2800" dirty="0" err="1"/>
+              <a:t>the</a:t>
+            </a:r>
+            <a:r>
+              <a:rPr lang="de-DE" sz="2800" dirty="0"/>
+              <a:t> </a:t>
+            </a:r>
+            <a:r>
+              <a:rPr lang="de-DE" sz="2800" dirty="0" err="1"/>
+              <a:t>magpie</a:t>
+            </a:r>
+            <a:r>
+              <a:rPr lang="de-DE" sz="2800" dirty="0"/>
+              <a:t> </a:t>
+            </a:r>
+            <a:r>
+              <a:rPr lang="de-DE" sz="2800" dirty="0" err="1"/>
+              <a:t>folder</a:t>
+            </a:r>
+            <a:r>
+              <a:rPr lang="de-DE" sz="2800" dirty="0"/>
+              <a:t>, find </a:t>
+            </a:r>
+            <a:r>
+              <a:rPr lang="de-DE" sz="2800" dirty="0" err="1"/>
+              <a:t>the</a:t>
+            </a:r>
+            <a:r>
+              <a:rPr lang="de-DE" sz="2800" dirty="0"/>
+              <a:t> </a:t>
+            </a:r>
+            <a:r>
+              <a:rPr lang="de-DE" sz="2800" b="1" dirty="0">
+                <a:solidFill>
+                  <a:schemeClr val="accent2">
+                    <a:lumMod val="75000"/>
+                  </a:schemeClr>
+                </a:solidFill>
+              </a:rPr>
+              <a:t>14_yield</a:t>
+            </a:r>
+            <a:r>
+              <a:rPr lang="de-DE" sz="2800" dirty="0"/>
+              <a:t> </a:t>
+            </a:r>
+            <a:r>
+              <a:rPr lang="de-DE" sz="2800" dirty="0" err="1"/>
+              <a:t>module</a:t>
+            </a:r>
+            <a:r>
+              <a:rPr lang="de-DE" sz="2800" dirty="0"/>
+              <a:t>.</a:t>
+            </a:r>
+          </a:p>
+          <a:p>
+            <a:pPr marL="502920" indent="-457200">
+              <a:buAutoNum type="arabicPeriod"/>
+            </a:pPr>
+            <a:r>
+              <a:rPr lang="de-DE" sz="2800" dirty="0"/>
+              <a:t>Open </a:t>
+            </a:r>
+            <a:r>
+              <a:rPr lang="de-DE" sz="2800" dirty="0" err="1"/>
+              <a:t>the</a:t>
+            </a:r>
+            <a:r>
+              <a:rPr lang="de-DE" sz="2800" dirty="0"/>
+              <a:t> </a:t>
+            </a:r>
+            <a:r>
+              <a:rPr lang="de-DE" sz="2800" b="1" dirty="0" err="1">
+                <a:solidFill>
+                  <a:srgbClr val="C00000"/>
+                </a:solidFill>
+              </a:rPr>
+              <a:t>declaration.gms</a:t>
+            </a:r>
+            <a:r>
+              <a:rPr lang="de-DE" sz="2800" dirty="0"/>
+              <a:t> </a:t>
+            </a:r>
+            <a:r>
+              <a:rPr lang="de-DE" sz="2800" dirty="0" err="1"/>
+              <a:t>file</a:t>
+            </a:r>
+            <a:r>
+              <a:rPr lang="de-DE" sz="2800" dirty="0"/>
+              <a:t> </a:t>
+            </a:r>
+            <a:r>
+              <a:rPr lang="de-DE" sz="2800" dirty="0" err="1"/>
+              <a:t>of</a:t>
+            </a:r>
+            <a:r>
+              <a:rPr lang="de-DE" sz="2800" dirty="0"/>
+              <a:t> </a:t>
+            </a:r>
+            <a:r>
+              <a:rPr lang="de-DE" sz="2800" dirty="0" err="1"/>
+              <a:t>the</a:t>
+            </a:r>
+            <a:r>
+              <a:rPr lang="de-DE" sz="2800" dirty="0"/>
+              <a:t> </a:t>
+            </a:r>
+            <a:r>
+              <a:rPr lang="de-DE" sz="2800" b="1" dirty="0">
+                <a:solidFill>
+                  <a:schemeClr val="accent2">
+                    <a:lumMod val="75000"/>
+                  </a:schemeClr>
+                </a:solidFill>
+              </a:rPr>
+              <a:t>managementcalib_aug19 </a:t>
+            </a:r>
+            <a:r>
+              <a:rPr lang="de-DE" sz="2800" dirty="0" err="1"/>
+              <a:t>realization</a:t>
+            </a:r>
+            <a:endParaRPr lang="de-DE" sz="2800" dirty="0"/>
+          </a:p>
+          <a:p>
+            <a:pPr marL="502920" indent="-457200">
+              <a:buAutoNum type="arabicPeriod"/>
+            </a:pPr>
+            <a:r>
+              <a:rPr lang="de-DE" sz="2800" dirty="0" err="1"/>
+              <a:t>One</a:t>
+            </a:r>
+            <a:r>
+              <a:rPr lang="de-DE" sz="2800" dirty="0"/>
+              <a:t> </a:t>
+            </a:r>
+            <a:r>
+              <a:rPr lang="de-DE" sz="2800" dirty="0" err="1"/>
+              <a:t>example</a:t>
+            </a:r>
+            <a:r>
+              <a:rPr lang="de-DE" sz="2800" dirty="0"/>
+              <a:t> </a:t>
+            </a:r>
+            <a:r>
+              <a:rPr lang="de-DE" sz="2800" dirty="0" err="1"/>
+              <a:t>of</a:t>
+            </a:r>
+            <a:r>
+              <a:rPr lang="de-DE" sz="2800" dirty="0"/>
+              <a:t>:</a:t>
+            </a:r>
+          </a:p>
+          <a:p>
+            <a:pPr marL="998538" indent="-457200">
+              <a:buFont typeface="Arial" panose="020B0604020202020204" pitchFamily="34" charset="0"/>
+              <a:buChar char="•"/>
+            </a:pPr>
+            <a:r>
+              <a:rPr lang="de-DE" sz="2800" dirty="0"/>
+              <a:t>Parameter </a:t>
+            </a:r>
+            <a:r>
+              <a:rPr lang="de-DE" sz="2800" dirty="0" err="1"/>
+              <a:t>used</a:t>
+            </a:r>
+            <a:r>
+              <a:rPr lang="de-DE" sz="2800" dirty="0"/>
+              <a:t> </a:t>
+            </a:r>
+            <a:r>
+              <a:rPr lang="de-DE" sz="2800" b="1" dirty="0" err="1">
+                <a:solidFill>
+                  <a:schemeClr val="accent2">
+                    <a:lumMod val="75000"/>
+                  </a:schemeClr>
+                </a:solidFill>
+              </a:rPr>
+              <a:t>only</a:t>
+            </a:r>
+            <a:r>
+              <a:rPr lang="de-DE" sz="2800" dirty="0"/>
+              <a:t> </a:t>
+            </a:r>
+            <a:r>
+              <a:rPr lang="de-DE" sz="2800" dirty="0" err="1"/>
+              <a:t>within</a:t>
+            </a:r>
+            <a:r>
+              <a:rPr lang="de-DE" sz="2800" dirty="0"/>
+              <a:t> </a:t>
+            </a:r>
+            <a:r>
+              <a:rPr lang="de-DE" sz="2800" dirty="0" err="1"/>
+              <a:t>the</a:t>
+            </a:r>
+            <a:r>
+              <a:rPr lang="de-DE" sz="2800" dirty="0"/>
+              <a:t> </a:t>
+            </a:r>
+            <a:r>
+              <a:rPr lang="de-DE" sz="2800" dirty="0" err="1"/>
+              <a:t>current</a:t>
+            </a:r>
+            <a:r>
+              <a:rPr lang="de-DE" sz="2800" dirty="0"/>
+              <a:t> </a:t>
+            </a:r>
+            <a:r>
+              <a:rPr lang="de-DE" sz="2800" dirty="0" err="1"/>
+              <a:t>module</a:t>
+            </a:r>
+            <a:endParaRPr lang="de-DE" sz="2800" dirty="0"/>
+          </a:p>
+          <a:p>
+            <a:pPr marL="998538" indent="-457200">
+              <a:buFont typeface="Arial" panose="020B0604020202020204" pitchFamily="34" charset="0"/>
+              <a:buChar char="•"/>
+            </a:pPr>
+            <a:r>
+              <a:rPr lang="de-DE" sz="2800" dirty="0"/>
+              <a:t>An </a:t>
+            </a:r>
+            <a:r>
+              <a:rPr lang="de-DE" sz="2800" dirty="0" err="1"/>
+              <a:t>equation</a:t>
+            </a:r>
+            <a:r>
+              <a:rPr lang="de-DE" sz="2800" dirty="0"/>
+              <a:t>  </a:t>
+            </a:r>
+          </a:p>
+          <a:p>
+            <a:pPr marL="998538" indent="-457200">
+              <a:buFont typeface="Arial" panose="020B0604020202020204" pitchFamily="34" charset="0"/>
+              <a:buChar char="•"/>
+            </a:pPr>
+            <a:r>
+              <a:rPr lang="de-DE" sz="2800" dirty="0"/>
+              <a:t>A </a:t>
+            </a:r>
+            <a:r>
+              <a:rPr lang="de-DE" sz="2800" dirty="0" err="1"/>
+              <a:t>processing</a:t>
+            </a:r>
+            <a:r>
+              <a:rPr lang="de-DE" sz="2800" dirty="0"/>
+              <a:t> </a:t>
+            </a:r>
+            <a:r>
+              <a:rPr lang="de-DE" sz="2800" dirty="0" err="1"/>
+              <a:t>parameter</a:t>
+            </a:r>
+            <a:r>
+              <a:rPr lang="de-DE" sz="2800" dirty="0"/>
+              <a:t> </a:t>
+            </a:r>
+            <a:r>
+              <a:rPr lang="de-DE" sz="2800" dirty="0" err="1"/>
+              <a:t>used</a:t>
+            </a:r>
+            <a:r>
+              <a:rPr lang="de-DE" sz="2800" dirty="0"/>
+              <a:t> </a:t>
+            </a:r>
+            <a:r>
+              <a:rPr lang="de-DE" sz="2800" b="1" dirty="0">
+                <a:solidFill>
+                  <a:schemeClr val="accent2">
+                    <a:lumMod val="75000"/>
+                  </a:schemeClr>
+                </a:solidFill>
+              </a:rPr>
+              <a:t>in </a:t>
+            </a:r>
+            <a:r>
+              <a:rPr lang="de-DE" sz="2800" dirty="0" err="1"/>
+              <a:t>this</a:t>
+            </a:r>
+            <a:r>
+              <a:rPr lang="de-DE" sz="2800" dirty="0"/>
+              <a:t> </a:t>
+            </a:r>
+            <a:r>
+              <a:rPr lang="de-DE" sz="2800" dirty="0" err="1"/>
+              <a:t>module</a:t>
+            </a:r>
+            <a:r>
+              <a:rPr lang="de-DE" sz="2800" dirty="0"/>
+              <a:t> and </a:t>
+            </a:r>
+            <a:r>
+              <a:rPr lang="de-DE" sz="2800" dirty="0" err="1"/>
+              <a:t>the</a:t>
+            </a:r>
+            <a:r>
+              <a:rPr lang="de-DE" sz="2800" dirty="0"/>
+              <a:t> </a:t>
+            </a:r>
+            <a:r>
+              <a:rPr lang="de-DE" sz="2800" dirty="0" err="1"/>
+              <a:t>core</a:t>
+            </a:r>
+            <a:r>
+              <a:rPr lang="de-DE" sz="2800" dirty="0"/>
+              <a:t> code.</a:t>
+            </a:r>
+          </a:p>
+          <a:p>
+            <a:pPr marL="998538" indent="-457200">
+              <a:buFont typeface="Arial" panose="020B0604020202020204" pitchFamily="34" charset="0"/>
+              <a:buChar char="•"/>
+            </a:pPr>
+            <a:r>
+              <a:rPr lang="de-DE" sz="2800" dirty="0"/>
+              <a:t>An </a:t>
+            </a:r>
+            <a:r>
+              <a:rPr lang="de-DE" sz="2800" dirty="0" err="1"/>
+              <a:t>output</a:t>
+            </a:r>
+            <a:r>
+              <a:rPr lang="de-DE" sz="2800" dirty="0"/>
+              <a:t> </a:t>
+            </a:r>
+            <a:r>
+              <a:rPr lang="de-DE" sz="2800" dirty="0" err="1"/>
+              <a:t>parameter</a:t>
+            </a:r>
+            <a:r>
+              <a:rPr lang="de-DE" sz="2800" dirty="0"/>
+              <a:t>   </a:t>
+            </a:r>
+          </a:p>
+        </p:txBody>
+      </p:sp>
+      <p:pic>
+        <p:nvPicPr>
+          <p:cNvPr id="16" name="Picture 15">
+            <a:extLst>
+              <a:ext uri="{FF2B5EF4-FFF2-40B4-BE49-F238E27FC236}">
+                <a16:creationId xmlns:a16="http://schemas.microsoft.com/office/drawing/2014/main" id="{E634F2A3-3EBD-4AEA-A9E2-048F09050FEF}"/>
+              </a:ext>
+            </a:extLst>
+          </p:cNvPr>
+          <p:cNvPicPr>
+            <a:picLocks noChangeAspect="1"/>
+          </p:cNvPicPr>
+          <p:nvPr/>
+        </p:nvPicPr>
+        <p:blipFill>
+          <a:blip r:embed="rId2"/>
+          <a:stretch>
+            <a:fillRect/>
+          </a:stretch>
+        </p:blipFill>
+        <p:spPr>
+          <a:xfrm>
+            <a:off x="8870635" y="1278747"/>
+            <a:ext cx="389774" cy="389774"/>
+          </a:xfrm>
+          <a:prstGeom prst="rect">
+            <a:avLst/>
+          </a:prstGeom>
+        </p:spPr>
+      </p:pic>
+    </p:spTree>
+    <p:extLst>
+      <p:ext uri="{BB962C8B-B14F-4D97-AF65-F5344CB8AC3E}">
+        <p14:creationId xmlns:p14="http://schemas.microsoft.com/office/powerpoint/2010/main" val="2496781299"/>
+      </p:ext>
+    </p:extLst>
+  </p:cSld>
+  <p:clrMapOvr>
+    <a:masterClrMapping/>
+  </p:clrMapOvr>
+  <mc:AlternateContent xmlns:mc="http://schemas.openxmlformats.org/markup-compatibility/2006" xmlns:p14="http://schemas.microsoft.com/office/powerpoint/2010/main">
+    <mc:Choice Requires="p14">
+      <p:transition spd="med" p14:dur="700">
+        <p:fade/>
+      </p:transition>
+    </mc:Choice>
+    <mc:Fallback xmlns="">
+      <p:transition spd="med">
+        <p:fade/>
+      </p:transition>
+    </mc:Fallback>
+  </mc:AlternateContent>
+  <p:timing>
+    <p:tnLst>
+      <p:par>
+        <p:cTn id="1" dur="indefinite" restart="never" nodeType="tmRoot">
+          <p:childTnLst>
+            <p:seq concurrent="1" nextAc="seek">
+              <p:cTn id="2" dur="indefinite" nodeType="mainSeq">
+                <p:childTnLst>
+                  <p:par>
+                    <p:cTn id="3" fill="hold">
+                      <p:stCondLst>
+                        <p:cond delay="indefinite"/>
+                      </p:stCondLst>
+                      <p:childTnLst>
+                        <p:par>
+                          <p:cTn id="4" fill="hold">
+                            <p:stCondLst>
+                              <p:cond delay="0"/>
+                            </p:stCondLst>
+                            <p:childTnLst>
+                              <p:par>
+                                <p:cTn id="5" presetID="1" presetClass="entr" presetSubtype="0" fill="hold" nodeType="clickEffect">
+                                  <p:stCondLst>
+                                    <p:cond delay="0"/>
+                                  </p:stCondLst>
+                                  <p:childTnLst>
+                                    <p:set>
+                                      <p:cBhvr>
+                                        <p:cTn id="6" dur="1" fill="hold">
+                                          <p:stCondLst>
+                                            <p:cond delay="0"/>
+                                          </p:stCondLst>
+                                        </p:cTn>
+                                        <p:tgtEl>
+                                          <p:spTgt spid="7">
+                                            <p:txEl>
+                                              <p:pRg st="3" end="3"/>
+                                            </p:txEl>
+                                          </p:spTgt>
+                                        </p:tgtEl>
+                                        <p:attrNameLst>
+                                          <p:attrName>style.visibility</p:attrName>
+                                        </p:attrNameLst>
+                                      </p:cBhvr>
+                                      <p:to>
+                                        <p:strVal val="visible"/>
+                                      </p:to>
+                                    </p:set>
+                                  </p:childTnLst>
+                                </p:cTn>
+                              </p:par>
+                            </p:childTnLst>
+                          </p:cTn>
+                        </p:par>
+                      </p:childTnLst>
+                    </p:cTn>
+                  </p:par>
+                </p:childTnLst>
+              </p:cTn>
+              <p:prevCondLst>
+                <p:cond evt="onPrev" delay="0">
+                  <p:tgtEl>
+                    <p:sldTgt/>
+                  </p:tgtEl>
+                </p:cond>
+              </p:prevCondLst>
+              <p:nextCondLst>
+                <p:cond evt="onNext" delay="0">
+                  <p:tgtEl>
+                    <p:sldTgt/>
+                  </p:tgtEl>
+                </p:cond>
+              </p:nextCondLst>
+            </p:seq>
+          </p:childTnLst>
+        </p:cTn>
+      </p:par>
+    </p:tnLst>
+  </p:timing>
+</p:sld>
+</file>
+
+<file path=ppt/slides/slide12.xml><?xml version="1.0" encoding="utf-8"?>
+<p:sld xmlns:a="http://schemas.openxmlformats.org/drawingml/2006/main" xmlns:r="http://schemas.openxmlformats.org/officeDocument/2006/relationships" xmlns:p="http://schemas.openxmlformats.org/presentationml/2006/main">
+  <p:cSld>
+    <p:spTree>
+      <p:nvGrpSpPr>
+        <p:cNvPr id="1" name=""/>
+        <p:cNvGrpSpPr/>
+        <p:nvPr/>
+      </p:nvGrpSpPr>
+      <p:grpSpPr>
+        <a:xfrm>
+          <a:off x="0" y="0"/>
+          <a:ext cx="0" cy="0"/>
+          <a:chOff x="0" y="0"/>
+          <a:chExt cx="0" cy="0"/>
+        </a:xfrm>
+      </p:grpSpPr>
+      <p:sp>
+        <p:nvSpPr>
           <p:cNvPr id="7" name="Title 6"/>
           <p:cNvSpPr>
             <a:spLocks noGrp="1"/>
@@ -6223,7 +6939,7 @@
             <a:fld id="{55B2154A-758F-4F3D-BA88-70B68E799C5A}" type="slidenum">
               <a:rPr lang="de-DE" smtClean="0"/>
               <a:pPr/>
-              <a:t>11</a:t>
+              <a:t>12</a:t>
             </a:fld>
             <a:endParaRPr lang="de-DE" dirty="0"/>
           </a:p>
@@ -13676,41 +14392,6 @@
           </a:p>
         </p:txBody>
       </p:sp>
-      <p:pic>
-        <p:nvPicPr>
-          <p:cNvPr id="10" name="Picture 9">
-            <a:extLst>
-              <a:ext uri="{FF2B5EF4-FFF2-40B4-BE49-F238E27FC236}">
-                <a16:creationId xmlns:a16="http://schemas.microsoft.com/office/drawing/2014/main" id="{DAB5B06F-1D6B-4208-B14E-CDC38A8EB648}"/>
-              </a:ext>
-            </a:extLst>
-          </p:cNvPr>
-          <p:cNvPicPr>
-            <a:picLocks noChangeAspect="1"/>
-          </p:cNvPicPr>
-          <p:nvPr/>
-        </p:nvPicPr>
-        <p:blipFill rotWithShape="1">
-          <a:blip r:embed="rId3"/>
-          <a:srcRect l="2422" t="1566" r="2814" b="10149"/>
-          <a:stretch/>
-        </p:blipFill>
-        <p:spPr>
-          <a:xfrm>
-            <a:off x="6938197" y="2586885"/>
-            <a:ext cx="4519277" cy="3644202"/>
-          </a:xfrm>
-          <a:prstGeom prst="rect">
-            <a:avLst/>
-          </a:prstGeom>
-          <a:noFill/>
-          <a:ln w="38100">
-            <a:solidFill>
-              <a:srgbClr val="C00000"/>
-            </a:solidFill>
-          </a:ln>
-        </p:spPr>
-      </p:pic>
       <p:sp>
         <p:nvSpPr>
           <p:cNvPr id="21" name="Rectangle 20">
@@ -13762,6 +14443,42 @@
           </a:p>
         </p:txBody>
       </p:sp>
+      <p:pic>
+        <p:nvPicPr>
+          <p:cNvPr id="8" name="Picture 7">
+            <a:extLst>
+              <a:ext uri="{FF2B5EF4-FFF2-40B4-BE49-F238E27FC236}">
+                <a16:creationId xmlns:a16="http://schemas.microsoft.com/office/drawing/2014/main" id="{76AD8367-3179-4B28-898D-7F7F18CF3E61}"/>
+              </a:ext>
+            </a:extLst>
+          </p:cNvPr>
+          <p:cNvPicPr>
+            <a:picLocks noChangeAspect="1"/>
+          </p:cNvPicPr>
+          <p:nvPr/>
+        </p:nvPicPr>
+        <p:blipFill>
+          <a:blip r:embed="rId3"/>
+          <a:stretch>
+            <a:fillRect/>
+          </a:stretch>
+        </p:blipFill>
+        <p:spPr>
+          <a:xfrm>
+            <a:off x="7357205" y="2527438"/>
+            <a:ext cx="3932432" cy="3731972"/>
+          </a:xfrm>
+          <a:prstGeom prst="rect">
+            <a:avLst/>
+          </a:prstGeom>
+          <a:noFill/>
+          <a:ln w="38100">
+            <a:solidFill>
+              <a:srgbClr val="C00000"/>
+            </a:solidFill>
+          </a:ln>
+        </p:spPr>
+      </p:pic>
     </p:spTree>
     <p:extLst>
       <p:ext uri="{BB962C8B-B14F-4D97-AF65-F5344CB8AC3E}">
@@ -13805,7 +14522,7 @@
                             </p:stCondLst>
                             <p:childTnLst>
                               <p:par>
-                                <p:cTn id="5" presetID="1" presetClass="entr" presetSubtype="0" fill="hold" nodeType="clickEffect">
+                                <p:cTn id="5" presetID="1" presetClass="entr" presetSubtype="0" fill="hold" grpId="0" nodeType="clickEffect">
                                   <p:stCondLst>
                                     <p:cond delay="0"/>
                                   </p:stCondLst>
@@ -13813,51 +14530,6 @@
                                     <p:set>
                                       <p:cBhvr>
                                         <p:cTn id="6" dur="1" fill="hold">
-                                          <p:stCondLst>
-                                            <p:cond delay="0"/>
-                                          </p:stCondLst>
-                                        </p:cTn>
-                                        <p:tgtEl>
-                                          <p:spTgt spid="10"/>
-                                        </p:tgtEl>
-                                        <p:attrNameLst>
-                                          <p:attrName>style.visibility</p:attrName>
-                                        </p:attrNameLst>
-                                      </p:cBhvr>
-                                      <p:to>
-                                        <p:strVal val="visible"/>
-                                      </p:to>
-                                    </p:set>
-                                  </p:childTnLst>
-                                </p:cTn>
-                              </p:par>
-                            </p:childTnLst>
-                          </p:cTn>
-                        </p:par>
-                      </p:childTnLst>
-                    </p:cTn>
-                  </p:par>
-                  <p:par>
-                    <p:cTn id="7" fill="hold">
-                      <p:stCondLst>
-                        <p:cond delay="indefinite"/>
-                      </p:stCondLst>
-                      <p:childTnLst>
-                        <p:par>
-                          <p:cTn id="8" fill="hold">
-                            <p:stCondLst>
-                              <p:cond delay="0"/>
-                            </p:stCondLst>
-                            <p:childTnLst>
-                              <p:par>
-                                <p:cTn id="9" presetID="1" presetClass="entr" presetSubtype="0" fill="hold" grpId="0" nodeType="clickEffect">
-                                  <p:stCondLst>
-                                    <p:cond delay="0"/>
-                                  </p:stCondLst>
-                                  <p:childTnLst>
-                                    <p:set>
-                                      <p:cBhvr>
-                                        <p:cTn id="10" dur="1" fill="hold">
                                           <p:stCondLst>
                                             <p:cond delay="0"/>
                                           </p:stCondLst>

</xml_diff>

<commit_message>
Update pdf- and pptx-files
</commit_message>
<xml_diff>
--- a/assets/slides/GAMS code, modules & realizations.pptx
+++ b/assets/slides/GAMS code, modules & realizations.pptx
@@ -25,7 +25,7 @@
     <p:sldId id="264" r:id="rId13"/>
   </p:sldIdLst>
   <p:sldSz cx="12192000" cy="6858000"/>
-  <p:notesSz cx="6858000" cy="9144000"/>
+  <p:notesSz cx="6888163" cy="10020300"/>
   <p:defaultTextStyle>
     <a:defPPr>
       <a:defRPr lang="en-DE"/>
@@ -172,18 +172,18 @@
         </p:nvSpPr>
         <p:spPr>
           <a:xfrm>
-            <a:off x="0" y="0"/>
-            <a:ext cx="2971800" cy="458788"/>
+            <a:off x="1" y="1"/>
+            <a:ext cx="2984871" cy="502755"/>
           </a:xfrm>
           <a:prstGeom prst="rect">
             <a:avLst/>
           </a:prstGeom>
         </p:spPr>
         <p:txBody>
-          <a:bodyPr vert="horz" lIns="91440" tIns="45720" rIns="91440" bIns="45720" rtlCol="0"/>
+          <a:bodyPr vert="horz" lIns="96616" tIns="48308" rIns="96616" bIns="48308" rtlCol="0"/>
           <a:lstStyle>
             <a:lvl1pPr algn="l">
-              <a:defRPr sz="1200"/>
+              <a:defRPr sz="1300"/>
             </a:lvl1pPr>
           </a:lstStyle>
           <a:p>
@@ -209,24 +209,24 @@
         </p:nvSpPr>
         <p:spPr>
           <a:xfrm>
-            <a:off x="3884613" y="0"/>
-            <a:ext cx="2971800" cy="458788"/>
+            <a:off x="3901699" y="1"/>
+            <a:ext cx="2984871" cy="502755"/>
           </a:xfrm>
           <a:prstGeom prst="rect">
             <a:avLst/>
           </a:prstGeom>
         </p:spPr>
         <p:txBody>
-          <a:bodyPr vert="horz" lIns="91440" tIns="45720" rIns="91440" bIns="45720" rtlCol="0"/>
+          <a:bodyPr vert="horz" lIns="96616" tIns="48308" rIns="96616" bIns="48308" rtlCol="0"/>
           <a:lstStyle>
             <a:lvl1pPr algn="r">
-              <a:defRPr sz="1200"/>
+              <a:defRPr sz="1300"/>
             </a:lvl1pPr>
           </a:lstStyle>
           <a:p>
             <a:fld id="{FF82B2F4-7748-42CC-9666-B2A9A5CB98C2}" type="datetimeFigureOut">
               <a:rPr lang="en-DE" smtClean="0"/>
-              <a:t>08/04/2024</a:t>
+              <a:t>14 Jun 2025</a:t>
             </a:fld>
             <a:endParaRPr lang="en-DE"/>
           </a:p>
@@ -250,18 +250,18 @@
         </p:nvSpPr>
         <p:spPr>
           <a:xfrm>
-            <a:off x="0" y="8685213"/>
-            <a:ext cx="2971800" cy="458787"/>
+            <a:off x="1" y="9517547"/>
+            <a:ext cx="2984871" cy="502755"/>
           </a:xfrm>
           <a:prstGeom prst="rect">
             <a:avLst/>
           </a:prstGeom>
         </p:spPr>
         <p:txBody>
-          <a:bodyPr vert="horz" lIns="91440" tIns="45720" rIns="91440" bIns="45720" rtlCol="0" anchor="b"/>
+          <a:bodyPr vert="horz" lIns="96616" tIns="48308" rIns="96616" bIns="48308" rtlCol="0" anchor="b"/>
           <a:lstStyle>
             <a:lvl1pPr algn="l">
-              <a:defRPr sz="1200"/>
+              <a:defRPr sz="1300"/>
             </a:lvl1pPr>
           </a:lstStyle>
           <a:p>
@@ -314,18 +314,18 @@
         </p:nvSpPr>
         <p:spPr>
           <a:xfrm>
-            <a:off x="0" y="0"/>
-            <a:ext cx="2971800" cy="458788"/>
+            <a:off x="1" y="1"/>
+            <a:ext cx="2984871" cy="502755"/>
           </a:xfrm>
           <a:prstGeom prst="rect">
             <a:avLst/>
           </a:prstGeom>
         </p:spPr>
         <p:txBody>
-          <a:bodyPr vert="horz" lIns="91440" tIns="45720" rIns="91440" bIns="45720" rtlCol="0"/>
+          <a:bodyPr vert="horz" lIns="96616" tIns="48308" rIns="96616" bIns="48308" rtlCol="0"/>
           <a:lstStyle>
             <a:lvl1pPr algn="l">
-              <a:defRPr sz="1200"/>
+              <a:defRPr sz="1300"/>
             </a:lvl1pPr>
           </a:lstStyle>
           <a:p>
@@ -345,24 +345,24 @@
         </p:nvSpPr>
         <p:spPr>
           <a:xfrm>
-            <a:off x="3884613" y="0"/>
-            <a:ext cx="2971800" cy="458788"/>
+            <a:off x="3901699" y="1"/>
+            <a:ext cx="2984871" cy="502755"/>
           </a:xfrm>
           <a:prstGeom prst="rect">
             <a:avLst/>
           </a:prstGeom>
         </p:spPr>
         <p:txBody>
-          <a:bodyPr vert="horz" lIns="91440" tIns="45720" rIns="91440" bIns="45720" rtlCol="0"/>
+          <a:bodyPr vert="horz" lIns="96616" tIns="48308" rIns="96616" bIns="48308" rtlCol="0"/>
           <a:lstStyle>
             <a:lvl1pPr algn="r">
-              <a:defRPr sz="1200"/>
+              <a:defRPr sz="1300"/>
             </a:lvl1pPr>
           </a:lstStyle>
           <a:p>
             <a:fld id="{68F8FAD1-4573-4756-A12F-73F1310CA974}" type="datetimeFigureOut">
               <a:rPr lang="en-DE" smtClean="0"/>
-              <a:t>08/04/2024</a:t>
+              <a:t>14 Jun 2025</a:t>
             </a:fld>
             <a:endParaRPr lang="en-DE"/>
           </a:p>
@@ -380,8 +380,8 @@
         </p:nvSpPr>
         <p:spPr>
           <a:xfrm>
-            <a:off x="685800" y="1143000"/>
-            <a:ext cx="5486400" cy="3086100"/>
+            <a:off x="436563" y="1250950"/>
+            <a:ext cx="6015037" cy="3384550"/>
           </a:xfrm>
           <a:prstGeom prst="rect">
             <a:avLst/>
@@ -394,7 +394,7 @@
           </a:ln>
         </p:spPr>
         <p:txBody>
-          <a:bodyPr vert="horz" lIns="91440" tIns="45720" rIns="91440" bIns="45720" rtlCol="0" anchor="ctr"/>
+          <a:bodyPr vert="horz" lIns="96616" tIns="48308" rIns="96616" bIns="48308" rtlCol="0" anchor="ctr"/>
           <a:lstStyle/>
           <a:p>
             <a:endParaRPr lang="en-DE"/>
@@ -413,15 +413,15 @@
         </p:nvSpPr>
         <p:spPr>
           <a:xfrm>
-            <a:off x="685800" y="4400550"/>
-            <a:ext cx="5486400" cy="3600450"/>
+            <a:off x="688817" y="4822270"/>
+            <a:ext cx="5510530" cy="3945494"/>
           </a:xfrm>
           <a:prstGeom prst="rect">
             <a:avLst/>
           </a:prstGeom>
         </p:spPr>
         <p:txBody>
-          <a:bodyPr vert="horz" lIns="91440" tIns="45720" rIns="91440" bIns="45720" rtlCol="0"/>
+          <a:bodyPr vert="horz" lIns="96616" tIns="48308" rIns="96616" bIns="48308" rtlCol="0"/>
           <a:lstStyle/>
           <a:p>
             <a:pPr lvl="0"/>
@@ -473,18 +473,18 @@
         </p:nvSpPr>
         <p:spPr>
           <a:xfrm>
-            <a:off x="0" y="8685213"/>
-            <a:ext cx="2971800" cy="458787"/>
+            <a:off x="1" y="9517547"/>
+            <a:ext cx="2984871" cy="502755"/>
           </a:xfrm>
           <a:prstGeom prst="rect">
             <a:avLst/>
           </a:prstGeom>
         </p:spPr>
         <p:txBody>
-          <a:bodyPr vert="horz" lIns="91440" tIns="45720" rIns="91440" bIns="45720" rtlCol="0" anchor="b"/>
+          <a:bodyPr vert="horz" lIns="96616" tIns="48308" rIns="96616" bIns="48308" rtlCol="0" anchor="b"/>
           <a:lstStyle>
             <a:lvl1pPr algn="l">
-              <a:defRPr sz="1200"/>
+              <a:defRPr sz="1300"/>
             </a:lvl1pPr>
           </a:lstStyle>
           <a:p>
@@ -504,18 +504,18 @@
         </p:nvSpPr>
         <p:spPr>
           <a:xfrm>
-            <a:off x="3884613" y="8685213"/>
-            <a:ext cx="2971800" cy="458787"/>
+            <a:off x="3901699" y="9517547"/>
+            <a:ext cx="2984871" cy="502755"/>
           </a:xfrm>
           <a:prstGeom prst="rect">
             <a:avLst/>
           </a:prstGeom>
         </p:spPr>
         <p:txBody>
-          <a:bodyPr vert="horz" lIns="91440" tIns="45720" rIns="91440" bIns="45720" rtlCol="0" anchor="b"/>
+          <a:bodyPr vert="horz" lIns="96616" tIns="48308" rIns="96616" bIns="48308" rtlCol="0" anchor="b"/>
           <a:lstStyle>
             <a:lvl1pPr algn="r">
-              <a:defRPr sz="1200"/>
+              <a:defRPr sz="1300"/>
             </a:lvl1pPr>
           </a:lstStyle>
           <a:p>
@@ -630,6 +630,426 @@
 </p:notesMaster>
 </file>
 
+<file path=ppt/notesSlides/notesSlide1.xml><?xml version="1.0" encoding="utf-8"?>
+<p:notes xmlns:a="http://schemas.openxmlformats.org/drawingml/2006/main" xmlns:r="http://schemas.openxmlformats.org/officeDocument/2006/relationships" xmlns:p="http://schemas.openxmlformats.org/presentationml/2006/main">
+  <p:cSld>
+    <p:spTree>
+      <p:nvGrpSpPr>
+        <p:cNvPr id="1" name=""/>
+        <p:cNvGrpSpPr/>
+        <p:nvPr/>
+      </p:nvGrpSpPr>
+      <p:grpSpPr>
+        <a:xfrm>
+          <a:off x="0" y="0"/>
+          <a:ext cx="0" cy="0"/>
+          <a:chOff x="0" y="0"/>
+          <a:chExt cx="0" cy="0"/>
+        </a:xfrm>
+      </p:grpSpPr>
+      <p:sp>
+        <p:nvSpPr>
+          <p:cNvPr id="2" name="Slide Image Placeholder 1"/>
+          <p:cNvSpPr>
+            <a:spLocks noGrp="1" noRot="1" noChangeAspect="1"/>
+          </p:cNvSpPr>
+          <p:nvPr>
+            <p:ph type="sldImg"/>
+          </p:nvPr>
+        </p:nvSpPr>
+        <p:spPr/>
+      </p:sp>
+      <p:sp>
+        <p:nvSpPr>
+          <p:cNvPr id="3" name="Notes Placeholder 2"/>
+          <p:cNvSpPr>
+            <a:spLocks noGrp="1"/>
+          </p:cNvSpPr>
+          <p:nvPr>
+            <p:ph type="body" idx="1"/>
+          </p:nvPr>
+        </p:nvSpPr>
+        <p:spPr/>
+        <p:txBody>
+          <a:bodyPr/>
+          <a:lstStyle/>
+          <a:p>
+            <a:endParaRPr lang="en-DE" dirty="0"/>
+          </a:p>
+        </p:txBody>
+      </p:sp>
+      <p:sp>
+        <p:nvSpPr>
+          <p:cNvPr id="4" name="Slide Number Placeholder 3"/>
+          <p:cNvSpPr>
+            <a:spLocks noGrp="1"/>
+          </p:cNvSpPr>
+          <p:nvPr>
+            <p:ph type="sldNum" sz="quarter" idx="5"/>
+          </p:nvPr>
+        </p:nvSpPr>
+        <p:spPr/>
+        <p:txBody>
+          <a:bodyPr/>
+          <a:lstStyle/>
+          <a:p>
+            <a:fld id="{9200DD5E-38F3-4021-BB8A-F5D2D445ACDA}" type="slidenum">
+              <a:rPr lang="en-DE" smtClean="0"/>
+              <a:t>3</a:t>
+            </a:fld>
+            <a:endParaRPr lang="en-DE"/>
+          </a:p>
+        </p:txBody>
+      </p:sp>
+    </p:spTree>
+    <p:extLst>
+      <p:ext uri="{BB962C8B-B14F-4D97-AF65-F5344CB8AC3E}">
+        <p14:creationId xmlns:p14="http://schemas.microsoft.com/office/powerpoint/2010/main" val="3535760707"/>
+      </p:ext>
+    </p:extLst>
+  </p:cSld>
+  <p:clrMapOvr>
+    <a:masterClrMapping/>
+  </p:clrMapOvr>
+</p:notes>
+</file>
+
+<file path=ppt/notesSlides/notesSlide2.xml><?xml version="1.0" encoding="utf-8"?>
+<p:notes xmlns:a="http://schemas.openxmlformats.org/drawingml/2006/main" xmlns:r="http://schemas.openxmlformats.org/officeDocument/2006/relationships" xmlns:p="http://schemas.openxmlformats.org/presentationml/2006/main">
+  <p:cSld>
+    <p:spTree>
+      <p:nvGrpSpPr>
+        <p:cNvPr id="1" name=""/>
+        <p:cNvGrpSpPr/>
+        <p:nvPr/>
+      </p:nvGrpSpPr>
+      <p:grpSpPr>
+        <a:xfrm>
+          <a:off x="0" y="0"/>
+          <a:ext cx="0" cy="0"/>
+          <a:chOff x="0" y="0"/>
+          <a:chExt cx="0" cy="0"/>
+        </a:xfrm>
+      </p:grpSpPr>
+      <p:sp>
+        <p:nvSpPr>
+          <p:cNvPr id="2" name="Slide Image Placeholder 1"/>
+          <p:cNvSpPr>
+            <a:spLocks noGrp="1" noRot="1" noChangeAspect="1"/>
+          </p:cNvSpPr>
+          <p:nvPr>
+            <p:ph type="sldImg"/>
+          </p:nvPr>
+        </p:nvSpPr>
+        <p:spPr/>
+      </p:sp>
+      <p:sp>
+        <p:nvSpPr>
+          <p:cNvPr id="3" name="Notes Placeholder 2"/>
+          <p:cNvSpPr>
+            <a:spLocks noGrp="1"/>
+          </p:cNvSpPr>
+          <p:nvPr>
+            <p:ph type="body" idx="1"/>
+          </p:nvPr>
+        </p:nvSpPr>
+        <p:spPr/>
+        <p:txBody>
+          <a:bodyPr/>
+          <a:lstStyle/>
+          <a:p>
+            <a:endParaRPr lang="en-DE" dirty="0"/>
+          </a:p>
+        </p:txBody>
+      </p:sp>
+      <p:sp>
+        <p:nvSpPr>
+          <p:cNvPr id="4" name="Slide Number Placeholder 3"/>
+          <p:cNvSpPr>
+            <a:spLocks noGrp="1"/>
+          </p:cNvSpPr>
+          <p:nvPr>
+            <p:ph type="sldNum" sz="quarter" idx="5"/>
+          </p:nvPr>
+        </p:nvSpPr>
+        <p:spPr/>
+        <p:txBody>
+          <a:bodyPr/>
+          <a:lstStyle/>
+          <a:p>
+            <a:fld id="{9200DD5E-38F3-4021-BB8A-F5D2D445ACDA}" type="slidenum">
+              <a:rPr lang="en-DE" smtClean="0"/>
+              <a:t>4</a:t>
+            </a:fld>
+            <a:endParaRPr lang="en-DE"/>
+          </a:p>
+        </p:txBody>
+      </p:sp>
+    </p:spTree>
+    <p:extLst>
+      <p:ext uri="{BB962C8B-B14F-4D97-AF65-F5344CB8AC3E}">
+        <p14:creationId xmlns:p14="http://schemas.microsoft.com/office/powerpoint/2010/main" val="3673071180"/>
+      </p:ext>
+    </p:extLst>
+  </p:cSld>
+  <p:clrMapOvr>
+    <a:masterClrMapping/>
+  </p:clrMapOvr>
+</p:notes>
+</file>
+
+<file path=ppt/notesSlides/notesSlide3.xml><?xml version="1.0" encoding="utf-8"?>
+<p:notes xmlns:a="http://schemas.openxmlformats.org/drawingml/2006/main" xmlns:r="http://schemas.openxmlformats.org/officeDocument/2006/relationships" xmlns:p="http://schemas.openxmlformats.org/presentationml/2006/main">
+  <p:cSld>
+    <p:spTree>
+      <p:nvGrpSpPr>
+        <p:cNvPr id="1" name=""/>
+        <p:cNvGrpSpPr/>
+        <p:nvPr/>
+      </p:nvGrpSpPr>
+      <p:grpSpPr>
+        <a:xfrm>
+          <a:off x="0" y="0"/>
+          <a:ext cx="0" cy="0"/>
+          <a:chOff x="0" y="0"/>
+          <a:chExt cx="0" cy="0"/>
+        </a:xfrm>
+      </p:grpSpPr>
+      <p:sp>
+        <p:nvSpPr>
+          <p:cNvPr id="2" name="Slide Image Placeholder 1"/>
+          <p:cNvSpPr>
+            <a:spLocks noGrp="1" noRot="1" noChangeAspect="1"/>
+          </p:cNvSpPr>
+          <p:nvPr>
+            <p:ph type="sldImg"/>
+          </p:nvPr>
+        </p:nvSpPr>
+        <p:spPr/>
+      </p:sp>
+      <p:sp>
+        <p:nvSpPr>
+          <p:cNvPr id="3" name="Notes Placeholder 2"/>
+          <p:cNvSpPr>
+            <a:spLocks noGrp="1"/>
+          </p:cNvSpPr>
+          <p:nvPr>
+            <p:ph type="body" idx="1"/>
+          </p:nvPr>
+        </p:nvSpPr>
+        <p:spPr/>
+        <p:txBody>
+          <a:bodyPr/>
+          <a:lstStyle/>
+          <a:p>
+            <a:endParaRPr lang="en-DE" dirty="0"/>
+          </a:p>
+        </p:txBody>
+      </p:sp>
+      <p:sp>
+        <p:nvSpPr>
+          <p:cNvPr id="4" name="Slide Number Placeholder 3"/>
+          <p:cNvSpPr>
+            <a:spLocks noGrp="1"/>
+          </p:cNvSpPr>
+          <p:nvPr>
+            <p:ph type="sldNum" sz="quarter" idx="5"/>
+          </p:nvPr>
+        </p:nvSpPr>
+        <p:spPr/>
+        <p:txBody>
+          <a:bodyPr/>
+          <a:lstStyle/>
+          <a:p>
+            <a:fld id="{9200DD5E-38F3-4021-BB8A-F5D2D445ACDA}" type="slidenum">
+              <a:rPr lang="en-DE" smtClean="0"/>
+              <a:t>5</a:t>
+            </a:fld>
+            <a:endParaRPr lang="en-DE"/>
+          </a:p>
+        </p:txBody>
+      </p:sp>
+    </p:spTree>
+    <p:extLst>
+      <p:ext uri="{BB962C8B-B14F-4D97-AF65-F5344CB8AC3E}">
+        <p14:creationId xmlns:p14="http://schemas.microsoft.com/office/powerpoint/2010/main" val="246968943"/>
+      </p:ext>
+    </p:extLst>
+  </p:cSld>
+  <p:clrMapOvr>
+    <a:masterClrMapping/>
+  </p:clrMapOvr>
+</p:notes>
+</file>
+
+<file path=ppt/notesSlides/notesSlide4.xml><?xml version="1.0" encoding="utf-8"?>
+<p:notes xmlns:a="http://schemas.openxmlformats.org/drawingml/2006/main" xmlns:r="http://schemas.openxmlformats.org/officeDocument/2006/relationships" xmlns:p="http://schemas.openxmlformats.org/presentationml/2006/main">
+  <p:cSld>
+    <p:spTree>
+      <p:nvGrpSpPr>
+        <p:cNvPr id="1" name=""/>
+        <p:cNvGrpSpPr/>
+        <p:nvPr/>
+      </p:nvGrpSpPr>
+      <p:grpSpPr>
+        <a:xfrm>
+          <a:off x="0" y="0"/>
+          <a:ext cx="0" cy="0"/>
+          <a:chOff x="0" y="0"/>
+          <a:chExt cx="0" cy="0"/>
+        </a:xfrm>
+      </p:grpSpPr>
+      <p:sp>
+        <p:nvSpPr>
+          <p:cNvPr id="2" name="Slide Image Placeholder 1"/>
+          <p:cNvSpPr>
+            <a:spLocks noGrp="1" noRot="1" noChangeAspect="1"/>
+          </p:cNvSpPr>
+          <p:nvPr>
+            <p:ph type="sldImg"/>
+          </p:nvPr>
+        </p:nvSpPr>
+        <p:spPr/>
+      </p:sp>
+      <p:sp>
+        <p:nvSpPr>
+          <p:cNvPr id="3" name="Notes Placeholder 2"/>
+          <p:cNvSpPr>
+            <a:spLocks noGrp="1"/>
+          </p:cNvSpPr>
+          <p:nvPr>
+            <p:ph type="body" idx="1"/>
+          </p:nvPr>
+        </p:nvSpPr>
+        <p:spPr/>
+        <p:txBody>
+          <a:bodyPr/>
+          <a:lstStyle/>
+          <a:p>
+            <a:endParaRPr lang="en-DE" dirty="0"/>
+          </a:p>
+        </p:txBody>
+      </p:sp>
+      <p:sp>
+        <p:nvSpPr>
+          <p:cNvPr id="4" name="Slide Number Placeholder 3"/>
+          <p:cNvSpPr>
+            <a:spLocks noGrp="1"/>
+          </p:cNvSpPr>
+          <p:nvPr>
+            <p:ph type="sldNum" sz="quarter" idx="5"/>
+          </p:nvPr>
+        </p:nvSpPr>
+        <p:spPr/>
+        <p:txBody>
+          <a:bodyPr/>
+          <a:lstStyle/>
+          <a:p>
+            <a:fld id="{9200DD5E-38F3-4021-BB8A-F5D2D445ACDA}" type="slidenum">
+              <a:rPr lang="en-DE" smtClean="0"/>
+              <a:t>6</a:t>
+            </a:fld>
+            <a:endParaRPr lang="en-DE"/>
+          </a:p>
+        </p:txBody>
+      </p:sp>
+    </p:spTree>
+    <p:extLst>
+      <p:ext uri="{BB962C8B-B14F-4D97-AF65-F5344CB8AC3E}">
+        <p14:creationId xmlns:p14="http://schemas.microsoft.com/office/powerpoint/2010/main" val="4004977166"/>
+      </p:ext>
+    </p:extLst>
+  </p:cSld>
+  <p:clrMapOvr>
+    <a:masterClrMapping/>
+  </p:clrMapOvr>
+</p:notes>
+</file>
+
+<file path=ppt/notesSlides/notesSlide5.xml><?xml version="1.0" encoding="utf-8"?>
+<p:notes xmlns:a="http://schemas.openxmlformats.org/drawingml/2006/main" xmlns:r="http://schemas.openxmlformats.org/officeDocument/2006/relationships" xmlns:p="http://schemas.openxmlformats.org/presentationml/2006/main">
+  <p:cSld>
+    <p:spTree>
+      <p:nvGrpSpPr>
+        <p:cNvPr id="1" name=""/>
+        <p:cNvGrpSpPr/>
+        <p:nvPr/>
+      </p:nvGrpSpPr>
+      <p:grpSpPr>
+        <a:xfrm>
+          <a:off x="0" y="0"/>
+          <a:ext cx="0" cy="0"/>
+          <a:chOff x="0" y="0"/>
+          <a:chExt cx="0" cy="0"/>
+        </a:xfrm>
+      </p:grpSpPr>
+      <p:sp>
+        <p:nvSpPr>
+          <p:cNvPr id="2" name="Slide Image Placeholder 1"/>
+          <p:cNvSpPr>
+            <a:spLocks noGrp="1" noRot="1" noChangeAspect="1"/>
+          </p:cNvSpPr>
+          <p:nvPr>
+            <p:ph type="sldImg"/>
+          </p:nvPr>
+        </p:nvSpPr>
+        <p:spPr/>
+      </p:sp>
+      <p:sp>
+        <p:nvSpPr>
+          <p:cNvPr id="3" name="Notes Placeholder 2"/>
+          <p:cNvSpPr>
+            <a:spLocks noGrp="1"/>
+          </p:cNvSpPr>
+          <p:nvPr>
+            <p:ph type="body" idx="1"/>
+          </p:nvPr>
+        </p:nvSpPr>
+        <p:spPr/>
+        <p:txBody>
+          <a:bodyPr/>
+          <a:lstStyle/>
+          <a:p>
+            <a:endParaRPr lang="en-DE" dirty="0"/>
+          </a:p>
+        </p:txBody>
+      </p:sp>
+      <p:sp>
+        <p:nvSpPr>
+          <p:cNvPr id="4" name="Slide Number Placeholder 3"/>
+          <p:cNvSpPr>
+            <a:spLocks noGrp="1"/>
+          </p:cNvSpPr>
+          <p:nvPr>
+            <p:ph type="sldNum" sz="quarter" idx="5"/>
+          </p:nvPr>
+        </p:nvSpPr>
+        <p:spPr/>
+        <p:txBody>
+          <a:bodyPr/>
+          <a:lstStyle/>
+          <a:p>
+            <a:fld id="{9200DD5E-38F3-4021-BB8A-F5D2D445ACDA}" type="slidenum">
+              <a:rPr lang="en-DE" smtClean="0"/>
+              <a:t>7</a:t>
+            </a:fld>
+            <a:endParaRPr lang="en-DE"/>
+          </a:p>
+        </p:txBody>
+      </p:sp>
+    </p:spTree>
+    <p:extLst>
+      <p:ext uri="{BB962C8B-B14F-4D97-AF65-F5344CB8AC3E}">
+        <p14:creationId xmlns:p14="http://schemas.microsoft.com/office/powerpoint/2010/main" val="2566245906"/>
+      </p:ext>
+    </p:extLst>
+  </p:cSld>
+  <p:clrMapOvr>
+    <a:masterClrMapping/>
+  </p:clrMapOvr>
+</p:notes>
+</file>
+
 <file path=ppt/slideLayouts/slideLayout1.xml><?xml version="1.0" encoding="utf-8"?>
 <p:sldLayout xmlns:a="http://schemas.openxmlformats.org/drawingml/2006/main" xmlns:r="http://schemas.openxmlformats.org/officeDocument/2006/relationships" xmlns:p="http://schemas.openxmlformats.org/presentationml/2006/main" type="title" preserve="1">
   <p:cSld name="Title Slide">
@@ -779,7 +1199,7 @@
           <a:p>
             <a:r>
               <a:rPr lang="en-DE"/>
-              <a:t>10.04.2024</a:t>
+              <a:t>16.06.2025</a:t>
             </a:r>
           </a:p>
         </p:txBody>
@@ -807,7 +1227,7 @@
           <a:p>
             <a:r>
               <a:rPr lang="en-US"/>
-              <a:t>MAgPIE24 Workshop &amp; Stories </a:t>
+              <a:t>MAgPIE25 Workshop &amp; Stories </a:t>
             </a:r>
             <a:endParaRPr lang="en-DE"/>
           </a:p>
@@ -982,7 +1402,7 @@
           <a:p>
             <a:r>
               <a:rPr lang="en-DE"/>
-              <a:t>10.04.2024</a:t>
+              <a:t>16.06.2025</a:t>
             </a:r>
           </a:p>
         </p:txBody>
@@ -1010,7 +1430,7 @@
           <a:p>
             <a:r>
               <a:rPr lang="en-US"/>
-              <a:t>MAgPIE24 Workshop &amp; Stories </a:t>
+              <a:t>MAgPIE25 Workshop &amp; Stories </a:t>
             </a:r>
             <a:endParaRPr lang="en-DE"/>
           </a:p>
@@ -1195,7 +1615,7 @@
           <a:p>
             <a:r>
               <a:rPr lang="en-DE"/>
-              <a:t>10.04.2024</a:t>
+              <a:t>16.06.2025</a:t>
             </a:r>
           </a:p>
         </p:txBody>
@@ -1223,7 +1643,7 @@
           <a:p>
             <a:r>
               <a:rPr lang="en-US"/>
-              <a:t>MAgPIE24 Workshop &amp; Stories </a:t>
+              <a:t>MAgPIE25 Workshop &amp; Stories </a:t>
             </a:r>
             <a:endParaRPr lang="en-DE"/>
           </a:p>
@@ -1972,7 +2392,7 @@
           <a:p>
             <a:r>
               <a:rPr lang="en-DE"/>
-              <a:t>10.04.2024</a:t>
+              <a:t>16.06.2025</a:t>
             </a:r>
           </a:p>
         </p:txBody>
@@ -2000,7 +2420,7 @@
           <a:p>
             <a:r>
               <a:rPr lang="en-US"/>
-              <a:t>MAgPIE24 Workshop &amp; Stories </a:t>
+              <a:t>MAgPIE25 Workshop &amp; Stories </a:t>
             </a:r>
             <a:endParaRPr lang="en-DE"/>
           </a:p>
@@ -2389,7 +2809,7 @@
           <a:p>
             <a:r>
               <a:rPr lang="en-DE"/>
-              <a:t>10.04.2024</a:t>
+              <a:t>16.06.2025</a:t>
             </a:r>
           </a:p>
         </p:txBody>
@@ -2422,7 +2842,7 @@
           <a:p>
             <a:r>
               <a:rPr lang="en-US"/>
-              <a:t>MAgPIE24 Workshop &amp; Stories </a:t>
+              <a:t>MAgPIE25 Workshop &amp; Stories </a:t>
             </a:r>
             <a:endParaRPr lang="en-DE"/>
           </a:p>
@@ -2614,7 +3034,7 @@
           <a:p>
             <a:r>
               <a:rPr lang="en-DE"/>
-              <a:t>10.04.2024</a:t>
+              <a:t>16.06.2025</a:t>
             </a:r>
           </a:p>
         </p:txBody>
@@ -2642,7 +3062,7 @@
           <a:p>
             <a:r>
               <a:rPr lang="en-US"/>
-              <a:t>MAgPIE24 Workshop &amp; Stories </a:t>
+              <a:t>MAgPIE25 Workshop &amp; Stories </a:t>
             </a:r>
             <a:endParaRPr lang="en-DE"/>
           </a:p>
@@ -2893,7 +3313,7 @@
           <a:p>
             <a:r>
               <a:rPr lang="en-DE"/>
-              <a:t>10.04.2024</a:t>
+              <a:t>16.06.2025</a:t>
             </a:r>
           </a:p>
         </p:txBody>
@@ -2921,7 +3341,7 @@
           <a:p>
             <a:r>
               <a:rPr lang="en-US"/>
-              <a:t>MAgPIE24 Workshop &amp; Stories </a:t>
+              <a:t>MAgPIE25 Workshop &amp; Stories </a:t>
             </a:r>
             <a:endParaRPr lang="en-DE"/>
           </a:p>
@@ -3164,7 +3584,7 @@
           <a:p>
             <a:r>
               <a:rPr lang="en-DE"/>
-              <a:t>10.04.2024</a:t>
+              <a:t>16.06.2025</a:t>
             </a:r>
           </a:p>
         </p:txBody>
@@ -3192,7 +3612,7 @@
           <a:p>
             <a:r>
               <a:rPr lang="en-US"/>
-              <a:t>MAgPIE24 Workshop &amp; Stories </a:t>
+              <a:t>MAgPIE25 Workshop &amp; Stories </a:t>
             </a:r>
             <a:endParaRPr lang="en-DE"/>
           </a:p>
@@ -3582,7 +4002,7 @@
           <a:p>
             <a:r>
               <a:rPr lang="en-DE"/>
-              <a:t>10.04.2024</a:t>
+              <a:t>16.06.2025</a:t>
             </a:r>
           </a:p>
         </p:txBody>
@@ -3610,7 +4030,7 @@
           <a:p>
             <a:r>
               <a:rPr lang="en-US"/>
-              <a:t>MAgPIE24 Workshop &amp; Stories </a:t>
+              <a:t>MAgPIE25 Workshop &amp; Stories </a:t>
             </a:r>
             <a:endParaRPr lang="en-DE"/>
           </a:p>
@@ -3727,7 +4147,7 @@
           <a:p>
             <a:r>
               <a:rPr lang="en-DE"/>
-              <a:t>10.04.2024</a:t>
+              <a:t>16.06.2025</a:t>
             </a:r>
           </a:p>
         </p:txBody>
@@ -3755,7 +4175,7 @@
           <a:p>
             <a:r>
               <a:rPr lang="en-US"/>
-              <a:t>MAgPIE24 Workshop &amp; Stories </a:t>
+              <a:t>MAgPIE25 Workshop &amp; Stories </a:t>
             </a:r>
             <a:endParaRPr lang="en-DE"/>
           </a:p>
@@ -3843,7 +4263,7 @@
           <a:p>
             <a:r>
               <a:rPr lang="en-DE"/>
-              <a:t>10.04.2024</a:t>
+              <a:t>16.06.2025</a:t>
             </a:r>
           </a:p>
         </p:txBody>
@@ -3871,7 +4291,7 @@
           <a:p>
             <a:r>
               <a:rPr lang="en-US"/>
-              <a:t>MAgPIE24 Workshop &amp; Stories </a:t>
+              <a:t>MAgPIE25 Workshop &amp; Stories </a:t>
             </a:r>
             <a:endParaRPr lang="en-DE"/>
           </a:p>
@@ -4159,7 +4579,7 @@
           <a:p>
             <a:r>
               <a:rPr lang="en-DE"/>
-              <a:t>10.04.2024</a:t>
+              <a:t>16.06.2025</a:t>
             </a:r>
           </a:p>
         </p:txBody>
@@ -4187,7 +4607,7 @@
           <a:p>
             <a:r>
               <a:rPr lang="en-US"/>
-              <a:t>MAgPIE24 Workshop &amp; Stories </a:t>
+              <a:t>MAgPIE25 Workshop &amp; Stories </a:t>
             </a:r>
             <a:endParaRPr lang="en-DE"/>
           </a:p>
@@ -4451,7 +4871,7 @@
           <a:p>
             <a:r>
               <a:rPr lang="en-DE"/>
-              <a:t>10.04.2024</a:t>
+              <a:t>16.06.2025</a:t>
             </a:r>
           </a:p>
         </p:txBody>
@@ -4479,7 +4899,7 @@
           <a:p>
             <a:r>
               <a:rPr lang="en-US"/>
-              <a:t>MAgPIE24 Workshop &amp; Stories </a:t>
+              <a:t>MAgPIE25 Workshop &amp; Stories </a:t>
             </a:r>
             <a:endParaRPr lang="en-DE"/>
           </a:p>
@@ -4697,7 +5117,7 @@
           <a:p>
             <a:r>
               <a:rPr lang="en-DE"/>
-              <a:t>10.04.2024</a:t>
+              <a:t>16.06.2025</a:t>
             </a:r>
             <a:endParaRPr lang="en-DE" dirty="0"/>
           </a:p>
@@ -4744,7 +5164,7 @@
           <a:p>
             <a:r>
               <a:rPr lang="en-US"/>
-              <a:t>MAgPIE24 Workshop &amp; Stories </a:t>
+              <a:t>MAgPIE25 Workshop &amp; Stories </a:t>
             </a:r>
             <a:endParaRPr lang="en-DE"/>
           </a:p>
@@ -5265,19 +5685,48 @@
             </a:r>
             <a:r>
               <a:rPr lang="en-US" dirty="0"/>
-              <a:t> Edna J. Molina Bacca</a:t>
-            </a:r>
-          </a:p>
-          <a:p>
+              <a:t> </a:t>
+            </a:r>
+            <a:r>
+              <a:rPr lang="en-DE" dirty="0"/>
+              <a:t>Isabelle Weindl</a:t>
+            </a:r>
+            <a:endParaRPr lang="en-US" dirty="0"/>
+          </a:p>
+          <a:p>
+            <a:r>
+              <a:rPr lang="en-DE" dirty="0" err="1"/>
+              <a:t>weindl</a:t>
+            </a:r>
             <a:r>
               <a:rPr lang="en-US" dirty="0"/>
-              <a:t>mbacca@pik-potsdam.de</a:t>
-            </a:r>
-          </a:p>
-          <a:p>
+              <a:t>@pik-potsdam.de</a:t>
+            </a:r>
+          </a:p>
+          <a:p>
+            <a:r>
+              <a:rPr lang="en-DE" dirty="0"/>
+              <a:t>June</a:t>
+            </a:r>
             <a:r>
               <a:rPr lang="en-US" dirty="0"/>
-              <a:t>April 10th, 2024 </a:t>
+              <a:t> 1</a:t>
+            </a:r>
+            <a:r>
+              <a:rPr lang="en-DE" dirty="0"/>
+              <a:t>6</a:t>
+            </a:r>
+            <a:r>
+              <a:rPr lang="en-US" dirty="0"/>
+              <a:t>, 202</a:t>
+            </a:r>
+            <a:r>
+              <a:rPr lang="en-DE" dirty="0"/>
+              <a:t>5</a:t>
+            </a:r>
+            <a:r>
+              <a:rPr lang="en-US" dirty="0"/>
+              <a:t> </a:t>
             </a:r>
             <a:endParaRPr lang="de-DE" dirty="0"/>
           </a:p>
@@ -5361,7 +5810,39 @@
             </a:pPr>
             <a:r>
               <a:rPr lang="en-US" sz="2800" dirty="0"/>
-              <a:t>Once you have started a magpie run, in the </a:t>
+              <a:t>Once you have started a magpie run, you</a:t>
+            </a:r>
+            <a:r>
+              <a:rPr lang="en-DE" sz="2800" dirty="0"/>
+              <a:t> </a:t>
+            </a:r>
+            <a:r>
+              <a:rPr lang="en-US" sz="2800" dirty="0"/>
+              <a:t>c</a:t>
+            </a:r>
+            <a:r>
+              <a:rPr lang="en-DE" sz="2800" dirty="0"/>
+              <a:t>a</a:t>
+            </a:r>
+            <a:r>
+              <a:rPr lang="en-US" sz="2800" dirty="0"/>
+              <a:t>n find the </a:t>
+            </a:r>
+            <a:r>
+              <a:rPr lang="en-US" sz="2800" dirty="0" err="1"/>
+              <a:t>full.gms</a:t>
+            </a:r>
+            <a:r>
+              <a:rPr lang="en-US" sz="2800" dirty="0"/>
+              <a:t> file</a:t>
+            </a:r>
+            <a:r>
+              <a:rPr lang="en-DE" sz="2800" dirty="0"/>
+              <a:t> </a:t>
+            </a:r>
+            <a:r>
+              <a:rPr lang="en-US" sz="2800" dirty="0"/>
+              <a:t>in the </a:t>
             </a:r>
             <a:r>
               <a:rPr lang="en-US" sz="2800" b="1" dirty="0" err="1">
@@ -5385,15 +5866,7 @@
             </a:r>
             <a:r>
               <a:rPr lang="en-US" sz="2800" dirty="0"/>
-              <a:t>, you’ll find the </a:t>
-            </a:r>
-            <a:r>
-              <a:rPr lang="en-US" sz="2800" dirty="0" err="1"/>
-              <a:t>full.gms</a:t>
-            </a:r>
-            <a:r>
-              <a:rPr lang="en-US" sz="2800" dirty="0"/>
-              <a:t> file. </a:t>
+              <a:t>. </a:t>
             </a:r>
           </a:p>
           <a:p>
@@ -5472,7 +5945,7 @@
           <a:p>
             <a:r>
               <a:rPr lang="en-DE"/>
-              <a:t>10.04.2024</a:t>
+              <a:t>16.06.2025</a:t>
             </a:r>
           </a:p>
         </p:txBody>
@@ -5499,8 +5972,8 @@
           <a:lstStyle/>
           <a:p>
             <a:r>
-              <a:rPr lang="en-US" dirty="0"/>
-              <a:t>MAgPIE24 Workshop &amp; Stories </a:t>
+              <a:rPr lang="en-US"/>
+              <a:t>MAgPIE25 Workshop &amp; Stories </a:t>
             </a:r>
             <a:endParaRPr lang="en-DE" dirty="0"/>
           </a:p>
@@ -5550,15 +6023,21 @@
           <p:nvPr/>
         </p:nvPicPr>
         <p:blipFill>
-          <a:blip r:embed="rId2"/>
+          <a:blip r:embed="rId2">
+            <a:extLst>
+              <a:ext uri="{28A0092B-C50C-407E-A947-70E740481C1C}">
+                <a14:useLocalDpi xmlns:a14="http://schemas.microsoft.com/office/drawing/2010/main" val="0"/>
+              </a:ext>
+            </a:extLst>
+          </a:blip>
           <a:stretch>
             <a:fillRect/>
           </a:stretch>
         </p:blipFill>
         <p:spPr>
           <a:xfrm>
-            <a:off x="531977" y="2106473"/>
-            <a:ext cx="3665120" cy="3910279"/>
+            <a:off x="588221" y="2106473"/>
+            <a:ext cx="3552631" cy="3910279"/>
           </a:xfrm>
           <a:prstGeom prst="rect">
             <a:avLst/>
@@ -5638,11 +6117,27 @@
             </a:r>
             <a:r>
               <a:rPr lang="de-DE" sz="2800" b="1" dirty="0"/>
-              <a:t> </a:t>
+              <a:t> MAgPIE </a:t>
             </a:r>
             <a:r>
               <a:rPr lang="de-DE" sz="2800" b="1" dirty="0" err="1"/>
-              <a:t>MAgPIE</a:t>
+              <a:t>run</a:t>
+            </a:r>
+            <a:r>
+              <a:rPr lang="de-DE" sz="2800" b="1" dirty="0"/>
+              <a:t>, </a:t>
+            </a:r>
+            <a:r>
+              <a:rPr lang="de-DE" sz="2800" b="1" dirty="0" err="1"/>
+              <a:t>based</a:t>
+            </a:r>
+            <a:r>
+              <a:rPr lang="de-DE" sz="2800" b="1" dirty="0"/>
+              <a:t> on </a:t>
+            </a:r>
+            <a:r>
+              <a:rPr lang="de-DE" sz="2800" b="1" dirty="0" err="1"/>
+              <a:t>the</a:t>
             </a:r>
             <a:r>
               <a:rPr lang="de-DE" sz="2800" b="1" dirty="0"/>
@@ -5650,23 +6145,7 @@
             </a:r>
             <a:r>
               <a:rPr lang="de-DE" sz="2800" b="1" dirty="0" err="1"/>
-              <a:t>run</a:t>
-            </a:r>
-            <a:r>
-              <a:rPr lang="de-DE" sz="2800" b="1" dirty="0"/>
-              <a:t>, </a:t>
-            </a:r>
-            <a:r>
-              <a:rPr lang="de-DE" sz="2800" b="1" dirty="0" err="1"/>
-              <a:t>based</a:t>
-            </a:r>
-            <a:r>
-              <a:rPr lang="de-DE" sz="2800" b="1" dirty="0"/>
-              <a:t> on </a:t>
-            </a:r>
-            <a:r>
-              <a:rPr lang="de-DE" sz="2800" b="1" dirty="0" err="1"/>
-              <a:t>the</a:t>
+              <a:t>selected</a:t>
             </a:r>
             <a:r>
               <a:rPr lang="de-DE" sz="2800" b="1" dirty="0"/>
@@ -5674,7 +6153,15 @@
             </a:r>
             <a:r>
               <a:rPr lang="de-DE" sz="2800" b="1" dirty="0" err="1"/>
-              <a:t>selected</a:t>
+              <a:t>settings</a:t>
+            </a:r>
+            <a:r>
+              <a:rPr lang="de-DE" sz="2800" b="1" dirty="0"/>
+              <a:t> and on </a:t>
+            </a:r>
+            <a:r>
+              <a:rPr lang="de-DE" sz="2800" b="1" dirty="0" err="1"/>
+              <a:t>one</a:t>
             </a:r>
             <a:r>
               <a:rPr lang="de-DE" sz="2800" b="1" dirty="0"/>
@@ -5682,15 +6169,23 @@
             </a:r>
             <a:r>
               <a:rPr lang="de-DE" sz="2800" b="1" dirty="0" err="1"/>
-              <a:t>settings</a:t>
+              <a:t>realization</a:t>
             </a:r>
             <a:r>
               <a:rPr lang="de-DE" sz="2800" b="1" dirty="0"/>
-              <a:t> and on </a:t>
+              <a:t> per </a:t>
             </a:r>
             <a:r>
               <a:rPr lang="de-DE" sz="2800" b="1" dirty="0" err="1"/>
-              <a:t>one</a:t>
+              <a:t>module</a:t>
+            </a:r>
+            <a:r>
+              <a:rPr lang="de-DE" sz="2800" b="1" dirty="0"/>
+              <a:t> (</a:t>
+            </a:r>
+            <a:r>
+              <a:rPr lang="de-DE" sz="2800" b="1" dirty="0" err="1"/>
+              <a:t>done</a:t>
             </a:r>
             <a:r>
               <a:rPr lang="de-DE" sz="2800" b="1" dirty="0"/>
@@ -5698,36 +6193,17 @@
             </a:r>
             <a:r>
               <a:rPr lang="de-DE" sz="2800" b="1" dirty="0" err="1"/>
-              <a:t>realization</a:t>
-            </a:r>
-            <a:r>
-              <a:rPr lang="de-DE" sz="2800" b="1" dirty="0"/>
-              <a:t> per </a:t>
-            </a:r>
-            <a:r>
-              <a:rPr lang="de-DE" sz="2800" b="1" dirty="0" err="1"/>
-              <a:t>module</a:t>
-            </a:r>
-            <a:r>
-              <a:rPr lang="de-DE" sz="2800" b="1" dirty="0"/>
-              <a:t> (</a:t>
-            </a:r>
-            <a:r>
-              <a:rPr lang="de-DE" sz="2800" b="1" dirty="0" err="1"/>
-              <a:t>done</a:t>
-            </a:r>
-            <a:r>
-              <a:rPr lang="de-DE" sz="2800" b="1" dirty="0"/>
-              <a:t> </a:t>
-            </a:r>
-            <a:r>
-              <a:rPr lang="de-DE" sz="2800" b="1" dirty="0" err="1"/>
               <a:t>automatically</a:t>
             </a:r>
             <a:r>
               <a:rPr lang="de-DE" sz="2800" b="1" dirty="0"/>
               <a:t>)</a:t>
             </a:r>
+            <a:r>
+              <a:rPr lang="en-DE" sz="2800" b="1" dirty="0"/>
+              <a:t>.</a:t>
+            </a:r>
+            <a:endParaRPr lang="de-DE" sz="2800" b="1" dirty="0"/>
           </a:p>
         </p:txBody>
       </p:sp>
@@ -5745,16 +6221,21 @@
           </p:cNvPicPr>
           <p:nvPr/>
         </p:nvPicPr>
-        <p:blipFill>
-          <a:blip r:embed="rId3"/>
-          <a:stretch>
-            <a:fillRect/>
-          </a:stretch>
+        <p:blipFill rotWithShape="1">
+          <a:blip r:embed="rId3">
+            <a:extLst>
+              <a:ext uri="{28A0092B-C50C-407E-A947-70E740481C1C}">
+                <a14:useLocalDpi xmlns:a14="http://schemas.microsoft.com/office/drawing/2010/main" val="0"/>
+              </a:ext>
+            </a:extLst>
+          </a:blip>
+          <a:srcRect t="41217"/>
+          <a:stretch/>
         </p:blipFill>
         <p:spPr>
           <a:xfrm>
-            <a:off x="4488538" y="2527178"/>
-            <a:ext cx="7453740" cy="640864"/>
+            <a:off x="4488927" y="2791326"/>
+            <a:ext cx="7308577" cy="376716"/>
           </a:xfrm>
           <a:prstGeom prst="rect">
             <a:avLst/>
@@ -5781,7 +6262,7 @@
         </p:nvSpPr>
         <p:spPr>
           <a:xfrm>
-            <a:off x="550976" y="5512535"/>
+            <a:off x="550976" y="4687035"/>
             <a:ext cx="3106623" cy="147601"/>
           </a:xfrm>
           <a:prstGeom prst="rect">
@@ -5833,8 +6314,8 @@
         </p:nvCxnSpPr>
         <p:spPr>
           <a:xfrm flipV="1">
-            <a:off x="3658310" y="2527178"/>
-            <a:ext cx="795173" cy="2985358"/>
+            <a:off x="3657599" y="2760630"/>
+            <a:ext cx="805539" cy="1926405"/>
           </a:xfrm>
           <a:prstGeom prst="line">
             <a:avLst/>
@@ -5876,8 +6357,8 @@
         </p:nvCxnSpPr>
         <p:spPr>
           <a:xfrm flipV="1">
-            <a:off x="3658310" y="3158898"/>
-            <a:ext cx="830228" cy="2516838"/>
+            <a:off x="3657599" y="3171598"/>
+            <a:ext cx="805539" cy="1663038"/>
           </a:xfrm>
           <a:prstGeom prst="line">
             <a:avLst/>
@@ -6204,7 +6685,7 @@
           <a:p>
             <a:r>
               <a:rPr lang="en-DE"/>
-              <a:t>10.04.2024</a:t>
+              <a:t>16.06.2025</a:t>
             </a:r>
           </a:p>
         </p:txBody>
@@ -6231,8 +6712,8 @@
           <a:lstStyle/>
           <a:p>
             <a:r>
-              <a:rPr lang="en-US" dirty="0"/>
-              <a:t>MAgPIE24 Workshop &amp; Stories </a:t>
+              <a:rPr lang="en-US"/>
+              <a:t>MAgPIE25 Workshop &amp; Stories </a:t>
             </a:r>
             <a:endParaRPr lang="en-DE" dirty="0"/>
           </a:p>
@@ -6282,7 +6763,7 @@
         <p:spPr>
           <a:xfrm>
             <a:off x="360000" y="1200669"/>
-            <a:ext cx="10348105" cy="4401205"/>
+            <a:ext cx="10348105" cy="4832092"/>
           </a:xfrm>
           <a:prstGeom prst="rect">
             <a:avLst/>
@@ -6492,6 +6973,10 @@
               <a:rPr lang="de-DE" sz="2800" dirty="0" err="1"/>
               <a:t>realization</a:t>
             </a:r>
+            <a:r>
+              <a:rPr lang="en-DE" sz="2800" dirty="0"/>
+              <a:t>.</a:t>
+            </a:r>
             <a:endParaRPr lang="de-DE" sz="2800" dirty="0"/>
           </a:p>
           <a:p>
@@ -6499,12 +6984,12 @@
               <a:buAutoNum type="arabicPeriod"/>
             </a:pPr>
             <a:r>
-              <a:rPr lang="de-DE" sz="2800" dirty="0" err="1"/>
-              <a:t>One</a:t>
+              <a:rPr lang="en-DE" sz="2800" dirty="0"/>
+              <a:t>Find o</a:t>
             </a:r>
             <a:r>
               <a:rPr lang="de-DE" sz="2800" dirty="0"/>
-              <a:t> </a:t>
+              <a:t>ne </a:t>
             </a:r>
             <a:r>
               <a:rPr lang="de-DE" sz="2800" dirty="0" err="1"/>
@@ -6529,8 +7014,16 @@
               <a:buChar char="•"/>
             </a:pPr>
             <a:r>
+              <a:rPr lang="en-DE" sz="2800" dirty="0"/>
+              <a:t>A p</a:t>
+            </a:r>
+            <a:r>
+              <a:rPr lang="de-DE" sz="2800" dirty="0" err="1"/>
+              <a:t>arameter</a:t>
+            </a:r>
+            <a:r>
               <a:rPr lang="de-DE" sz="2800" dirty="0"/>
-              <a:t>Parameter </a:t>
+              <a:t> </a:t>
             </a:r>
             <a:r>
               <a:rPr lang="de-DE" sz="2800" dirty="0" err="1"/>
@@ -6675,8 +7168,13 @@
             </a:r>
             <a:r>
               <a:rPr lang="de-DE" sz="2800" dirty="0"/>
-              <a:t> code.</a:t>
-            </a:r>
+              <a:t> code</a:t>
+            </a:r>
+            <a:r>
+              <a:rPr lang="en-DE" sz="2800" dirty="0"/>
+              <a:t>/another module</a:t>
+            </a:r>
+            <a:endParaRPr lang="de-DE" sz="2800" dirty="0"/>
           </a:p>
           <a:p>
             <a:pPr marL="998538" indent="-457200">
@@ -6758,85 +7256,6 @@
       </p:transition>
     </mc:Fallback>
   </mc:AlternateContent>
-  <p:timing>
-    <p:tnLst>
-      <p:par>
-        <p:cTn id="1" dur="indefinite" restart="never" nodeType="tmRoot">
-          <p:childTnLst>
-            <p:seq concurrent="1" nextAc="seek">
-              <p:cTn id="2" dur="indefinite" nodeType="mainSeq">
-                <p:childTnLst>
-                  <p:par>
-                    <p:cTn id="3" fill="hold">
-                      <p:stCondLst>
-                        <p:cond delay="indefinite"/>
-                      </p:stCondLst>
-                      <p:childTnLst>
-                        <p:par>
-                          <p:cTn id="4" fill="hold">
-                            <p:stCondLst>
-                              <p:cond delay="0"/>
-                            </p:stCondLst>
-                            <p:childTnLst>
-                              <p:par>
-                                <p:cTn id="5" presetID="1" presetClass="entr" presetSubtype="0" fill="hold" nodeType="clickEffect">
-                                  <p:stCondLst>
-                                    <p:cond delay="0"/>
-                                  </p:stCondLst>
-                                  <p:childTnLst>
-                                    <p:set>
-                                      <p:cBhvr>
-                                        <p:cTn id="6" dur="1" fill="hold">
-                                          <p:stCondLst>
-                                            <p:cond delay="0"/>
-                                          </p:stCondLst>
-                                        </p:cTn>
-                                        <p:tgtEl>
-                                          <p:spTgt spid="7">
-                                            <p:txEl>
-                                              <p:pRg st="3" end="3"/>
-                                            </p:txEl>
-                                          </p:spTgt>
-                                        </p:tgtEl>
-                                        <p:attrNameLst>
-                                          <p:attrName>style.visibility</p:attrName>
-                                        </p:attrNameLst>
-                                      </p:cBhvr>
-                                      <p:to>
-                                        <p:strVal val="visible"/>
-                                      </p:to>
-                                    </p:set>
-                                  </p:childTnLst>
-                                </p:cTn>
-                              </p:par>
-                            </p:childTnLst>
-                          </p:cTn>
-                        </p:par>
-                      </p:childTnLst>
-                    </p:cTn>
-                  </p:par>
-                </p:childTnLst>
-              </p:cTn>
-              <p:prevCondLst>
-                <p:cond evt="onPrev" delay="0">
-                  <p:tgtEl>
-                    <p:sldTgt/>
-                  </p:tgtEl>
-                </p:cond>
-              </p:prevCondLst>
-              <p:nextCondLst>
-                <p:cond evt="onNext" delay="0">
-                  <p:tgtEl>
-                    <p:sldTgt/>
-                  </p:tgtEl>
-                </p:cond>
-              </p:nextCondLst>
-            </p:seq>
-          </p:childTnLst>
-        </p:cTn>
-      </p:par>
-    </p:tnLst>
-  </p:timing>
 </p:sld>
 </file>
 
@@ -6912,8 +7331,12 @@
           <a:lstStyle/>
           <a:p>
             <a:r>
+              <a:rPr lang="en-DE" dirty="0" err="1"/>
+              <a:t>weindl</a:t>
+            </a:r>
+            <a:r>
               <a:rPr lang="de-DE" dirty="0"/>
-              <a:t>mbacca@pik-potsdam.de</a:t>
+              <a:t>@pik-potsdam.de</a:t>
             </a:r>
           </a:p>
           <a:p>
@@ -6942,6 +7365,63 @@
               <a:t>12</a:t>
             </a:fld>
             <a:endParaRPr lang="de-DE" dirty="0"/>
+          </a:p>
+        </p:txBody>
+      </p:sp>
+      <p:sp>
+        <p:nvSpPr>
+          <p:cNvPr id="2" name="Date Placeholder 1">
+            <a:extLst>
+              <a:ext uri="{FF2B5EF4-FFF2-40B4-BE49-F238E27FC236}">
+                <a16:creationId xmlns:a16="http://schemas.microsoft.com/office/drawing/2014/main" id="{9758412F-E896-4BCB-A41F-1101B824D7D9}"/>
+              </a:ext>
+            </a:extLst>
+          </p:cNvPr>
+          <p:cNvSpPr>
+            <a:spLocks noGrp="1"/>
+          </p:cNvSpPr>
+          <p:nvPr>
+            <p:ph type="dt" sz="half" idx="10"/>
+          </p:nvPr>
+        </p:nvSpPr>
+        <p:spPr/>
+        <p:txBody>
+          <a:bodyPr/>
+          <a:lstStyle/>
+          <a:p>
+            <a:r>
+              <a:rPr lang="en-DE"/>
+              <a:t>16.06.2025</a:t>
+            </a:r>
+          </a:p>
+        </p:txBody>
+      </p:sp>
+      <p:sp>
+        <p:nvSpPr>
+          <p:cNvPr id="3" name="Footer Placeholder 2">
+            <a:extLst>
+              <a:ext uri="{FF2B5EF4-FFF2-40B4-BE49-F238E27FC236}">
+                <a16:creationId xmlns:a16="http://schemas.microsoft.com/office/drawing/2014/main" id="{40F83CAC-EECF-43B8-ADEC-FBC016714771}"/>
+              </a:ext>
+            </a:extLst>
+          </p:cNvPr>
+          <p:cNvSpPr>
+            <a:spLocks noGrp="1"/>
+          </p:cNvSpPr>
+          <p:nvPr>
+            <p:ph type="ftr" sz="quarter" idx="11"/>
+          </p:nvPr>
+        </p:nvSpPr>
+        <p:spPr/>
+        <p:txBody>
+          <a:bodyPr/>
+          <a:lstStyle/>
+          <a:p>
+            <a:r>
+              <a:rPr lang="en-US"/>
+              <a:t>MAgPIE25 Workshop &amp; Stories </a:t>
+            </a:r>
+            <a:endParaRPr lang="en-DE"/>
           </a:p>
         </p:txBody>
       </p:sp>
@@ -7182,8 +7662,9 @@
           <a:p>
             <a:r>
               <a:rPr lang="en-DE"/>
-              <a:t>10.04.2024</a:t>
-            </a:r>
+              <a:t>16.06.2025</a:t>
+            </a:r>
+            <a:endParaRPr lang="en-DE" dirty="0"/>
           </a:p>
         </p:txBody>
       </p:sp>
@@ -7209,8 +7690,8 @@
           <a:lstStyle/>
           <a:p>
             <a:r>
-              <a:rPr lang="en-US" dirty="0"/>
-              <a:t>MAgPIE24 Workshop &amp; Stories </a:t>
+              <a:rPr lang="en-US"/>
+              <a:t>MAgPIE25 Workshop &amp; Stories </a:t>
             </a:r>
             <a:endParaRPr lang="en-DE" dirty="0"/>
           </a:p>
@@ -7720,7 +8201,7 @@
           <a:p>
             <a:r>
               <a:rPr lang="en-DE"/>
-              <a:t>10.04.2024</a:t>
+              <a:t>16.06.2025</a:t>
             </a:r>
           </a:p>
         </p:txBody>
@@ -7748,7 +8229,7 @@
           <a:p>
             <a:r>
               <a:rPr lang="en-US"/>
-              <a:t>MAgPIE24 Workshop &amp; Stories </a:t>
+              <a:t>MAgPIE25 Workshop &amp; Stories </a:t>
             </a:r>
             <a:endParaRPr lang="en-DE"/>
           </a:p>
@@ -7890,7 +8371,7 @@
           <p:nvPr/>
         </p:nvPicPr>
         <p:blipFill>
-          <a:blip r:embed="rId2"/>
+          <a:blip r:embed="rId3"/>
           <a:stretch>
             <a:fillRect/>
           </a:stretch>
@@ -7998,7 +8479,7 @@
                     <a:lumOff val="35000"/>
                   </a:schemeClr>
                 </a:solidFill>
-                <a:hlinkClick r:id="rId3"/>
+                <a:hlinkClick r:id="rId4"/>
               </a:rPr>
               <a:t>https://www.gams.com/products/gams/gams-language/</a:t>
             </a:r>
@@ -8326,7 +8807,7 @@
           <a:p>
             <a:r>
               <a:rPr lang="en-DE"/>
-              <a:t>10.04.2024</a:t>
+              <a:t>16.06.2025</a:t>
             </a:r>
           </a:p>
         </p:txBody>
@@ -8359,7 +8840,7 @@
           <a:p>
             <a:r>
               <a:rPr lang="en-US"/>
-              <a:t>MAgPIE24 Workshop &amp; Stories </a:t>
+              <a:t>MAgPIE25 Workshop &amp; Stories </a:t>
             </a:r>
             <a:endParaRPr lang="en-DE"/>
           </a:p>
@@ -8414,7 +8895,7 @@
           <p:nvPr/>
         </p:nvPicPr>
         <p:blipFill>
-          <a:blip r:embed="rId2"/>
+          <a:blip r:embed="rId3"/>
           <a:stretch>
             <a:fillRect/>
           </a:stretch>
@@ -8828,15 +9309,7 @@
               <a:t> </a:t>
             </a:r>
             <a:r>
-              <a:rPr lang="de-DE" dirty="0" err="1"/>
-              <a:t>certain</a:t>
-            </a:r>
-            <a:r>
-              <a:rPr lang="de-DE" dirty="0"/>
-              <a:t> </a:t>
-            </a:r>
-            <a:r>
-              <a:rPr lang="de-DE" b="1" dirty="0" err="1">
+              <a:rPr lang="en-US" b="1" dirty="0">
                 <a:solidFill>
                   <a:schemeClr val="accent2">
                     <a:lumMod val="75000"/>
@@ -8844,6 +9317,14 @@
                 </a:solidFill>
               </a:rPr>
               <a:t>demand</a:t>
+            </a:r>
+            <a:r>
+              <a:rPr lang="en-US" dirty="0"/>
+              <a:t> for primary agricultural products</a:t>
+            </a:r>
+            <a:r>
+              <a:rPr lang="en-DE" dirty="0"/>
+              <a:t>.</a:t>
             </a:r>
             <a:endParaRPr lang="de-DE" b="1" dirty="0">
               <a:solidFill>
@@ -8874,7 +9355,7 @@
             </a:r>
             <a:r>
               <a:rPr lang="de-DE" dirty="0" err="1"/>
-              <a:t>leads</a:t>
+              <a:t>lead</a:t>
             </a:r>
             <a:r>
               <a:rPr lang="de-DE" dirty="0"/>
@@ -8908,6 +9389,16 @@
               </a:rPr>
               <a:t>production</a:t>
             </a:r>
+            <a:r>
+              <a:rPr lang="en-DE" b="1" dirty="0">
+                <a:solidFill>
+                  <a:schemeClr val="accent2">
+                    <a:lumMod val="75000"/>
+                  </a:schemeClr>
+                </a:solidFill>
+              </a:rPr>
+              <a:t>.</a:t>
+            </a:r>
             <a:endParaRPr lang="de-DE" b="1" dirty="0">
               <a:solidFill>
                 <a:schemeClr val="accent2">
@@ -8935,7 +9426,7 @@
                   </a:schemeClr>
                 </a:solidFill>
               </a:rPr>
-              <a:t> </a:t>
+              <a:t> and </a:t>
             </a:r>
             <a:r>
               <a:rPr lang="de-DE" b="1" dirty="0" err="1">
@@ -8945,7 +9436,7 @@
                   </a:schemeClr>
                 </a:solidFill>
               </a:rPr>
-              <a:t>and</a:t>
+              <a:t>biophysical</a:t>
             </a:r>
             <a:r>
               <a:rPr lang="de-DE" b="1" dirty="0">
@@ -8958,6 +9449,42 @@
               <a:t> </a:t>
             </a:r>
             <a:r>
+              <a:rPr lang="de-DE" dirty="0" err="1"/>
+              <a:t>yield</a:t>
+            </a:r>
+            <a:r>
+              <a:rPr lang="de-DE" dirty="0"/>
+              <a:t> and </a:t>
+            </a:r>
+            <a:r>
+              <a:rPr lang="de-DE" dirty="0" err="1"/>
+              <a:t>water</a:t>
+            </a:r>
+            <a:r>
+              <a:rPr lang="de-DE" dirty="0"/>
+              <a:t> </a:t>
+            </a:r>
+            <a:r>
+              <a:rPr lang="de-DE" dirty="0" err="1"/>
+              <a:t>availability</a:t>
+            </a:r>
+            <a:r>
+              <a:rPr lang="de-DE" dirty="0"/>
+              <a:t> </a:t>
+            </a:r>
+            <a:r>
+              <a:rPr lang="de-DE" dirty="0" err="1"/>
+              <a:t>data</a:t>
+            </a:r>
+            <a:r>
+              <a:rPr lang="de-DE" dirty="0"/>
+              <a:t> </a:t>
+            </a:r>
+            <a:r>
+              <a:rPr lang="en-DE" dirty="0"/>
+              <a:t>shape </a:t>
+            </a:r>
+            <a:r>
               <a:rPr lang="de-DE" b="1" dirty="0" err="1">
                 <a:solidFill>
                   <a:schemeClr val="accent2">
@@ -8965,7 +9492,7 @@
                   </a:schemeClr>
                 </a:solidFill>
               </a:rPr>
-              <a:t>biophysical</a:t>
+              <a:t>cropping</a:t>
             </a:r>
             <a:r>
               <a:rPr lang="de-DE" b="1" dirty="0">
@@ -8978,62 +9505,6 @@
               <a:t> </a:t>
             </a:r>
             <a:r>
-              <a:rPr lang="de-DE" dirty="0" err="1"/>
-              <a:t>yield</a:t>
-            </a:r>
-            <a:r>
-              <a:rPr lang="de-DE" dirty="0"/>
-              <a:t> </a:t>
-            </a:r>
-            <a:r>
-              <a:rPr lang="de-DE" dirty="0" err="1"/>
-              <a:t>and</a:t>
-            </a:r>
-            <a:r>
-              <a:rPr lang="de-DE" dirty="0"/>
-              <a:t> </a:t>
-            </a:r>
-            <a:r>
-              <a:rPr lang="de-DE" dirty="0" err="1"/>
-              <a:t>water</a:t>
-            </a:r>
-            <a:r>
-              <a:rPr lang="de-DE" dirty="0"/>
-              <a:t> </a:t>
-            </a:r>
-            <a:r>
-              <a:rPr lang="de-DE" dirty="0" err="1"/>
-              <a:t>availability</a:t>
-            </a:r>
-            <a:r>
-              <a:rPr lang="de-DE" dirty="0"/>
-              <a:t> </a:t>
-            </a:r>
-            <a:r>
-              <a:rPr lang="de-DE" dirty="0" err="1"/>
-              <a:t>data</a:t>
-            </a:r>
-            <a:r>
-              <a:rPr lang="de-DE" dirty="0"/>
-              <a:t>  </a:t>
-            </a:r>
-            <a:r>
-              <a:rPr lang="de-DE" dirty="0" err="1"/>
-              <a:t>translate</a:t>
-            </a:r>
-            <a:r>
-              <a:rPr lang="de-DE" dirty="0"/>
-              <a:t> </a:t>
-            </a:r>
-            <a:r>
-              <a:rPr lang="de-DE" dirty="0" err="1"/>
-              <a:t>into</a:t>
-            </a:r>
-            <a:r>
-              <a:rPr lang="de-DE" dirty="0"/>
-              <a:t> </a:t>
-            </a:r>
-            <a:r>
               <a:rPr lang="de-DE" b="1" dirty="0" err="1">
                 <a:solidFill>
                   <a:schemeClr val="accent2">
@@ -9041,7 +9512,29 @@
                   </a:schemeClr>
                 </a:solidFill>
               </a:rPr>
-              <a:t>cropping</a:t>
+              <a:t>patterns</a:t>
+            </a:r>
+            <a:r>
+              <a:rPr lang="de-DE" b="1" dirty="0">
+                <a:solidFill>
+                  <a:schemeClr val="accent2">
+                    <a:lumMod val="75000"/>
+                  </a:schemeClr>
+                </a:solidFill>
+              </a:rPr>
+              <a:t>.</a:t>
+            </a:r>
+          </a:p>
+          <a:p>
+            <a:r>
+              <a:rPr lang="de-DE" b="1" dirty="0" err="1">
+                <a:solidFill>
+                  <a:schemeClr val="accent2">
+                    <a:lumMod val="75000"/>
+                  </a:schemeClr>
+                </a:solidFill>
+              </a:rPr>
+              <a:t>Cropping</a:t>
             </a:r>
             <a:r>
               <a:rPr lang="de-DE" b="1" dirty="0">
@@ -9071,19 +9564,11 @@
                   </a:schemeClr>
                 </a:solidFill>
               </a:rPr>
-              <a:t>.</a:t>
-            </a:r>
-          </a:p>
-          <a:p>
-            <a:r>
-              <a:rPr lang="de-DE" b="1" dirty="0" err="1">
-                <a:solidFill>
-                  <a:schemeClr val="accent2">
-                    <a:lumMod val="75000"/>
-                  </a:schemeClr>
-                </a:solidFill>
-              </a:rPr>
-              <a:t>Cropping</a:t>
+              <a:t> </a:t>
+            </a:r>
+            <a:r>
+              <a:rPr lang="de-DE" dirty="0" err="1"/>
+              <a:t>drive</a:t>
             </a:r>
             <a:r>
               <a:rPr lang="de-DE" b="1" dirty="0">
@@ -9103,7 +9588,7 @@
                   </a:schemeClr>
                 </a:solidFill>
               </a:rPr>
-              <a:t>patterns</a:t>
+              <a:t>land</a:t>
             </a:r>
             <a:r>
               <a:rPr lang="de-DE" b="1" dirty="0">
@@ -9116,8 +9601,14 @@
               <a:t> </a:t>
             </a:r>
             <a:r>
-              <a:rPr lang="de-DE" dirty="0" err="1"/>
-              <a:t>drive</a:t>
+              <a:rPr lang="de-DE" b="1" dirty="0" err="1">
+                <a:solidFill>
+                  <a:schemeClr val="accent2">
+                    <a:lumMod val="75000"/>
+                  </a:schemeClr>
+                </a:solidFill>
+              </a:rPr>
+              <a:t>use</a:t>
             </a:r>
             <a:r>
               <a:rPr lang="de-DE" b="1" dirty="0">
@@ -9130,48 +9621,12 @@
               <a:t> </a:t>
             </a:r>
             <a:r>
-              <a:rPr lang="de-DE" b="1" dirty="0" err="1">
-                <a:solidFill>
-                  <a:schemeClr val="accent2">
-                    <a:lumMod val="75000"/>
-                  </a:schemeClr>
-                </a:solidFill>
-              </a:rPr>
-              <a:t>land</a:t>
-            </a:r>
-            <a:r>
-              <a:rPr lang="de-DE" b="1" dirty="0">
-                <a:solidFill>
-                  <a:schemeClr val="accent2">
-                    <a:lumMod val="75000"/>
-                  </a:schemeClr>
-                </a:solidFill>
-              </a:rPr>
-              <a:t> </a:t>
-            </a:r>
-            <a:r>
-              <a:rPr lang="de-DE" b="1" dirty="0" err="1">
-                <a:solidFill>
-                  <a:schemeClr val="accent2">
-                    <a:lumMod val="75000"/>
-                  </a:schemeClr>
-                </a:solidFill>
-              </a:rPr>
-              <a:t>use</a:t>
-            </a:r>
-            <a:r>
-              <a:rPr lang="de-DE" b="1" dirty="0">
-                <a:solidFill>
-                  <a:schemeClr val="accent2">
-                    <a:lumMod val="75000"/>
-                  </a:schemeClr>
-                </a:solidFill>
-              </a:rPr>
-              <a:t> </a:t>
-            </a:r>
-            <a:r>
               <a:rPr lang="de-DE" dirty="0" err="1"/>
               <a:t>decisions</a:t>
+            </a:r>
+            <a:r>
+              <a:rPr lang="en-DE" dirty="0"/>
+              <a:t>.</a:t>
             </a:r>
             <a:endParaRPr lang="de-DE" dirty="0"/>
           </a:p>
@@ -9791,7 +10246,7 @@
           <p:nvPr/>
         </p:nvPicPr>
         <p:blipFill>
-          <a:blip r:embed="rId3"/>
+          <a:blip r:embed="rId4"/>
           <a:stretch>
             <a:fillRect/>
           </a:stretch>
@@ -9868,9 +10323,33 @@
             </a:r>
             <a:r>
               <a:rPr lang="en-US" sz="1600" u="sng" dirty="0">
-                <a:hlinkClick r:id="rId4"/>
+                <a:hlinkClick r:id="rId5"/>
               </a:rPr>
-              <a:t>https://rse.pik-potsdam.de/doc/magpie/4.7.2/</a:t>
+              <a:t>https://rse.pik-potsdam.de/doc/magpie/4.</a:t>
+            </a:r>
+            <a:r>
+              <a:rPr lang="en-DE" sz="1600" u="sng" dirty="0">
+                <a:hlinkClick r:id="rId5"/>
+              </a:rPr>
+              <a:t>10</a:t>
+            </a:r>
+            <a:r>
+              <a:rPr lang="en-US" sz="1600" u="sng" dirty="0">
+                <a:hlinkClick r:id="rId5"/>
+              </a:rPr>
+              <a:t>.</a:t>
+            </a:r>
+            <a:r>
+              <a:rPr lang="en-DE" sz="1600" u="sng" dirty="0">
+                <a:hlinkClick r:id="rId5"/>
+              </a:rPr>
+              <a:t>1</a:t>
+            </a:r>
+            <a:r>
+              <a:rPr lang="en-US" sz="1600" u="sng" dirty="0">
+                <a:hlinkClick r:id="rId5"/>
+              </a:rPr>
+              <a:t>/</a:t>
             </a:r>
             <a:endParaRPr lang="de-DE" sz="1600" b="1" dirty="0"/>
           </a:p>
@@ -9921,11 +10400,11 @@
             </a:r>
             <a:r>
               <a:rPr lang="de-DE" b="1" dirty="0"/>
-              <a:t> </a:t>
+              <a:t> and </a:t>
             </a:r>
             <a:r>
               <a:rPr lang="de-DE" b="1" dirty="0" err="1"/>
-              <a:t>and</a:t>
+              <a:t>calculations</a:t>
             </a:r>
             <a:r>
               <a:rPr lang="de-DE" b="1" dirty="0"/>
@@ -9933,7 +10412,7 @@
             </a:r>
             <a:r>
               <a:rPr lang="de-DE" b="1" dirty="0" err="1"/>
-              <a:t>calculations</a:t>
+              <a:t>are</a:t>
             </a:r>
             <a:r>
               <a:rPr lang="de-DE" b="1" dirty="0"/>
@@ -9941,7 +10420,15 @@
             </a:r>
             <a:r>
               <a:rPr lang="de-DE" b="1" dirty="0" err="1"/>
-              <a:t>are</a:t>
+              <a:t>described</a:t>
+            </a:r>
+            <a:r>
+              <a:rPr lang="de-DE" b="1" dirty="0"/>
+              <a:t> in </a:t>
+            </a:r>
+            <a:r>
+              <a:rPr lang="en-DE" b="1" dirty="0"/>
+              <a:t>the</a:t>
             </a:r>
             <a:r>
               <a:rPr lang="de-DE" b="1" dirty="0"/>
@@ -9949,23 +10436,19 @@
             </a:r>
             <a:r>
               <a:rPr lang="de-DE" b="1" dirty="0" err="1"/>
-              <a:t>described</a:t>
+              <a:t>modules</a:t>
+            </a:r>
+            <a:r>
+              <a:rPr lang="en-DE" b="1" dirty="0"/>
+              <a:t> of </a:t>
             </a:r>
             <a:r>
               <a:rPr lang="de-DE" b="1" dirty="0"/>
-              <a:t> in </a:t>
-            </a:r>
-            <a:r>
-              <a:rPr lang="de-DE" b="1" dirty="0" err="1"/>
-              <a:t>MAgPIE‘s</a:t>
-            </a:r>
-            <a:r>
-              <a:rPr lang="de-DE" b="1" dirty="0"/>
-              <a:t> </a:t>
-            </a:r>
-            <a:r>
-              <a:rPr lang="de-DE" b="1" dirty="0" err="1"/>
-              <a:t>modules</a:t>
+              <a:t>MAgPIE</a:t>
+            </a:r>
+            <a:r>
+              <a:rPr lang="en-DE" b="1" dirty="0"/>
+              <a:t>.</a:t>
             </a:r>
             <a:endParaRPr lang="de-DE" b="1" dirty="0"/>
           </a:p>
@@ -11103,13 +11586,21 @@
                     <a:lumMod val="50000"/>
                   </a:schemeClr>
                 </a:solidFill>
-                <a:hlinkClick r:id="rId2"/>
+                <a:hlinkClick r:id="rId3"/>
               </a:rPr>
               <a:t>https://github.com/magpiemodel/magpie.git</a:t>
             </a:r>
             <a:r>
               <a:rPr lang="en-US" sz="2800" dirty="0"/>
-              <a:t>) from the repository you will find : </a:t>
+              <a:t>) from the repository</a:t>
+            </a:r>
+            <a:r>
+              <a:rPr lang="en-DE" sz="2800" dirty="0"/>
+              <a:t>,</a:t>
+            </a:r>
+            <a:r>
+              <a:rPr lang="en-US" sz="2800" dirty="0"/>
+              <a:t> you will find : </a:t>
             </a:r>
             <a:endParaRPr lang="en-DE" sz="2800" dirty="0"/>
           </a:p>
@@ -11173,7 +11664,7 @@
           <a:p>
             <a:r>
               <a:rPr lang="en-DE"/>
-              <a:t>10.04.2024</a:t>
+              <a:t>16.06.2025</a:t>
             </a:r>
           </a:p>
         </p:txBody>
@@ -11201,7 +11692,7 @@
           <a:p>
             <a:r>
               <a:rPr lang="en-US"/>
-              <a:t>MAgPIE24 Workshop &amp; Stories </a:t>
+              <a:t>MAgPIE25 Workshop &amp; Stories </a:t>
             </a:r>
             <a:endParaRPr lang="en-DE"/>
           </a:p>
@@ -11251,15 +11742,21 @@
           <p:nvPr/>
         </p:nvPicPr>
         <p:blipFill>
-          <a:blip r:embed="rId3"/>
+          <a:blip r:embed="rId4">
+            <a:extLst>
+              <a:ext uri="{28A0092B-C50C-407E-A947-70E740481C1C}">
+                <a14:useLocalDpi xmlns:a14="http://schemas.microsoft.com/office/drawing/2010/main" val="0"/>
+              </a:ext>
+            </a:extLst>
+          </a:blip>
           <a:stretch>
             <a:fillRect/>
           </a:stretch>
         </p:blipFill>
         <p:spPr>
           <a:xfrm>
-            <a:off x="724280" y="2409014"/>
-            <a:ext cx="4034987" cy="3824400"/>
+            <a:off x="539127" y="1895483"/>
+            <a:ext cx="4342051" cy="4577506"/>
           </a:xfrm>
           <a:prstGeom prst="rect">
             <a:avLst/>
@@ -11281,7 +11778,7 @@
         </p:nvSpPr>
         <p:spPr>
           <a:xfrm>
-            <a:off x="1568414" y="3480784"/>
+            <a:off x="604669" y="2882678"/>
             <a:ext cx="1859280" cy="152400"/>
           </a:xfrm>
           <a:prstGeom prst="rect">
@@ -11319,10 +11816,10 @@
       </p:sp>
       <p:pic>
         <p:nvPicPr>
-          <p:cNvPr id="12" name="Picture 11">
-            <a:extLst>
-              <a:ext uri="{FF2B5EF4-FFF2-40B4-BE49-F238E27FC236}">
-                <a16:creationId xmlns:a16="http://schemas.microsoft.com/office/drawing/2014/main" id="{B8C19E4C-4CB9-42DC-B385-75C88561197D}"/>
+          <p:cNvPr id="14" name="Picture 13">
+            <a:extLst>
+              <a:ext uri="{FF2B5EF4-FFF2-40B4-BE49-F238E27FC236}">
+                <a16:creationId xmlns:a16="http://schemas.microsoft.com/office/drawing/2014/main" id="{33B9D3A4-AEB7-42DC-A6D8-C15DBFBF875A}"/>
               </a:ext>
             </a:extLst>
           </p:cNvPr>
@@ -11332,15 +11829,827 @@
           <p:nvPr/>
         </p:nvPicPr>
         <p:blipFill>
-          <a:blip r:embed="rId4"/>
+          <a:blip r:embed="rId5">
+            <a:extLst>
+              <a:ext uri="{28A0092B-C50C-407E-A947-70E740481C1C}">
+                <a14:useLocalDpi xmlns:a14="http://schemas.microsoft.com/office/drawing/2010/main" val="0"/>
+              </a:ext>
+            </a:extLst>
+          </a:blip>
           <a:stretch>
             <a:fillRect/>
           </a:stretch>
         </p:blipFill>
         <p:spPr>
           <a:xfrm>
+            <a:off x="5810947" y="2481230"/>
+            <a:ext cx="4900394" cy="1989166"/>
+          </a:xfrm>
+          <a:prstGeom prst="rect">
+            <a:avLst/>
+          </a:prstGeom>
+        </p:spPr>
+      </p:pic>
+      <p:cxnSp>
+        <p:nvCxnSpPr>
+          <p:cNvPr id="19" name="Straight Connector 18">
+            <a:extLst>
+              <a:ext uri="{FF2B5EF4-FFF2-40B4-BE49-F238E27FC236}">
+                <a16:creationId xmlns:a16="http://schemas.microsoft.com/office/drawing/2014/main" id="{CD9496E6-559C-4A58-B88D-FC02F67622FB}"/>
+              </a:ext>
+            </a:extLst>
+          </p:cNvPr>
+          <p:cNvCxnSpPr>
+            <a:cxnSpLocks/>
+            <a:stCxn id="10" idx="1"/>
+          </p:cNvCxnSpPr>
+          <p:nvPr/>
+        </p:nvCxnSpPr>
+        <p:spPr>
+          <a:xfrm flipH="1">
+            <a:off x="451391" y="2958878"/>
+            <a:ext cx="153278" cy="1020573"/>
+          </a:xfrm>
+          <a:prstGeom prst="line">
+            <a:avLst/>
+          </a:prstGeom>
+          <a:ln w="19050">
+            <a:solidFill>
+              <a:srgbClr val="C00000"/>
+            </a:solidFill>
+          </a:ln>
+        </p:spPr>
+        <p:style>
+          <a:lnRef idx="1">
+            <a:schemeClr val="accent5"/>
+          </a:lnRef>
+          <a:fillRef idx="0">
+            <a:schemeClr val="accent5"/>
+          </a:fillRef>
+          <a:effectRef idx="0">
+            <a:schemeClr val="accent5"/>
+          </a:effectRef>
+          <a:fontRef idx="minor">
+            <a:schemeClr val="tx1"/>
+          </a:fontRef>
+        </p:style>
+      </p:cxnSp>
+      <p:sp>
+        <p:nvSpPr>
+          <p:cNvPr id="29" name="Arrow: Right 28">
+            <a:extLst>
+              <a:ext uri="{FF2B5EF4-FFF2-40B4-BE49-F238E27FC236}">
+                <a16:creationId xmlns:a16="http://schemas.microsoft.com/office/drawing/2014/main" id="{6984CAB0-F369-4D66-BE9A-DE0C2025438B}"/>
+              </a:ext>
+            </a:extLst>
+          </p:cNvPr>
+          <p:cNvSpPr/>
+          <p:nvPr/>
+        </p:nvSpPr>
+        <p:spPr>
+          <a:xfrm>
+            <a:off x="5275000" y="4192066"/>
+            <a:ext cx="482601" cy="369455"/>
+          </a:xfrm>
+          <a:prstGeom prst="rightArrow">
+            <a:avLst/>
+          </a:prstGeom>
+        </p:spPr>
+        <p:style>
+          <a:lnRef idx="2">
+            <a:schemeClr val="accent4">
+              <a:shade val="50000"/>
+            </a:schemeClr>
+          </a:lnRef>
+          <a:fillRef idx="1">
+            <a:schemeClr val="accent4"/>
+          </a:fillRef>
+          <a:effectRef idx="0">
+            <a:schemeClr val="accent4"/>
+          </a:effectRef>
+          <a:fontRef idx="minor">
+            <a:schemeClr val="lt1"/>
+          </a:fontRef>
+        </p:style>
+        <p:txBody>
+          <a:bodyPr rtlCol="0" anchor="ctr"/>
+          <a:lstStyle/>
+          <a:p>
+            <a:pPr algn="ctr"/>
+            <a:endParaRPr lang="en-DE"/>
+          </a:p>
+        </p:txBody>
+      </p:sp>
+      <p:sp>
+        <p:nvSpPr>
+          <p:cNvPr id="30" name="Rectangle 29">
+            <a:extLst>
+              <a:ext uri="{FF2B5EF4-FFF2-40B4-BE49-F238E27FC236}">
+                <a16:creationId xmlns:a16="http://schemas.microsoft.com/office/drawing/2014/main" id="{930E55EF-56D3-4938-B7D4-83F9261BADEF}"/>
+              </a:ext>
+            </a:extLst>
+          </p:cNvPr>
+          <p:cNvSpPr/>
+          <p:nvPr/>
+        </p:nvSpPr>
+        <p:spPr>
+          <a:xfrm>
+            <a:off x="577844" y="2601582"/>
+            <a:ext cx="1859280" cy="152400"/>
+          </a:xfrm>
+          <a:prstGeom prst="rect">
+            <a:avLst/>
+          </a:prstGeom>
+          <a:noFill/>
+          <a:ln w="19050">
+            <a:solidFill>
+              <a:srgbClr val="C00000"/>
+            </a:solidFill>
+          </a:ln>
+        </p:spPr>
+        <p:style>
+          <a:lnRef idx="2">
+            <a:schemeClr val="accent5"/>
+          </a:lnRef>
+          <a:fillRef idx="1">
+            <a:schemeClr val="lt1"/>
+          </a:fillRef>
+          <a:effectRef idx="0">
+            <a:schemeClr val="accent5"/>
+          </a:effectRef>
+          <a:fontRef idx="minor">
+            <a:schemeClr val="dk1"/>
+          </a:fontRef>
+        </p:style>
+        <p:txBody>
+          <a:bodyPr rtlCol="0" anchor="ctr"/>
+          <a:lstStyle/>
+          <a:p>
+            <a:pPr algn="ctr"/>
+            <a:endParaRPr lang="en-DE"/>
+          </a:p>
+        </p:txBody>
+      </p:sp>
+      <p:cxnSp>
+        <p:nvCxnSpPr>
+          <p:cNvPr id="32" name="Straight Connector 31">
+            <a:extLst>
+              <a:ext uri="{FF2B5EF4-FFF2-40B4-BE49-F238E27FC236}">
+                <a16:creationId xmlns:a16="http://schemas.microsoft.com/office/drawing/2014/main" id="{CC77BC72-D7EA-4FDA-B0FC-5983E9055014}"/>
+              </a:ext>
+            </a:extLst>
+          </p:cNvPr>
+          <p:cNvCxnSpPr>
+            <a:cxnSpLocks/>
+            <a:stCxn id="30" idx="3"/>
+          </p:cNvCxnSpPr>
+          <p:nvPr/>
+        </p:nvCxnSpPr>
+        <p:spPr>
+          <a:xfrm>
+            <a:off x="2437124" y="2677782"/>
+            <a:ext cx="2837876" cy="1071683"/>
+          </a:xfrm>
+          <a:prstGeom prst="line">
+            <a:avLst/>
+          </a:prstGeom>
+          <a:ln w="19050">
+            <a:solidFill>
+              <a:srgbClr val="C00000"/>
+            </a:solidFill>
+          </a:ln>
+        </p:spPr>
+        <p:style>
+          <a:lnRef idx="1">
+            <a:schemeClr val="accent1"/>
+          </a:lnRef>
+          <a:fillRef idx="0">
+            <a:schemeClr val="accent1"/>
+          </a:fillRef>
+          <a:effectRef idx="0">
+            <a:schemeClr val="accent1"/>
+          </a:effectRef>
+          <a:fontRef idx="minor">
+            <a:schemeClr val="tx1"/>
+          </a:fontRef>
+        </p:style>
+      </p:cxnSp>
+      <p:sp>
+        <p:nvSpPr>
+          <p:cNvPr id="34" name="Arrow: Right 33">
+            <a:extLst>
+              <a:ext uri="{FF2B5EF4-FFF2-40B4-BE49-F238E27FC236}">
+                <a16:creationId xmlns:a16="http://schemas.microsoft.com/office/drawing/2014/main" id="{CB422D50-F155-49F6-9212-3726F376A0FE}"/>
+              </a:ext>
+            </a:extLst>
+          </p:cNvPr>
+          <p:cNvSpPr/>
+          <p:nvPr/>
+        </p:nvSpPr>
+        <p:spPr>
+          <a:xfrm>
+            <a:off x="5332147" y="3822611"/>
+            <a:ext cx="482601" cy="369455"/>
+          </a:xfrm>
+          <a:prstGeom prst="rightArrow">
+            <a:avLst/>
+          </a:prstGeom>
+        </p:spPr>
+        <p:style>
+          <a:lnRef idx="2">
+            <a:schemeClr val="accent4">
+              <a:shade val="50000"/>
+            </a:schemeClr>
+          </a:lnRef>
+          <a:fillRef idx="1">
+            <a:schemeClr val="accent4"/>
+          </a:fillRef>
+          <a:effectRef idx="0">
+            <a:schemeClr val="accent4"/>
+          </a:effectRef>
+          <a:fontRef idx="minor">
+            <a:schemeClr val="lt1"/>
+          </a:fontRef>
+        </p:style>
+        <p:txBody>
+          <a:bodyPr rtlCol="0" anchor="ctr"/>
+          <a:lstStyle/>
+          <a:p>
+            <a:pPr algn="ctr"/>
+            <a:endParaRPr lang="en-DE"/>
+          </a:p>
+        </p:txBody>
+      </p:sp>
+      <p:pic>
+        <p:nvPicPr>
+          <p:cNvPr id="35" name="Picture 34">
+            <a:extLst>
+              <a:ext uri="{FF2B5EF4-FFF2-40B4-BE49-F238E27FC236}">
+                <a16:creationId xmlns:a16="http://schemas.microsoft.com/office/drawing/2014/main" id="{D9125978-9A43-42A3-B3C4-8E27863EED5A}"/>
+              </a:ext>
+            </a:extLst>
+          </p:cNvPr>
+          <p:cNvPicPr>
+            <a:picLocks noChangeAspect="1"/>
+          </p:cNvPicPr>
+          <p:nvPr/>
+        </p:nvPicPr>
+        <p:blipFill>
+          <a:blip r:embed="rId6">
+            <a:extLst>
+              <a:ext uri="{28A0092B-C50C-407E-A947-70E740481C1C}">
+                <a14:useLocalDpi xmlns:a14="http://schemas.microsoft.com/office/drawing/2010/main" val="0"/>
+              </a:ext>
+            </a:extLst>
+          </a:blip>
+          <a:stretch>
+            <a:fillRect/>
+          </a:stretch>
+        </p:blipFill>
+        <p:spPr>
+          <a:xfrm>
+            <a:off x="5776073" y="2240593"/>
+            <a:ext cx="5838083" cy="1307439"/>
+          </a:xfrm>
+          <a:prstGeom prst="rect">
+            <a:avLst/>
+          </a:prstGeom>
+        </p:spPr>
+      </p:pic>
+      <p:sp>
+        <p:nvSpPr>
+          <p:cNvPr id="36" name="TextBox 35">
+            <a:extLst>
+              <a:ext uri="{FF2B5EF4-FFF2-40B4-BE49-F238E27FC236}">
+                <a16:creationId xmlns:a16="http://schemas.microsoft.com/office/drawing/2014/main" id="{9D326136-7865-4794-9FCA-A54EDF58F36F}"/>
+              </a:ext>
+            </a:extLst>
+          </p:cNvPr>
+          <p:cNvSpPr txBox="1"/>
+          <p:nvPr/>
+        </p:nvSpPr>
+        <p:spPr>
+          <a:xfrm>
+            <a:off x="6313677" y="4384854"/>
+            <a:ext cx="4929810" cy="646331"/>
+          </a:xfrm>
+          <a:prstGeom prst="rect">
+            <a:avLst/>
+          </a:prstGeom>
+          <a:noFill/>
+          <a:ln w="38100">
+            <a:solidFill>
+              <a:schemeClr val="accent3">
+                <a:lumMod val="75000"/>
+              </a:schemeClr>
+            </a:solidFill>
+          </a:ln>
+        </p:spPr>
+        <p:txBody>
+          <a:bodyPr wrap="square" rtlCol="0">
+            <a:spAutoFit/>
+          </a:bodyPr>
+          <a:lstStyle/>
+          <a:p>
+            <a:r>
+              <a:rPr lang="de-DE" b="1" dirty="0"/>
+              <a:t>The </a:t>
+            </a:r>
+            <a:r>
+              <a:rPr lang="de-DE" b="1" dirty="0" err="1"/>
+              <a:t>configuration</a:t>
+            </a:r>
+            <a:r>
+              <a:rPr lang="de-DE" b="1" dirty="0"/>
+              <a:t> </a:t>
+            </a:r>
+            <a:r>
+              <a:rPr lang="de-DE" b="1" dirty="0" err="1"/>
+              <a:t>settings</a:t>
+            </a:r>
+            <a:r>
+              <a:rPr lang="de-DE" b="1" dirty="0"/>
+              <a:t> </a:t>
+            </a:r>
+            <a:r>
+              <a:rPr lang="de-DE" b="1" dirty="0" err="1"/>
+              <a:t>are</a:t>
+            </a:r>
+            <a:r>
+              <a:rPr lang="de-DE" b="1" dirty="0"/>
+              <a:t> </a:t>
+            </a:r>
+            <a:r>
+              <a:rPr lang="de-DE" b="1" dirty="0" err="1"/>
+              <a:t>set</a:t>
+            </a:r>
+            <a:r>
+              <a:rPr lang="de-DE" b="1" dirty="0"/>
+              <a:t> in </a:t>
+            </a:r>
+            <a:r>
+              <a:rPr lang="de-DE" b="1" dirty="0" err="1"/>
+              <a:t>the</a:t>
+            </a:r>
+            <a:r>
+              <a:rPr lang="de-DE" b="1" dirty="0"/>
+              <a:t> </a:t>
+            </a:r>
+            <a:r>
+              <a:rPr lang="de-DE" b="1" dirty="0" err="1"/>
+              <a:t>default.cfg</a:t>
+            </a:r>
+            <a:r>
+              <a:rPr lang="de-DE" b="1" dirty="0"/>
+              <a:t> </a:t>
+            </a:r>
+            <a:r>
+              <a:rPr lang="de-DE" b="1" dirty="0" err="1"/>
+              <a:t>file</a:t>
+            </a:r>
+            <a:r>
+              <a:rPr lang="de-DE" b="1" dirty="0"/>
+              <a:t> (</a:t>
+            </a:r>
+            <a:r>
+              <a:rPr lang="de-DE" b="1" dirty="0" err="1"/>
+              <a:t>or</a:t>
+            </a:r>
+            <a:r>
+              <a:rPr lang="de-DE" b="1" dirty="0"/>
+              <a:t> in </a:t>
+            </a:r>
+            <a:r>
+              <a:rPr lang="de-DE" b="1" dirty="0" err="1"/>
+              <a:t>the</a:t>
+            </a:r>
+            <a:r>
+              <a:rPr lang="de-DE" b="1" dirty="0"/>
+              <a:t> </a:t>
+            </a:r>
+            <a:r>
+              <a:rPr lang="de-DE" b="1" dirty="0" err="1"/>
+              <a:t>sta</a:t>
+            </a:r>
+            <a:r>
+              <a:rPr lang="en-DE" b="1" dirty="0"/>
+              <a:t>r</a:t>
+            </a:r>
+            <a:r>
+              <a:rPr lang="de-DE" b="1" dirty="0"/>
+              <a:t>t </a:t>
+            </a:r>
+            <a:r>
+              <a:rPr lang="de-DE" b="1" dirty="0" err="1"/>
+              <a:t>scripts</a:t>
+            </a:r>
+            <a:r>
+              <a:rPr lang="de-DE" b="1" dirty="0"/>
+              <a:t>)</a:t>
+            </a:r>
+            <a:r>
+              <a:rPr lang="en-DE" b="1" dirty="0"/>
+              <a:t>.</a:t>
+            </a:r>
+            <a:endParaRPr lang="de-DE" b="1" dirty="0"/>
+          </a:p>
+        </p:txBody>
+      </p:sp>
+      <p:sp>
+        <p:nvSpPr>
+          <p:cNvPr id="39" name="Arrow: Right 38">
+            <a:extLst>
+              <a:ext uri="{FF2B5EF4-FFF2-40B4-BE49-F238E27FC236}">
+                <a16:creationId xmlns:a16="http://schemas.microsoft.com/office/drawing/2014/main" id="{3B036C45-8531-4B7A-8E7C-AD3A01996C8A}"/>
+              </a:ext>
+            </a:extLst>
+          </p:cNvPr>
+          <p:cNvSpPr/>
+          <p:nvPr/>
+        </p:nvSpPr>
+        <p:spPr>
+          <a:xfrm rot="5400000">
+            <a:off x="8646742" y="3881603"/>
+            <a:ext cx="482601" cy="369455"/>
+          </a:xfrm>
+          <a:prstGeom prst="rightArrow">
+            <a:avLst/>
+          </a:prstGeom>
+        </p:spPr>
+        <p:style>
+          <a:lnRef idx="2">
+            <a:schemeClr val="accent4">
+              <a:shade val="50000"/>
+            </a:schemeClr>
+          </a:lnRef>
+          <a:fillRef idx="1">
+            <a:schemeClr val="accent4"/>
+          </a:fillRef>
+          <a:effectRef idx="0">
+            <a:schemeClr val="accent4"/>
+          </a:effectRef>
+          <a:fontRef idx="minor">
+            <a:schemeClr val="lt1"/>
+          </a:fontRef>
+        </p:style>
+        <p:txBody>
+          <a:bodyPr rtlCol="0" anchor="ctr"/>
+          <a:lstStyle/>
+          <a:p>
+            <a:pPr algn="ctr"/>
+            <a:endParaRPr lang="en-DE"/>
+          </a:p>
+        </p:txBody>
+      </p:sp>
+      <p:sp>
+        <p:nvSpPr>
+          <p:cNvPr id="41" name="TextBox 40">
+            <a:extLst>
+              <a:ext uri="{FF2B5EF4-FFF2-40B4-BE49-F238E27FC236}">
+                <a16:creationId xmlns:a16="http://schemas.microsoft.com/office/drawing/2014/main" id="{48CC901E-553A-4CD1-AC23-35FF7A70CEF5}"/>
+              </a:ext>
+            </a:extLst>
+          </p:cNvPr>
+          <p:cNvSpPr txBox="1"/>
+          <p:nvPr/>
+        </p:nvSpPr>
+        <p:spPr>
+          <a:xfrm>
+            <a:off x="5810947" y="5410169"/>
+            <a:ext cx="5938141" cy="923330"/>
+          </a:xfrm>
+          <a:prstGeom prst="rect">
+            <a:avLst/>
+          </a:prstGeom>
+          <a:noFill/>
+          <a:ln w="38100">
+            <a:solidFill>
+              <a:schemeClr val="accent3">
+                <a:lumMod val="75000"/>
+              </a:schemeClr>
+            </a:solidFill>
+          </a:ln>
+        </p:spPr>
+        <p:txBody>
+          <a:bodyPr wrap="square" rtlCol="0">
+            <a:spAutoFit/>
+          </a:bodyPr>
+          <a:lstStyle/>
+          <a:p>
+            <a:r>
+              <a:rPr lang="de-DE" b="1" dirty="0" err="1">
+                <a:solidFill>
+                  <a:schemeClr val="accent2">
+                    <a:lumMod val="75000"/>
+                  </a:schemeClr>
+                </a:solidFill>
+              </a:rPr>
+              <a:t>Each</a:t>
+            </a:r>
+            <a:r>
+              <a:rPr lang="de-DE" b="1" dirty="0">
+                <a:solidFill>
+                  <a:schemeClr val="accent2">
+                    <a:lumMod val="75000"/>
+                  </a:schemeClr>
+                </a:solidFill>
+              </a:rPr>
+              <a:t> </a:t>
+            </a:r>
+            <a:r>
+              <a:rPr lang="de-DE" b="1" dirty="0" err="1">
+                <a:solidFill>
+                  <a:schemeClr val="accent2">
+                    <a:lumMod val="75000"/>
+                  </a:schemeClr>
+                </a:solidFill>
+              </a:rPr>
+              <a:t>folder</a:t>
+            </a:r>
+            <a:r>
+              <a:rPr lang="de-DE" b="1" dirty="0">
+                <a:solidFill>
+                  <a:schemeClr val="accent2">
+                    <a:lumMod val="75000"/>
+                  </a:schemeClr>
+                </a:solidFill>
+              </a:rPr>
+              <a:t> </a:t>
+            </a:r>
+            <a:r>
+              <a:rPr lang="de-DE" b="1" dirty="0" err="1">
+                <a:solidFill>
+                  <a:schemeClr val="accent2">
+                    <a:lumMod val="75000"/>
+                  </a:schemeClr>
+                </a:solidFill>
+              </a:rPr>
+              <a:t>within</a:t>
+            </a:r>
+            <a:r>
+              <a:rPr lang="de-DE" b="1" dirty="0">
+                <a:solidFill>
+                  <a:schemeClr val="accent2">
+                    <a:lumMod val="75000"/>
+                  </a:schemeClr>
+                </a:solidFill>
+              </a:rPr>
+              <a:t> </a:t>
+            </a:r>
+            <a:r>
+              <a:rPr lang="de-DE" b="1" dirty="0" err="1">
+                <a:solidFill>
+                  <a:schemeClr val="accent2">
+                    <a:lumMod val="75000"/>
+                  </a:schemeClr>
+                </a:solidFill>
+              </a:rPr>
+              <a:t>the</a:t>
+            </a:r>
+            <a:r>
+              <a:rPr lang="de-DE" b="1" dirty="0">
+                <a:solidFill>
+                  <a:schemeClr val="accent2">
+                    <a:lumMod val="75000"/>
+                  </a:schemeClr>
+                </a:solidFill>
+              </a:rPr>
+              <a:t> </a:t>
+            </a:r>
+            <a:r>
+              <a:rPr lang="de-DE" b="1" dirty="0" err="1">
+                <a:solidFill>
+                  <a:schemeClr val="accent2">
+                    <a:lumMod val="75000"/>
+                  </a:schemeClr>
+                </a:solidFill>
+              </a:rPr>
+              <a:t>modules</a:t>
+            </a:r>
+            <a:r>
+              <a:rPr lang="de-DE" b="1" dirty="0">
+                <a:solidFill>
+                  <a:schemeClr val="accent2">
+                    <a:lumMod val="75000"/>
+                  </a:schemeClr>
+                </a:solidFill>
+              </a:rPr>
+              <a:t> </a:t>
+            </a:r>
+            <a:r>
+              <a:rPr lang="de-DE" b="1" dirty="0" err="1">
+                <a:solidFill>
+                  <a:schemeClr val="accent2">
+                    <a:lumMod val="75000"/>
+                  </a:schemeClr>
+                </a:solidFill>
+              </a:rPr>
+              <a:t>folder</a:t>
+            </a:r>
+            <a:r>
+              <a:rPr lang="de-DE" b="1" dirty="0">
+                <a:solidFill>
+                  <a:schemeClr val="accent2">
+                    <a:lumMod val="75000"/>
+                  </a:schemeClr>
+                </a:solidFill>
+              </a:rPr>
+              <a:t> </a:t>
+            </a:r>
+            <a:r>
+              <a:rPr lang="de-DE" b="1" dirty="0" err="1"/>
+              <a:t>represent</a:t>
+            </a:r>
+            <a:r>
+              <a:rPr lang="en-DE" b="1" dirty="0"/>
+              <a:t>s</a:t>
+            </a:r>
+            <a:r>
+              <a:rPr lang="de-DE" b="1" dirty="0"/>
+              <a:t> a </a:t>
+            </a:r>
+            <a:r>
+              <a:rPr lang="de-DE" b="1" dirty="0" err="1"/>
+              <a:t>component</a:t>
+            </a:r>
+            <a:r>
+              <a:rPr lang="de-DE" b="1" dirty="0"/>
+              <a:t> </a:t>
+            </a:r>
+            <a:r>
+              <a:rPr lang="de-DE" b="1" dirty="0" err="1"/>
+              <a:t>of</a:t>
+            </a:r>
+            <a:r>
+              <a:rPr lang="de-DE" b="1" dirty="0"/>
+              <a:t> </a:t>
+            </a:r>
+            <a:r>
+              <a:rPr lang="de-DE" b="1" dirty="0" err="1"/>
+              <a:t>the</a:t>
+            </a:r>
+            <a:r>
+              <a:rPr lang="de-DE" b="1" dirty="0"/>
+              <a:t> </a:t>
+            </a:r>
+            <a:r>
+              <a:rPr lang="de-DE" b="1" dirty="0" err="1"/>
+              <a:t>model</a:t>
+            </a:r>
+            <a:r>
+              <a:rPr lang="de-DE" b="1" dirty="0"/>
+              <a:t> and </a:t>
+            </a:r>
+            <a:r>
+              <a:rPr lang="de-DE" b="1" dirty="0" err="1"/>
+              <a:t>contains</a:t>
+            </a:r>
+            <a:r>
+              <a:rPr lang="de-DE" b="1" dirty="0"/>
+              <a:t> different </a:t>
+            </a:r>
+            <a:r>
+              <a:rPr lang="de-DE" b="1" dirty="0" err="1"/>
+              <a:t>realizations</a:t>
+            </a:r>
+            <a:r>
+              <a:rPr lang="de-DE" b="1" dirty="0"/>
+              <a:t> (</a:t>
+            </a:r>
+            <a:r>
+              <a:rPr lang="de-DE" b="1" dirty="0" err="1"/>
+              <a:t>approaches</a:t>
+            </a:r>
+            <a:r>
+              <a:rPr lang="de-DE" b="1" dirty="0"/>
+              <a:t> </a:t>
+            </a:r>
+            <a:r>
+              <a:rPr lang="de-DE" b="1" dirty="0" err="1"/>
+              <a:t>to</a:t>
+            </a:r>
+            <a:r>
+              <a:rPr lang="de-DE" b="1" dirty="0"/>
+              <a:t> </a:t>
+            </a:r>
+            <a:r>
+              <a:rPr lang="de-DE" b="1" dirty="0" err="1"/>
+              <a:t>that</a:t>
+            </a:r>
+            <a:r>
+              <a:rPr lang="de-DE" b="1" dirty="0"/>
+              <a:t> </a:t>
+            </a:r>
+            <a:r>
+              <a:rPr lang="de-DE" b="1" dirty="0" err="1"/>
+              <a:t>component</a:t>
+            </a:r>
+            <a:r>
+              <a:rPr lang="de-DE" b="1" dirty="0"/>
+              <a:t>)</a:t>
+            </a:r>
+            <a:r>
+              <a:rPr lang="en-DE" b="1" dirty="0"/>
+              <a:t>.</a:t>
+            </a:r>
+            <a:endParaRPr lang="de-DE" b="1" dirty="0"/>
+          </a:p>
+        </p:txBody>
+      </p:sp>
+      <p:sp>
+        <p:nvSpPr>
+          <p:cNvPr id="42" name="Rectangle 41">
+            <a:extLst>
+              <a:ext uri="{FF2B5EF4-FFF2-40B4-BE49-F238E27FC236}">
+                <a16:creationId xmlns:a16="http://schemas.microsoft.com/office/drawing/2014/main" id="{8C4F91D1-E02B-412F-A881-F80AE5F69C9A}"/>
+              </a:ext>
+            </a:extLst>
+          </p:cNvPr>
+          <p:cNvSpPr/>
+          <p:nvPr/>
+        </p:nvSpPr>
+        <p:spPr>
+          <a:xfrm>
+            <a:off x="5878324" y="4561521"/>
+            <a:ext cx="3625188" cy="369332"/>
+          </a:xfrm>
+          <a:prstGeom prst="rect">
+            <a:avLst/>
+          </a:prstGeom>
+        </p:spPr>
+        <p:txBody>
+          <a:bodyPr wrap="square">
+            <a:spAutoFit/>
+          </a:bodyPr>
+          <a:lstStyle/>
+          <a:p>
+            <a:r>
+              <a:rPr lang="de-DE" b="1" dirty="0"/>
+              <a:t>4</a:t>
+            </a:r>
+            <a:r>
+              <a:rPr lang="en-DE" b="1" dirty="0"/>
+              <a:t>6</a:t>
+            </a:r>
+            <a:r>
+              <a:rPr lang="de-DE" b="1" dirty="0"/>
+              <a:t> </a:t>
+            </a:r>
+            <a:r>
+              <a:rPr lang="de-DE" b="1" dirty="0" err="1"/>
+              <a:t>modules</a:t>
+            </a:r>
+            <a:r>
+              <a:rPr lang="de-DE" b="1" dirty="0"/>
+              <a:t> and </a:t>
+            </a:r>
+            <a:r>
+              <a:rPr lang="de-DE" b="1" dirty="0" err="1"/>
+              <a:t>the</a:t>
+            </a:r>
+            <a:r>
+              <a:rPr lang="de-DE" b="1" dirty="0"/>
+              <a:t> </a:t>
+            </a:r>
+            <a:r>
+              <a:rPr lang="de-DE" b="1" dirty="0" err="1"/>
+              <a:t>include.gms</a:t>
+            </a:r>
+            <a:r>
+              <a:rPr lang="de-DE" b="1" dirty="0"/>
+              <a:t> </a:t>
+            </a:r>
+            <a:r>
+              <a:rPr lang="de-DE" b="1" dirty="0" err="1"/>
+              <a:t>file</a:t>
+            </a:r>
+            <a:endParaRPr lang="en-DE" dirty="0"/>
+          </a:p>
+        </p:txBody>
+      </p:sp>
+      <p:pic>
+        <p:nvPicPr>
+          <p:cNvPr id="12" name="Picture 11">
+            <a:extLst>
+              <a:ext uri="{FF2B5EF4-FFF2-40B4-BE49-F238E27FC236}">
+                <a16:creationId xmlns:a16="http://schemas.microsoft.com/office/drawing/2014/main" id="{B8C19E4C-4CB9-42DC-B385-75C88561197D}"/>
+              </a:ext>
+            </a:extLst>
+          </p:cNvPr>
+          <p:cNvPicPr>
+            <a:picLocks noChangeAspect="1"/>
+          </p:cNvPicPr>
+          <p:nvPr/>
+        </p:nvPicPr>
+        <p:blipFill rotWithShape="1">
+          <a:blip r:embed="rId7"/>
+          <a:srcRect r="58313" b="22159"/>
+          <a:stretch/>
+        </p:blipFill>
+        <p:spPr>
+          <a:xfrm>
             <a:off x="456846" y="4002209"/>
-            <a:ext cx="4686706" cy="746825"/>
+            <a:ext cx="4731887" cy="1407960"/>
           </a:xfrm>
           <a:prstGeom prst="rect">
             <a:avLst/>
@@ -11368,130 +12677,69 @@
           </a:fontRef>
         </p:style>
       </p:pic>
-      <p:pic>
-        <p:nvPicPr>
-          <p:cNvPr id="14" name="Picture 13">
-            <a:extLst>
-              <a:ext uri="{FF2B5EF4-FFF2-40B4-BE49-F238E27FC236}">
-                <a16:creationId xmlns:a16="http://schemas.microsoft.com/office/drawing/2014/main" id="{33B9D3A4-AEB7-42DC-A6D8-C15DBFBF875A}"/>
-              </a:ext>
-            </a:extLst>
-          </p:cNvPr>
-          <p:cNvPicPr>
-            <a:picLocks noChangeAspect="1"/>
-          </p:cNvPicPr>
+      <p:cxnSp>
+        <p:nvCxnSpPr>
+          <p:cNvPr id="24" name="Straight Connector 23">
+            <a:extLst>
+              <a:ext uri="{FF2B5EF4-FFF2-40B4-BE49-F238E27FC236}">
+                <a16:creationId xmlns:a16="http://schemas.microsoft.com/office/drawing/2014/main" id="{9A8EF5E1-D245-4AB3-A403-82B6FFFC410B}"/>
+              </a:ext>
+            </a:extLst>
+          </p:cNvPr>
+          <p:cNvCxnSpPr>
+            <a:cxnSpLocks/>
+            <a:stCxn id="10" idx="3"/>
+          </p:cNvCxnSpPr>
           <p:nvPr/>
-        </p:nvPicPr>
-        <p:blipFill rotWithShape="1">
-          <a:blip r:embed="rId5"/>
-          <a:srcRect t="1" b="62823"/>
-          <a:stretch/>
-        </p:blipFill>
+        </p:nvCxnSpPr>
         <p:spPr>
           <a:xfrm>
-            <a:off x="5810947" y="2394413"/>
-            <a:ext cx="4900394" cy="2162801"/>
+            <a:off x="2463949" y="2958878"/>
+            <a:ext cx="2688781" cy="1043331"/>
           </a:xfrm>
-          <a:prstGeom prst="rect">
+          <a:prstGeom prst="line">
             <a:avLst/>
           </a:prstGeom>
+          <a:ln w="19050">
+            <a:solidFill>
+              <a:srgbClr val="C00000"/>
+            </a:solidFill>
+          </a:ln>
         </p:spPr>
-      </p:pic>
-      <p:sp>
-        <p:nvSpPr>
-          <p:cNvPr id="15" name="TextBox 14">
-            <a:extLst>
-              <a:ext uri="{FF2B5EF4-FFF2-40B4-BE49-F238E27FC236}">
-                <a16:creationId xmlns:a16="http://schemas.microsoft.com/office/drawing/2014/main" id="{80E25418-9A8A-4FF7-B023-FF4B42840A1C}"/>
-              </a:ext>
-            </a:extLst>
-          </p:cNvPr>
-          <p:cNvSpPr txBox="1"/>
-          <p:nvPr/>
-        </p:nvSpPr>
-        <p:spPr>
-          <a:xfrm>
-            <a:off x="8004259" y="4441504"/>
-            <a:ext cx="300082" cy="923330"/>
-          </a:xfrm>
-          <a:prstGeom prst="rect">
-            <a:avLst/>
-          </a:prstGeom>
-          <a:noFill/>
-        </p:spPr>
-        <p:txBody>
-          <a:bodyPr wrap="none" rtlCol="0">
-            <a:spAutoFit/>
-          </a:bodyPr>
-          <a:lstStyle/>
-          <a:p>
-            <a:r>
-              <a:rPr lang="en-US" b="1" dirty="0">
-                <a:solidFill>
-                  <a:schemeClr val="tx1">
-                    <a:lumMod val="75000"/>
-                    <a:lumOff val="25000"/>
-                  </a:schemeClr>
-                </a:solidFill>
-              </a:rPr>
-              <a:t>*</a:t>
-            </a:r>
-          </a:p>
-          <a:p>
-            <a:r>
-              <a:rPr lang="en-US" b="1" dirty="0">
-                <a:solidFill>
-                  <a:schemeClr val="tx1">
-                    <a:lumMod val="75000"/>
-                    <a:lumOff val="25000"/>
-                  </a:schemeClr>
-                </a:solidFill>
-              </a:rPr>
-              <a:t>*</a:t>
-            </a:r>
-          </a:p>
-          <a:p>
-            <a:r>
-              <a:rPr lang="en-US" b="1" dirty="0">
-                <a:solidFill>
-                  <a:schemeClr val="tx1">
-                    <a:lumMod val="75000"/>
-                    <a:lumOff val="25000"/>
-                  </a:schemeClr>
-                </a:solidFill>
-              </a:rPr>
-              <a:t>*</a:t>
-            </a:r>
-            <a:endParaRPr lang="en-DE" b="1" dirty="0">
-              <a:solidFill>
-                <a:schemeClr val="tx1">
-                  <a:lumMod val="75000"/>
-                  <a:lumOff val="25000"/>
-                </a:schemeClr>
-              </a:solidFill>
-            </a:endParaRPr>
-          </a:p>
-        </p:txBody>
-      </p:sp>
+        <p:style>
+          <a:lnRef idx="1">
+            <a:schemeClr val="accent1"/>
+          </a:lnRef>
+          <a:fillRef idx="0">
+            <a:schemeClr val="accent1"/>
+          </a:fillRef>
+          <a:effectRef idx="0">
+            <a:schemeClr val="accent1"/>
+          </a:effectRef>
+          <a:fontRef idx="minor">
+            <a:schemeClr val="tx1"/>
+          </a:fontRef>
+        </p:style>
+      </p:cxnSp>
       <p:cxnSp>
         <p:nvCxnSpPr>
-          <p:cNvPr id="19" name="Straight Connector 18">
-            <a:extLst>
-              <a:ext uri="{FF2B5EF4-FFF2-40B4-BE49-F238E27FC236}">
-                <a16:creationId xmlns:a16="http://schemas.microsoft.com/office/drawing/2014/main" id="{CD9496E6-559C-4A58-B88D-FC02F67622FB}"/>
+          <p:cNvPr id="31" name="Straight Connector 30">
+            <a:extLst>
+              <a:ext uri="{FF2B5EF4-FFF2-40B4-BE49-F238E27FC236}">
+                <a16:creationId xmlns:a16="http://schemas.microsoft.com/office/drawing/2014/main" id="{4FDD7D43-1082-4917-86BB-66E4B216ADFD}"/>
               </a:ext>
             </a:extLst>
           </p:cNvPr>
           <p:cNvCxnSpPr>
             <a:cxnSpLocks/>
-            <a:stCxn id="10" idx="1"/>
+            <a:stCxn id="30" idx="1"/>
           </p:cNvCxnSpPr>
           <p:nvPr/>
         </p:nvCxnSpPr>
         <p:spPr>
           <a:xfrm flipH="1">
-            <a:off x="456846" y="3556984"/>
-            <a:ext cx="1111568" cy="437175"/>
+            <a:off x="424440" y="2677782"/>
+            <a:ext cx="153404" cy="1096773"/>
           </a:xfrm>
           <a:prstGeom prst="line">
             <a:avLst/>
@@ -11517,234 +12765,6 @@
           </a:fontRef>
         </p:style>
       </p:cxnSp>
-      <p:cxnSp>
-        <p:nvCxnSpPr>
-          <p:cNvPr id="24" name="Straight Connector 23">
-            <a:extLst>
-              <a:ext uri="{FF2B5EF4-FFF2-40B4-BE49-F238E27FC236}">
-                <a16:creationId xmlns:a16="http://schemas.microsoft.com/office/drawing/2014/main" id="{9A8EF5E1-D245-4AB3-A403-82B6FFFC410B}"/>
-              </a:ext>
-            </a:extLst>
-          </p:cNvPr>
-          <p:cNvCxnSpPr>
-            <a:cxnSpLocks/>
-            <a:stCxn id="10" idx="3"/>
-          </p:cNvCxnSpPr>
-          <p:nvPr/>
-        </p:nvCxnSpPr>
-        <p:spPr>
-          <a:xfrm>
-            <a:off x="3427694" y="3556984"/>
-            <a:ext cx="1715858" cy="437175"/>
-          </a:xfrm>
-          <a:prstGeom prst="line">
-            <a:avLst/>
-          </a:prstGeom>
-          <a:ln w="19050">
-            <a:solidFill>
-              <a:srgbClr val="C00000"/>
-            </a:solidFill>
-          </a:ln>
-        </p:spPr>
-        <p:style>
-          <a:lnRef idx="1">
-            <a:schemeClr val="accent1"/>
-          </a:lnRef>
-          <a:fillRef idx="0">
-            <a:schemeClr val="accent1"/>
-          </a:fillRef>
-          <a:effectRef idx="0">
-            <a:schemeClr val="accent1"/>
-          </a:effectRef>
-          <a:fontRef idx="minor">
-            <a:schemeClr val="tx1"/>
-          </a:fontRef>
-        </p:style>
-      </p:cxnSp>
-      <p:sp>
-        <p:nvSpPr>
-          <p:cNvPr id="29" name="Arrow: Right 28">
-            <a:extLst>
-              <a:ext uri="{FF2B5EF4-FFF2-40B4-BE49-F238E27FC236}">
-                <a16:creationId xmlns:a16="http://schemas.microsoft.com/office/drawing/2014/main" id="{6984CAB0-F369-4D66-BE9A-DE0C2025438B}"/>
-              </a:ext>
-            </a:extLst>
-          </p:cNvPr>
-          <p:cNvSpPr/>
-          <p:nvPr/>
-        </p:nvSpPr>
-        <p:spPr>
-          <a:xfrm>
-            <a:off x="5275000" y="4192066"/>
-            <a:ext cx="482601" cy="369455"/>
-          </a:xfrm>
-          <a:prstGeom prst="rightArrow">
-            <a:avLst/>
-          </a:prstGeom>
-        </p:spPr>
-        <p:style>
-          <a:lnRef idx="2">
-            <a:schemeClr val="accent4">
-              <a:shade val="50000"/>
-            </a:schemeClr>
-          </a:lnRef>
-          <a:fillRef idx="1">
-            <a:schemeClr val="accent4"/>
-          </a:fillRef>
-          <a:effectRef idx="0">
-            <a:schemeClr val="accent4"/>
-          </a:effectRef>
-          <a:fontRef idx="minor">
-            <a:schemeClr val="lt1"/>
-          </a:fontRef>
-        </p:style>
-        <p:txBody>
-          <a:bodyPr rtlCol="0" anchor="ctr"/>
-          <a:lstStyle/>
-          <a:p>
-            <a:pPr algn="ctr"/>
-            <a:endParaRPr lang="en-DE"/>
-          </a:p>
-        </p:txBody>
-      </p:sp>
-      <p:sp>
-        <p:nvSpPr>
-          <p:cNvPr id="30" name="Rectangle 29">
-            <a:extLst>
-              <a:ext uri="{FF2B5EF4-FFF2-40B4-BE49-F238E27FC236}">
-                <a16:creationId xmlns:a16="http://schemas.microsoft.com/office/drawing/2014/main" id="{930E55EF-56D3-4938-B7D4-83F9261BADEF}"/>
-              </a:ext>
-            </a:extLst>
-          </p:cNvPr>
-          <p:cNvSpPr/>
-          <p:nvPr/>
-        </p:nvSpPr>
-        <p:spPr>
-          <a:xfrm>
-            <a:off x="1568414" y="3244823"/>
-            <a:ext cx="1859280" cy="152400"/>
-          </a:xfrm>
-          <a:prstGeom prst="rect">
-            <a:avLst/>
-          </a:prstGeom>
-          <a:noFill/>
-          <a:ln w="19050">
-            <a:solidFill>
-              <a:srgbClr val="C00000"/>
-            </a:solidFill>
-          </a:ln>
-        </p:spPr>
-        <p:style>
-          <a:lnRef idx="2">
-            <a:schemeClr val="accent5"/>
-          </a:lnRef>
-          <a:fillRef idx="1">
-            <a:schemeClr val="lt1"/>
-          </a:fillRef>
-          <a:effectRef idx="0">
-            <a:schemeClr val="accent5"/>
-          </a:effectRef>
-          <a:fontRef idx="minor">
-            <a:schemeClr val="dk1"/>
-          </a:fontRef>
-        </p:style>
-        <p:txBody>
-          <a:bodyPr rtlCol="0" anchor="ctr"/>
-          <a:lstStyle/>
-          <a:p>
-            <a:pPr algn="ctr"/>
-            <a:endParaRPr lang="en-DE"/>
-          </a:p>
-        </p:txBody>
-      </p:sp>
-      <p:cxnSp>
-        <p:nvCxnSpPr>
-          <p:cNvPr id="31" name="Straight Connector 30">
-            <a:extLst>
-              <a:ext uri="{FF2B5EF4-FFF2-40B4-BE49-F238E27FC236}">
-                <a16:creationId xmlns:a16="http://schemas.microsoft.com/office/drawing/2014/main" id="{4FDD7D43-1082-4917-86BB-66E4B216ADFD}"/>
-              </a:ext>
-            </a:extLst>
-          </p:cNvPr>
-          <p:cNvCxnSpPr>
-            <a:cxnSpLocks/>
-            <a:stCxn id="30" idx="1"/>
-          </p:cNvCxnSpPr>
-          <p:nvPr/>
-        </p:nvCxnSpPr>
-        <p:spPr>
-          <a:xfrm flipH="1">
-            <a:off x="456846" y="3321023"/>
-            <a:ext cx="1111568" cy="437175"/>
-          </a:xfrm>
-          <a:prstGeom prst="line">
-            <a:avLst/>
-          </a:prstGeom>
-          <a:ln w="19050">
-            <a:solidFill>
-              <a:srgbClr val="C00000"/>
-            </a:solidFill>
-          </a:ln>
-        </p:spPr>
-        <p:style>
-          <a:lnRef idx="1">
-            <a:schemeClr val="accent5"/>
-          </a:lnRef>
-          <a:fillRef idx="0">
-            <a:schemeClr val="accent5"/>
-          </a:fillRef>
-          <a:effectRef idx="0">
-            <a:schemeClr val="accent5"/>
-          </a:effectRef>
-          <a:fontRef idx="minor">
-            <a:schemeClr val="tx1"/>
-          </a:fontRef>
-        </p:style>
-      </p:cxnSp>
-      <p:cxnSp>
-        <p:nvCxnSpPr>
-          <p:cNvPr id="32" name="Straight Connector 31">
-            <a:extLst>
-              <a:ext uri="{FF2B5EF4-FFF2-40B4-BE49-F238E27FC236}">
-                <a16:creationId xmlns:a16="http://schemas.microsoft.com/office/drawing/2014/main" id="{CC77BC72-D7EA-4FDA-B0FC-5983E9055014}"/>
-              </a:ext>
-            </a:extLst>
-          </p:cNvPr>
-          <p:cNvCxnSpPr>
-            <a:cxnSpLocks/>
-            <a:stCxn id="30" idx="3"/>
-          </p:cNvCxnSpPr>
-          <p:nvPr/>
-        </p:nvCxnSpPr>
-        <p:spPr>
-          <a:xfrm>
-            <a:off x="3427694" y="3321023"/>
-            <a:ext cx="1715858" cy="437175"/>
-          </a:xfrm>
-          <a:prstGeom prst="line">
-            <a:avLst/>
-          </a:prstGeom>
-          <a:ln w="19050">
-            <a:solidFill>
-              <a:srgbClr val="C00000"/>
-            </a:solidFill>
-          </a:ln>
-        </p:spPr>
-        <p:style>
-          <a:lnRef idx="1">
-            <a:schemeClr val="accent1"/>
-          </a:lnRef>
-          <a:fillRef idx="0">
-            <a:schemeClr val="accent1"/>
-          </a:fillRef>
-          <a:effectRef idx="0">
-            <a:schemeClr val="accent1"/>
-          </a:effectRef>
-          <a:fontRef idx="minor">
-            <a:schemeClr val="tx1"/>
-          </a:fontRef>
-        </p:style>
-      </p:cxnSp>
       <p:pic>
         <p:nvPicPr>
           <p:cNvPr id="33" name="Picture 32">
@@ -11759,16 +12779,15 @@
           </p:cNvPicPr>
           <p:nvPr/>
         </p:nvPicPr>
-        <p:blipFill>
-          <a:blip r:embed="rId6"/>
-          <a:stretch>
-            <a:fillRect/>
-          </a:stretch>
+        <p:blipFill rotWithShape="1">
+          <a:blip r:embed="rId8"/>
+          <a:srcRect r="46864" b="3917"/>
+          <a:stretch/>
         </p:blipFill>
         <p:spPr>
           <a:xfrm>
-            <a:off x="424440" y="3767867"/>
-            <a:ext cx="4854361" cy="701101"/>
+            <a:off x="424441" y="3767867"/>
+            <a:ext cx="4837368" cy="1263318"/>
           </a:xfrm>
           <a:prstGeom prst="rect">
             <a:avLst/>
@@ -11780,566 +12799,6 @@
           </a:ln>
         </p:spPr>
       </p:pic>
-      <p:sp>
-        <p:nvSpPr>
-          <p:cNvPr id="34" name="Arrow: Right 33">
-            <a:extLst>
-              <a:ext uri="{FF2B5EF4-FFF2-40B4-BE49-F238E27FC236}">
-                <a16:creationId xmlns:a16="http://schemas.microsoft.com/office/drawing/2014/main" id="{CB422D50-F155-49F6-9212-3726F376A0FE}"/>
-              </a:ext>
-            </a:extLst>
-          </p:cNvPr>
-          <p:cNvSpPr/>
-          <p:nvPr/>
-        </p:nvSpPr>
-        <p:spPr>
-          <a:xfrm>
-            <a:off x="5332147" y="3822611"/>
-            <a:ext cx="482601" cy="369455"/>
-          </a:xfrm>
-          <a:prstGeom prst="rightArrow">
-            <a:avLst/>
-          </a:prstGeom>
-        </p:spPr>
-        <p:style>
-          <a:lnRef idx="2">
-            <a:schemeClr val="accent4">
-              <a:shade val="50000"/>
-            </a:schemeClr>
-          </a:lnRef>
-          <a:fillRef idx="1">
-            <a:schemeClr val="accent4"/>
-          </a:fillRef>
-          <a:effectRef idx="0">
-            <a:schemeClr val="accent4"/>
-          </a:effectRef>
-          <a:fontRef idx="minor">
-            <a:schemeClr val="lt1"/>
-          </a:fontRef>
-        </p:style>
-        <p:txBody>
-          <a:bodyPr rtlCol="0" anchor="ctr"/>
-          <a:lstStyle/>
-          <a:p>
-            <a:pPr algn="ctr"/>
-            <a:endParaRPr lang="en-DE"/>
-          </a:p>
-        </p:txBody>
-      </p:sp>
-      <p:pic>
-        <p:nvPicPr>
-          <p:cNvPr id="35" name="Picture 34">
-            <a:extLst>
-              <a:ext uri="{FF2B5EF4-FFF2-40B4-BE49-F238E27FC236}">
-                <a16:creationId xmlns:a16="http://schemas.microsoft.com/office/drawing/2014/main" id="{D9125978-9A43-42A3-B3C4-8E27863EED5A}"/>
-              </a:ext>
-            </a:extLst>
-          </p:cNvPr>
-          <p:cNvPicPr>
-            <a:picLocks noChangeAspect="1"/>
-          </p:cNvPicPr>
-          <p:nvPr/>
-        </p:nvPicPr>
-        <p:blipFill rotWithShape="1">
-          <a:blip r:embed="rId7"/>
-          <a:srcRect r="8381" b="15642"/>
-          <a:stretch/>
-        </p:blipFill>
-        <p:spPr>
-          <a:xfrm>
-            <a:off x="5776073" y="1968153"/>
-            <a:ext cx="5838083" cy="1852320"/>
-          </a:xfrm>
-          <a:prstGeom prst="rect">
-            <a:avLst/>
-          </a:prstGeom>
-        </p:spPr>
-      </p:pic>
-      <p:sp>
-        <p:nvSpPr>
-          <p:cNvPr id="36" name="TextBox 35">
-            <a:extLst>
-              <a:ext uri="{FF2B5EF4-FFF2-40B4-BE49-F238E27FC236}">
-                <a16:creationId xmlns:a16="http://schemas.microsoft.com/office/drawing/2014/main" id="{9D326136-7865-4794-9FCA-A54EDF58F36F}"/>
-              </a:ext>
-            </a:extLst>
-          </p:cNvPr>
-          <p:cNvSpPr txBox="1"/>
-          <p:nvPr/>
-        </p:nvSpPr>
-        <p:spPr>
-          <a:xfrm>
-            <a:off x="6313677" y="4384854"/>
-            <a:ext cx="4929810" cy="646331"/>
-          </a:xfrm>
-          <a:prstGeom prst="rect">
-            <a:avLst/>
-          </a:prstGeom>
-          <a:noFill/>
-          <a:ln w="38100">
-            <a:solidFill>
-              <a:schemeClr val="accent3">
-                <a:lumMod val="75000"/>
-              </a:schemeClr>
-            </a:solidFill>
-          </a:ln>
-        </p:spPr>
-        <p:txBody>
-          <a:bodyPr wrap="square" rtlCol="0">
-            <a:spAutoFit/>
-          </a:bodyPr>
-          <a:lstStyle/>
-          <a:p>
-            <a:r>
-              <a:rPr lang="de-DE" b="1" dirty="0"/>
-              <a:t>The </a:t>
-            </a:r>
-            <a:r>
-              <a:rPr lang="de-DE" b="1" dirty="0" err="1"/>
-              <a:t>configuration</a:t>
-            </a:r>
-            <a:r>
-              <a:rPr lang="de-DE" b="1" dirty="0"/>
-              <a:t> </a:t>
-            </a:r>
-            <a:r>
-              <a:rPr lang="de-DE" b="1" dirty="0" err="1"/>
-              <a:t>settings</a:t>
-            </a:r>
-            <a:r>
-              <a:rPr lang="de-DE" b="1" dirty="0"/>
-              <a:t> </a:t>
-            </a:r>
-            <a:r>
-              <a:rPr lang="de-DE" b="1" dirty="0" err="1"/>
-              <a:t>are</a:t>
-            </a:r>
-            <a:r>
-              <a:rPr lang="de-DE" b="1" dirty="0"/>
-              <a:t> </a:t>
-            </a:r>
-            <a:r>
-              <a:rPr lang="de-DE" b="1" dirty="0" err="1"/>
-              <a:t>set</a:t>
-            </a:r>
-            <a:r>
-              <a:rPr lang="de-DE" b="1" dirty="0"/>
-              <a:t> in </a:t>
-            </a:r>
-            <a:r>
-              <a:rPr lang="de-DE" b="1" dirty="0" err="1"/>
-              <a:t>the</a:t>
-            </a:r>
-            <a:r>
-              <a:rPr lang="de-DE" b="1" dirty="0"/>
-              <a:t> </a:t>
-            </a:r>
-            <a:r>
-              <a:rPr lang="de-DE" b="1" dirty="0" err="1"/>
-              <a:t>default.cfg</a:t>
-            </a:r>
-            <a:r>
-              <a:rPr lang="de-DE" b="1" dirty="0"/>
-              <a:t> </a:t>
-            </a:r>
-            <a:r>
-              <a:rPr lang="de-DE" b="1" dirty="0" err="1"/>
-              <a:t>file</a:t>
-            </a:r>
-            <a:r>
-              <a:rPr lang="de-DE" b="1" dirty="0"/>
-              <a:t> (</a:t>
-            </a:r>
-            <a:r>
-              <a:rPr lang="de-DE" b="1" dirty="0" err="1"/>
-              <a:t>or</a:t>
-            </a:r>
-            <a:r>
-              <a:rPr lang="de-DE" b="1" dirty="0"/>
-              <a:t> in </a:t>
-            </a:r>
-            <a:r>
-              <a:rPr lang="de-DE" b="1" dirty="0" err="1"/>
-              <a:t>the</a:t>
-            </a:r>
-            <a:r>
-              <a:rPr lang="de-DE" b="1" dirty="0"/>
-              <a:t> </a:t>
-            </a:r>
-            <a:r>
-              <a:rPr lang="de-DE" b="1" dirty="0" err="1"/>
-              <a:t>stat</a:t>
-            </a:r>
-            <a:r>
-              <a:rPr lang="de-DE" b="1" dirty="0"/>
-              <a:t> </a:t>
-            </a:r>
-            <a:r>
-              <a:rPr lang="de-DE" b="1" dirty="0" err="1"/>
-              <a:t>scripts</a:t>
-            </a:r>
-            <a:r>
-              <a:rPr lang="de-DE" b="1" dirty="0"/>
-              <a:t>)</a:t>
-            </a:r>
-          </a:p>
-        </p:txBody>
-      </p:sp>
-      <p:sp>
-        <p:nvSpPr>
-          <p:cNvPr id="39" name="Arrow: Right 38">
-            <a:extLst>
-              <a:ext uri="{FF2B5EF4-FFF2-40B4-BE49-F238E27FC236}">
-                <a16:creationId xmlns:a16="http://schemas.microsoft.com/office/drawing/2014/main" id="{3B036C45-8531-4B7A-8E7C-AD3A01996C8A}"/>
-              </a:ext>
-            </a:extLst>
-          </p:cNvPr>
-          <p:cNvSpPr/>
-          <p:nvPr/>
-        </p:nvSpPr>
-        <p:spPr>
-          <a:xfrm rot="5400000">
-            <a:off x="8646742" y="3881603"/>
-            <a:ext cx="482601" cy="369455"/>
-          </a:xfrm>
-          <a:prstGeom prst="rightArrow">
-            <a:avLst/>
-          </a:prstGeom>
-        </p:spPr>
-        <p:style>
-          <a:lnRef idx="2">
-            <a:schemeClr val="accent4">
-              <a:shade val="50000"/>
-            </a:schemeClr>
-          </a:lnRef>
-          <a:fillRef idx="1">
-            <a:schemeClr val="accent4"/>
-          </a:fillRef>
-          <a:effectRef idx="0">
-            <a:schemeClr val="accent4"/>
-          </a:effectRef>
-          <a:fontRef idx="minor">
-            <a:schemeClr val="lt1"/>
-          </a:fontRef>
-        </p:style>
-        <p:txBody>
-          <a:bodyPr rtlCol="0" anchor="ctr"/>
-          <a:lstStyle/>
-          <a:p>
-            <a:pPr algn="ctr"/>
-            <a:endParaRPr lang="en-DE"/>
-          </a:p>
-        </p:txBody>
-      </p:sp>
-      <p:sp>
-        <p:nvSpPr>
-          <p:cNvPr id="41" name="TextBox 40">
-            <a:extLst>
-              <a:ext uri="{FF2B5EF4-FFF2-40B4-BE49-F238E27FC236}">
-                <a16:creationId xmlns:a16="http://schemas.microsoft.com/office/drawing/2014/main" id="{48CC901E-553A-4CD1-AC23-35FF7A70CEF5}"/>
-              </a:ext>
-            </a:extLst>
-          </p:cNvPr>
-          <p:cNvSpPr txBox="1"/>
-          <p:nvPr/>
-        </p:nvSpPr>
-        <p:spPr>
-          <a:xfrm>
-            <a:off x="5810947" y="5410169"/>
-            <a:ext cx="5938141" cy="923330"/>
-          </a:xfrm>
-          <a:prstGeom prst="rect">
-            <a:avLst/>
-          </a:prstGeom>
-          <a:noFill/>
-          <a:ln w="38100">
-            <a:solidFill>
-              <a:schemeClr val="accent3">
-                <a:lumMod val="75000"/>
-              </a:schemeClr>
-            </a:solidFill>
-          </a:ln>
-        </p:spPr>
-        <p:txBody>
-          <a:bodyPr wrap="square" rtlCol="0">
-            <a:spAutoFit/>
-          </a:bodyPr>
-          <a:lstStyle/>
-          <a:p>
-            <a:r>
-              <a:rPr lang="de-DE" b="1" dirty="0" err="1">
-                <a:solidFill>
-                  <a:schemeClr val="accent2">
-                    <a:lumMod val="75000"/>
-                  </a:schemeClr>
-                </a:solidFill>
-              </a:rPr>
-              <a:t>Each</a:t>
-            </a:r>
-            <a:r>
-              <a:rPr lang="de-DE" b="1" dirty="0">
-                <a:solidFill>
-                  <a:schemeClr val="accent2">
-                    <a:lumMod val="75000"/>
-                  </a:schemeClr>
-                </a:solidFill>
-              </a:rPr>
-              <a:t> </a:t>
-            </a:r>
-            <a:r>
-              <a:rPr lang="de-DE" b="1" dirty="0" err="1">
-                <a:solidFill>
-                  <a:schemeClr val="accent2">
-                    <a:lumMod val="75000"/>
-                  </a:schemeClr>
-                </a:solidFill>
-              </a:rPr>
-              <a:t>folder</a:t>
-            </a:r>
-            <a:r>
-              <a:rPr lang="de-DE" b="1" dirty="0">
-                <a:solidFill>
-                  <a:schemeClr val="accent2">
-                    <a:lumMod val="75000"/>
-                  </a:schemeClr>
-                </a:solidFill>
-              </a:rPr>
-              <a:t> </a:t>
-            </a:r>
-            <a:r>
-              <a:rPr lang="de-DE" b="1" dirty="0" err="1">
-                <a:solidFill>
-                  <a:schemeClr val="accent2">
-                    <a:lumMod val="75000"/>
-                  </a:schemeClr>
-                </a:solidFill>
-              </a:rPr>
-              <a:t>within</a:t>
-            </a:r>
-            <a:r>
-              <a:rPr lang="de-DE" b="1" dirty="0">
-                <a:solidFill>
-                  <a:schemeClr val="accent2">
-                    <a:lumMod val="75000"/>
-                  </a:schemeClr>
-                </a:solidFill>
-              </a:rPr>
-              <a:t> </a:t>
-            </a:r>
-            <a:r>
-              <a:rPr lang="de-DE" b="1" dirty="0" err="1">
-                <a:solidFill>
-                  <a:schemeClr val="accent2">
-                    <a:lumMod val="75000"/>
-                  </a:schemeClr>
-                </a:solidFill>
-              </a:rPr>
-              <a:t>the</a:t>
-            </a:r>
-            <a:r>
-              <a:rPr lang="de-DE" b="1" dirty="0">
-                <a:solidFill>
-                  <a:schemeClr val="accent2">
-                    <a:lumMod val="75000"/>
-                  </a:schemeClr>
-                </a:solidFill>
-              </a:rPr>
-              <a:t> </a:t>
-            </a:r>
-            <a:r>
-              <a:rPr lang="de-DE" b="1" dirty="0" err="1">
-                <a:solidFill>
-                  <a:schemeClr val="accent2">
-                    <a:lumMod val="75000"/>
-                  </a:schemeClr>
-                </a:solidFill>
-              </a:rPr>
-              <a:t>modules</a:t>
-            </a:r>
-            <a:r>
-              <a:rPr lang="de-DE" b="1" dirty="0">
-                <a:solidFill>
-                  <a:schemeClr val="accent2">
-                    <a:lumMod val="75000"/>
-                  </a:schemeClr>
-                </a:solidFill>
-              </a:rPr>
-              <a:t> </a:t>
-            </a:r>
-            <a:r>
-              <a:rPr lang="de-DE" b="1" dirty="0" err="1">
-                <a:solidFill>
-                  <a:schemeClr val="accent2">
-                    <a:lumMod val="75000"/>
-                  </a:schemeClr>
-                </a:solidFill>
-              </a:rPr>
-              <a:t>folder</a:t>
-            </a:r>
-            <a:r>
-              <a:rPr lang="de-DE" b="1" dirty="0">
-                <a:solidFill>
-                  <a:schemeClr val="accent2">
-                    <a:lumMod val="75000"/>
-                  </a:schemeClr>
-                </a:solidFill>
-              </a:rPr>
-              <a:t> </a:t>
-            </a:r>
-            <a:r>
-              <a:rPr lang="de-DE" b="1" dirty="0" err="1"/>
-              <a:t>represent</a:t>
-            </a:r>
-            <a:r>
-              <a:rPr lang="de-DE" b="1" dirty="0"/>
-              <a:t> a </a:t>
-            </a:r>
-            <a:r>
-              <a:rPr lang="de-DE" b="1" dirty="0" err="1"/>
-              <a:t>component</a:t>
-            </a:r>
-            <a:r>
-              <a:rPr lang="de-DE" b="1" dirty="0"/>
-              <a:t> </a:t>
-            </a:r>
-            <a:r>
-              <a:rPr lang="de-DE" b="1" dirty="0" err="1"/>
-              <a:t>of</a:t>
-            </a:r>
-            <a:r>
-              <a:rPr lang="de-DE" b="1" dirty="0"/>
-              <a:t> </a:t>
-            </a:r>
-            <a:r>
-              <a:rPr lang="de-DE" b="1" dirty="0" err="1"/>
-              <a:t>the</a:t>
-            </a:r>
-            <a:r>
-              <a:rPr lang="de-DE" b="1" dirty="0"/>
-              <a:t> </a:t>
-            </a:r>
-            <a:r>
-              <a:rPr lang="de-DE" b="1" dirty="0" err="1"/>
-              <a:t>model</a:t>
-            </a:r>
-            <a:r>
-              <a:rPr lang="de-DE" b="1" dirty="0"/>
-              <a:t> and </a:t>
-            </a:r>
-            <a:r>
-              <a:rPr lang="de-DE" b="1" dirty="0" err="1"/>
-              <a:t>contains</a:t>
-            </a:r>
-            <a:r>
-              <a:rPr lang="de-DE" b="1" dirty="0"/>
-              <a:t> different </a:t>
-            </a:r>
-            <a:r>
-              <a:rPr lang="de-DE" b="1" dirty="0" err="1"/>
-              <a:t>realizations</a:t>
-            </a:r>
-            <a:r>
-              <a:rPr lang="de-DE" b="1" dirty="0"/>
-              <a:t> (</a:t>
-            </a:r>
-            <a:r>
-              <a:rPr lang="de-DE" b="1" dirty="0" err="1"/>
-              <a:t>approaches</a:t>
-            </a:r>
-            <a:r>
-              <a:rPr lang="de-DE" b="1" dirty="0"/>
-              <a:t> </a:t>
-            </a:r>
-            <a:r>
-              <a:rPr lang="de-DE" b="1" dirty="0" err="1"/>
-              <a:t>to</a:t>
-            </a:r>
-            <a:r>
-              <a:rPr lang="de-DE" b="1" dirty="0"/>
-              <a:t> </a:t>
-            </a:r>
-            <a:r>
-              <a:rPr lang="de-DE" b="1" dirty="0" err="1"/>
-              <a:t>that</a:t>
-            </a:r>
-            <a:r>
-              <a:rPr lang="de-DE" b="1" dirty="0"/>
-              <a:t> </a:t>
-            </a:r>
-            <a:r>
-              <a:rPr lang="de-DE" b="1" dirty="0" err="1"/>
-              <a:t>component</a:t>
-            </a:r>
-            <a:r>
-              <a:rPr lang="de-DE" b="1" dirty="0"/>
-              <a:t>)</a:t>
-            </a:r>
-          </a:p>
-        </p:txBody>
-      </p:sp>
-      <p:sp>
-        <p:nvSpPr>
-          <p:cNvPr id="42" name="Rectangle 41">
-            <a:extLst>
-              <a:ext uri="{FF2B5EF4-FFF2-40B4-BE49-F238E27FC236}">
-                <a16:creationId xmlns:a16="http://schemas.microsoft.com/office/drawing/2014/main" id="{8C4F91D1-E02B-412F-A881-F80AE5F69C9A}"/>
-              </a:ext>
-            </a:extLst>
-          </p:cNvPr>
-          <p:cNvSpPr/>
-          <p:nvPr/>
-        </p:nvSpPr>
-        <p:spPr>
-          <a:xfrm>
-            <a:off x="8261144" y="4775904"/>
-            <a:ext cx="3353012" cy="646331"/>
-          </a:xfrm>
-          <a:prstGeom prst="rect">
-            <a:avLst/>
-          </a:prstGeom>
-        </p:spPr>
-        <p:txBody>
-          <a:bodyPr wrap="square">
-            <a:spAutoFit/>
-          </a:bodyPr>
-          <a:lstStyle/>
-          <a:p>
-            <a:r>
-              <a:rPr lang="de-DE" b="1" dirty="0"/>
-              <a:t>45 </a:t>
-            </a:r>
-            <a:r>
-              <a:rPr lang="de-DE" b="1" dirty="0" err="1"/>
-              <a:t>modules</a:t>
-            </a:r>
-            <a:r>
-              <a:rPr lang="de-DE" b="1" dirty="0"/>
-              <a:t> and </a:t>
-            </a:r>
-            <a:r>
-              <a:rPr lang="de-DE" b="1" dirty="0" err="1"/>
-              <a:t>the</a:t>
-            </a:r>
-            <a:r>
-              <a:rPr lang="de-DE" b="1" dirty="0"/>
-              <a:t> </a:t>
-            </a:r>
-            <a:r>
-              <a:rPr lang="de-DE" b="1" dirty="0" err="1"/>
-              <a:t>include.gms</a:t>
-            </a:r>
-            <a:r>
-              <a:rPr lang="de-DE" b="1" dirty="0"/>
-              <a:t> </a:t>
-            </a:r>
-            <a:r>
-              <a:rPr lang="de-DE" b="1" dirty="0" err="1"/>
-              <a:t>file</a:t>
-            </a:r>
-            <a:endParaRPr lang="en-DE" dirty="0"/>
-          </a:p>
-        </p:txBody>
-      </p:sp>
     </p:spTree>
     <p:extLst>
       <p:ext uri="{BB962C8B-B14F-4D97-AF65-F5344CB8AC3E}">
@@ -13053,7 +13512,7 @@
                                           </p:stCondLst>
                                         </p:cTn>
                                         <p:tgtEl>
-                                          <p:spTgt spid="15"/>
+                                          <p:spTgt spid="42"/>
                                         </p:tgtEl>
                                         <p:attrNameLst>
                                           <p:attrName>style.visibility</p:attrName>
@@ -13080,7 +13539,7 @@
                                           </p:stCondLst>
                                         </p:cTn>
                                         <p:tgtEl>
-                                          <p:spTgt spid="42"/>
+                                          <p:spTgt spid="29"/>
                                         </p:tgtEl>
                                         <p:attrNameLst>
                                           <p:attrName>style.visibility</p:attrName>
@@ -13102,33 +13561,6 @@
                                     <p:set>
                                       <p:cBhvr>
                                         <p:cTn id="62" dur="1" fill="hold">
-                                          <p:stCondLst>
-                                            <p:cond delay="0"/>
-                                          </p:stCondLst>
-                                        </p:cTn>
-                                        <p:tgtEl>
-                                          <p:spTgt spid="29"/>
-                                        </p:tgtEl>
-                                        <p:attrNameLst>
-                                          <p:attrName>style.visibility</p:attrName>
-                                        </p:attrNameLst>
-                                      </p:cBhvr>
-                                      <p:to>
-                                        <p:strVal val="visible"/>
-                                      </p:to>
-                                    </p:set>
-                                  </p:childTnLst>
-                                </p:cTn>
-                              </p:par>
-                              <p:par>
-                                <p:cTn id="63" presetID="1" presetClass="entr" presetSubtype="0" fill="hold" grpId="0" nodeType="withEffect">
-                                  <p:stCondLst>
-                                    <p:cond delay="0"/>
-                                  </p:stCondLst>
-                                  <p:childTnLst>
-                                    <p:set>
-                                      <p:cBhvr>
-                                        <p:cTn id="64" dur="1" fill="hold">
                                           <p:stCondLst>
                                             <p:cond delay="0"/>
                                           </p:stCondLst>
@@ -13176,7 +13608,6 @@
     </p:tnLst>
     <p:bldLst>
       <p:bldP spid="10" grpId="0" animBg="1"/>
-      <p:bldP spid="15" grpId="0"/>
       <p:bldP spid="29" grpId="0" animBg="1"/>
       <p:bldP spid="30" grpId="0" animBg="1"/>
       <p:bldP spid="30" grpId="1" animBg="1"/>
@@ -13327,7 +13758,7 @@
           <a:p>
             <a:r>
               <a:rPr lang="en-DE"/>
-              <a:t>10.04.2024</a:t>
+              <a:t>16.06.2025</a:t>
             </a:r>
           </a:p>
         </p:txBody>
@@ -13355,7 +13786,7 @@
           <a:p>
             <a:r>
               <a:rPr lang="en-US"/>
-              <a:t>MAgPIE24 Workshop &amp; Stories </a:t>
+              <a:t>MAgPIE25 Workshop &amp; Stories </a:t>
             </a:r>
             <a:endParaRPr lang="en-DE"/>
           </a:p>
@@ -13405,15 +13836,21 @@
           <p:nvPr/>
         </p:nvPicPr>
         <p:blipFill>
-          <a:blip r:embed="rId2"/>
+          <a:blip r:embed="rId3">
+            <a:extLst>
+              <a:ext uri="{28A0092B-C50C-407E-A947-70E740481C1C}">
+                <a14:useLocalDpi xmlns:a14="http://schemas.microsoft.com/office/drawing/2010/main" val="0"/>
+              </a:ext>
+            </a:extLst>
+          </a:blip>
           <a:stretch>
             <a:fillRect/>
           </a:stretch>
         </p:blipFill>
         <p:spPr>
           <a:xfrm>
-            <a:off x="1071100" y="1646787"/>
-            <a:ext cx="6264183" cy="2651990"/>
+            <a:off x="1096500" y="2053684"/>
+            <a:ext cx="6264183" cy="1825390"/>
           </a:xfrm>
           <a:prstGeom prst="rect">
             <a:avLst/>
@@ -13434,7 +13871,7 @@
         </p:nvSpPr>
         <p:spPr>
           <a:xfrm>
-            <a:off x="6626352" y="2408185"/>
+            <a:off x="6626352" y="2065285"/>
             <a:ext cx="4458785" cy="369332"/>
           </a:xfrm>
           <a:prstGeom prst="rect">
@@ -13487,7 +13924,7 @@
         </p:nvSpPr>
         <p:spPr>
           <a:xfrm>
-            <a:off x="6626350" y="3008997"/>
+            <a:off x="6626350" y="2666097"/>
             <a:ext cx="4458785" cy="646331"/>
           </a:xfrm>
           <a:prstGeom prst="rect">
@@ -13539,7 +13976,7 @@
         </p:nvSpPr>
         <p:spPr>
           <a:xfrm>
-            <a:off x="6626351" y="3763561"/>
+            <a:off x="6626351" y="3420661"/>
             <a:ext cx="4458785" cy="646331"/>
           </a:xfrm>
           <a:prstGeom prst="rect">
@@ -13610,7 +14047,7 @@
         </p:nvCxnSpPr>
         <p:spPr>
           <a:xfrm flipV="1">
-            <a:off x="5440680" y="2602597"/>
+            <a:off x="5520436" y="2310224"/>
             <a:ext cx="1030224" cy="174921"/>
           </a:xfrm>
           <a:prstGeom prst="straightConnector1">
@@ -13646,7 +14083,7 @@
         </p:nvCxnSpPr>
         <p:spPr>
           <a:xfrm>
-            <a:off x="5650992" y="3265147"/>
+            <a:off x="5676392" y="2909547"/>
             <a:ext cx="819912" cy="0"/>
           </a:xfrm>
           <a:prstGeom prst="straightConnector1">
@@ -13680,8 +14117,8 @@
         </p:nvSpPr>
         <p:spPr>
           <a:xfrm>
-            <a:off x="5337048" y="2826799"/>
-            <a:ext cx="237744" cy="830997"/>
+            <a:off x="5337047" y="2369598"/>
+            <a:ext cx="625349" cy="1015663"/>
           </a:xfrm>
           <a:prstGeom prst="rect">
             <a:avLst/>
@@ -13695,14 +14132,14 @@
           <a:lstStyle/>
           <a:p>
             <a:r>
-              <a:rPr lang="en-US" sz="4800" dirty="0">
+              <a:rPr lang="en-US" sz="6000" dirty="0">
                 <a:solidFill>
                   <a:srgbClr val="C00000"/>
                 </a:solidFill>
               </a:rPr>
               <a:t>}</a:t>
             </a:r>
-            <a:endParaRPr lang="en-DE" dirty="0">
+            <a:endParaRPr lang="en-DE" sz="2400" dirty="0">
               <a:solidFill>
                 <a:srgbClr val="C00000"/>
               </a:solidFill>
@@ -13726,7 +14163,7 @@
         </p:nvCxnSpPr>
         <p:spPr>
           <a:xfrm>
-            <a:off x="5455920" y="3773536"/>
+            <a:off x="5481320" y="3367136"/>
             <a:ext cx="1014984" cy="238399"/>
           </a:xfrm>
           <a:prstGeom prst="straightConnector1">
@@ -13797,6 +14234,42 @@
           </a:p>
         </p:txBody>
       </p:sp>
+      <p:pic>
+        <p:nvPicPr>
+          <p:cNvPr id="10" name="Picture 9">
+            <a:extLst>
+              <a:ext uri="{FF2B5EF4-FFF2-40B4-BE49-F238E27FC236}">
+                <a16:creationId xmlns:a16="http://schemas.microsoft.com/office/drawing/2014/main" id="{6DDE9658-9782-434E-AFFA-6516F3EB3D15}"/>
+              </a:ext>
+            </a:extLst>
+          </p:cNvPr>
+          <p:cNvPicPr>
+            <a:picLocks noChangeAspect="1"/>
+          </p:cNvPicPr>
+          <p:nvPr/>
+        </p:nvPicPr>
+        <p:blipFill>
+          <a:blip r:embed="rId4">
+            <a:extLst>
+              <a:ext uri="{28A0092B-C50C-407E-A947-70E740481C1C}">
+                <a14:useLocalDpi xmlns:a14="http://schemas.microsoft.com/office/drawing/2010/main" val="0"/>
+              </a:ext>
+            </a:extLst>
+          </a:blip>
+          <a:stretch>
+            <a:fillRect/>
+          </a:stretch>
+        </p:blipFill>
+        <p:spPr>
+          <a:xfrm>
+            <a:off x="1213849" y="1882586"/>
+            <a:ext cx="4931176" cy="185163"/>
+          </a:xfrm>
+          <a:prstGeom prst="rect">
+            <a:avLst/>
+          </a:prstGeom>
+        </p:spPr>
+      </p:pic>
     </p:spTree>
     <p:extLst>
       <p:ext uri="{BB962C8B-B14F-4D97-AF65-F5344CB8AC3E}">
@@ -14179,15 +14652,21 @@
           <p:nvPr/>
         </p:nvPicPr>
         <p:blipFill>
-          <a:blip r:embed="rId2"/>
+          <a:blip r:embed="rId3">
+            <a:extLst>
+              <a:ext uri="{28A0092B-C50C-407E-A947-70E740481C1C}">
+                <a14:useLocalDpi xmlns:a14="http://schemas.microsoft.com/office/drawing/2010/main" val="0"/>
+              </a:ext>
+            </a:extLst>
+          </a:blip>
           <a:stretch>
             <a:fillRect/>
           </a:stretch>
         </p:blipFill>
         <p:spPr>
           <a:xfrm>
-            <a:off x="568832" y="2131921"/>
-            <a:ext cx="7621204" cy="3560602"/>
+            <a:off x="568832" y="2408509"/>
+            <a:ext cx="6352229" cy="2612526"/>
           </a:xfrm>
           <a:prstGeom prst="rect">
             <a:avLst/>
@@ -14257,7 +14736,27 @@
                   </a:schemeClr>
                 </a:solidFill>
               </a:rPr>
-              <a:t>) and folders are similarly build. </a:t>
+              <a:t>) and folders are similarly </a:t>
+            </a:r>
+            <a:r>
+              <a:rPr lang="en-DE" sz="2800" b="1" dirty="0">
+                <a:solidFill>
+                  <a:schemeClr val="accent2">
+                    <a:lumMod val="75000"/>
+                  </a:schemeClr>
+                </a:solidFill>
+              </a:rPr>
+              <a:t>constructed</a:t>
+            </a:r>
+            <a:r>
+              <a:rPr lang="en-US" sz="2800" b="1" dirty="0">
+                <a:solidFill>
+                  <a:schemeClr val="accent2">
+                    <a:lumMod val="75000"/>
+                  </a:schemeClr>
+                </a:solidFill>
+              </a:rPr>
+              <a:t>. </a:t>
             </a:r>
             <a:r>
               <a:rPr lang="en-US" sz="2800" dirty="0"/>
@@ -14329,7 +14828,7 @@
           <a:p>
             <a:r>
               <a:rPr lang="en-DE"/>
-              <a:t>10.04.2024</a:t>
+              <a:t>16.06.2025</a:t>
             </a:r>
           </a:p>
         </p:txBody>
@@ -14356,8 +14855,8 @@
           <a:lstStyle/>
           <a:p>
             <a:r>
-              <a:rPr lang="en-US" dirty="0"/>
-              <a:t>MAgPIE24 Workshop &amp; Stories </a:t>
+              <a:rPr lang="en-US"/>
+              <a:t>MAgPIE25 Workshop &amp; Stories </a:t>
             </a:r>
             <a:endParaRPr lang="en-DE" dirty="0"/>
           </a:p>
@@ -14458,15 +14957,21 @@
           <p:nvPr/>
         </p:nvPicPr>
         <p:blipFill>
-          <a:blip r:embed="rId3"/>
+          <a:blip r:embed="rId4">
+            <a:extLst>
+              <a:ext uri="{28A0092B-C50C-407E-A947-70E740481C1C}">
+                <a14:useLocalDpi xmlns:a14="http://schemas.microsoft.com/office/drawing/2010/main" val="0"/>
+              </a:ext>
+            </a:extLst>
+          </a:blip>
           <a:stretch>
             <a:fillRect/>
           </a:stretch>
         </p:blipFill>
         <p:spPr>
           <a:xfrm>
-            <a:off x="7357205" y="2527438"/>
-            <a:ext cx="3932432" cy="3731972"/>
+            <a:off x="6733275" y="2187066"/>
+            <a:ext cx="5034868" cy="4480240"/>
           </a:xfrm>
           <a:prstGeom prst="rect">
             <a:avLst/>
@@ -14477,6 +14982,36 @@
               <a:srgbClr val="C00000"/>
             </a:solidFill>
           </a:ln>
+        </p:spPr>
+      </p:pic>
+      <p:pic>
+        <p:nvPicPr>
+          <p:cNvPr id="9" name="Picture 8">
+            <a:extLst>
+              <a:ext uri="{FF2B5EF4-FFF2-40B4-BE49-F238E27FC236}">
+                <a16:creationId xmlns:a16="http://schemas.microsoft.com/office/drawing/2014/main" id="{AD7577F4-D568-4C0C-AAEC-E8DEED931EB5}"/>
+              </a:ext>
+            </a:extLst>
+          </p:cNvPr>
+          <p:cNvPicPr>
+            <a:picLocks noChangeAspect="1"/>
+          </p:cNvPicPr>
+          <p:nvPr/>
+        </p:nvPicPr>
+        <p:blipFill>
+          <a:blip r:embed="rId5"/>
+          <a:stretch>
+            <a:fillRect/>
+          </a:stretch>
+        </p:blipFill>
+        <p:spPr>
+          <a:xfrm>
+            <a:off x="665292" y="2201950"/>
+            <a:ext cx="5710108" cy="229552"/>
+          </a:xfrm>
+          <a:prstGeom prst="rect">
+            <a:avLst/>
+          </a:prstGeom>
         </p:spPr>
       </p:pic>
     </p:spTree>
@@ -14673,7 +15208,7 @@
           <a:p>
             <a:r>
               <a:rPr lang="en-DE"/>
-              <a:t>10.04.2024</a:t>
+              <a:t>16.06.2025</a:t>
             </a:r>
           </a:p>
         </p:txBody>
@@ -14701,7 +15236,7 @@
           <a:p>
             <a:r>
               <a:rPr lang="en-US"/>
-              <a:t>MAgPIE24 Workshop &amp; Stories </a:t>
+              <a:t>MAgPIE25 Workshop &amp; Stories </a:t>
             </a:r>
             <a:endParaRPr lang="en-DE"/>
           </a:p>
@@ -14751,15 +15286,21 @@
           <p:nvPr/>
         </p:nvPicPr>
         <p:blipFill>
-          <a:blip r:embed="rId2"/>
+          <a:blip r:embed="rId2">
+            <a:extLst>
+              <a:ext uri="{28A0092B-C50C-407E-A947-70E740481C1C}">
+                <a14:useLocalDpi xmlns:a14="http://schemas.microsoft.com/office/drawing/2010/main" val="0"/>
+              </a:ext>
+            </a:extLst>
+          </a:blip>
           <a:stretch>
             <a:fillRect/>
           </a:stretch>
         </p:blipFill>
         <p:spPr>
           <a:xfrm>
-            <a:off x="468690" y="1131863"/>
-            <a:ext cx="7139820" cy="4992624"/>
+            <a:off x="888833" y="1143895"/>
+            <a:ext cx="6299533" cy="4992624"/>
           </a:xfrm>
           <a:prstGeom prst="rect">
             <a:avLst/>
@@ -14877,7 +15418,7 @@
         </p:nvSpPr>
         <p:spPr>
           <a:xfrm>
-            <a:off x="7307072" y="2982371"/>
+            <a:off x="7054406" y="2982371"/>
             <a:ext cx="1745490" cy="369332"/>
           </a:xfrm>
           <a:prstGeom prst="rect">
@@ -14930,7 +15471,7 @@
         </p:nvSpPr>
         <p:spPr>
           <a:xfrm>
-            <a:off x="7023608" y="2710372"/>
+            <a:off x="6770942" y="2710372"/>
             <a:ext cx="237744" cy="830997"/>
           </a:xfrm>
           <a:prstGeom prst="rect">
@@ -14974,7 +15515,7 @@
         </p:nvSpPr>
         <p:spPr>
           <a:xfrm>
-            <a:off x="6327866" y="3662287"/>
+            <a:off x="6207548" y="3602127"/>
             <a:ext cx="1745490" cy="646331"/>
           </a:xfrm>
           <a:prstGeom prst="rect">
@@ -15039,7 +15580,7 @@
         </p:nvSpPr>
         <p:spPr>
           <a:xfrm>
-            <a:off x="6005225" y="3429706"/>
+            <a:off x="5884907" y="3369546"/>
             <a:ext cx="237744" cy="1015663"/>
           </a:xfrm>
           <a:prstGeom prst="rect">
@@ -15180,7 +15721,7 @@
         </p:nvSpPr>
         <p:spPr>
           <a:xfrm>
-            <a:off x="7407874" y="5701810"/>
+            <a:off x="7107079" y="5677746"/>
             <a:ext cx="2325405" cy="369332"/>
           </a:xfrm>
           <a:prstGeom prst="rect">
@@ -15233,7 +15774,7 @@
         </p:nvSpPr>
         <p:spPr>
           <a:xfrm>
-            <a:off x="7170131" y="5532533"/>
+            <a:off x="6869336" y="5508469"/>
             <a:ext cx="237744" cy="707886"/>
           </a:xfrm>
           <a:prstGeom prst="rect">
@@ -15583,6 +16124,11 @@
               <a:rPr lang="en-US" dirty="0"/>
               <a:t>Switch</a:t>
             </a:r>
+            <a:r>
+              <a:rPr lang="en-DE" dirty="0"/>
+              <a:t>es</a:t>
+            </a:r>
+            <a:endParaRPr lang="en-US" dirty="0"/>
           </a:p>
           <a:p>
             <a:r>
@@ -15611,6 +16157,11 @@
               <a:rPr lang="en-US" dirty="0"/>
               <a:t>File parameter</a:t>
             </a:r>
+            <a:r>
+              <a:rPr lang="en-DE" dirty="0"/>
+              <a:t>s</a:t>
+            </a:r>
+            <a:endParaRPr lang="en-US" dirty="0"/>
           </a:p>
           <a:p>
             <a:r>
@@ -15623,7 +16174,15 @@
             </a:r>
             <a:r>
               <a:rPr lang="en-US" dirty="0"/>
-              <a:t> macros</a:t>
+              <a:t> </a:t>
+            </a:r>
+            <a:r>
+              <a:rPr lang="en-DE" dirty="0"/>
+              <a:t>M</a:t>
+            </a:r>
+            <a:r>
+              <a:rPr lang="en-US" dirty="0" err="1"/>
+              <a:t>acros</a:t>
             </a:r>
             <a:endParaRPr lang="de-DE" dirty="0"/>
           </a:p>
@@ -16278,6 +16837,10 @@
               <a:t>value</a:t>
             </a:r>
             <a:r>
+              <a:rPr lang="en-DE" sz="2800" dirty="0"/>
+              <a:t>s</a:t>
+            </a:r>
+            <a:r>
               <a:rPr lang="de-DE" sz="2800" dirty="0"/>
               <a:t> </a:t>
             </a:r>
@@ -16456,6 +17019,10 @@
               <a:rPr lang="de-DE" sz="2800" dirty="0" err="1"/>
               <a:t>object</a:t>
             </a:r>
+            <a:r>
+              <a:rPr lang="en-DE" sz="2800" dirty="0"/>
+              <a:t>:</a:t>
+            </a:r>
             <a:endParaRPr lang="de-DE" sz="2800" dirty="0"/>
           </a:p>
           <a:p>
@@ -16717,7 +17284,7 @@
           <a:p>
             <a:r>
               <a:rPr lang="en-DE"/>
-              <a:t>10.04.2024</a:t>
+              <a:t>16.06.2025</a:t>
             </a:r>
           </a:p>
         </p:txBody>
@@ -16745,7 +17312,7 @@
           <a:p>
             <a:r>
               <a:rPr lang="en-US"/>
-              <a:t>MAgPIE24 Workshop &amp; Stories </a:t>
+              <a:t>MAgPIE25 Workshop &amp; Stories </a:t>
             </a:r>
             <a:endParaRPr lang="en-DE"/>
           </a:p>

</xml_diff>